<commit_message>
updated ppt with new slides for Kevin and Aiby
</commit_message>
<xml_diff>
--- a/RoCry.pptx
+++ b/RoCry.pptx
@@ -8,10 +8,12 @@
     <p:sldId id="256" r:id="rId2"/>
     <p:sldId id="257" r:id="rId3"/>
     <p:sldId id="258" r:id="rId4"/>
-    <p:sldId id="259" r:id="rId5"/>
-    <p:sldId id="260" r:id="rId6"/>
-    <p:sldId id="261" r:id="rId7"/>
-    <p:sldId id="262" r:id="rId8"/>
+    <p:sldId id="263" r:id="rId5"/>
+    <p:sldId id="264" r:id="rId6"/>
+    <p:sldId id="259" r:id="rId7"/>
+    <p:sldId id="261" r:id="rId8"/>
+    <p:sldId id="260" r:id="rId9"/>
+    <p:sldId id="262" r:id="rId10"/>
   </p:sldIdLst>
   <p:sldSz cx="12192000" cy="6858000"/>
   <p:notesSz cx="6858000" cy="9144000"/>
@@ -110,6 +112,11 @@
       </a:defRPr>
     </a:lvl9pPr>
   </p:defaultTextStyle>
+  <p:extLst>
+    <p:ext uri="{EFAFB233-063F-42B5-8137-9DF3F51BA10A}">
+      <p15:sldGuideLst xmlns:p15="http://schemas.microsoft.com/office/powerpoint/2012/main"/>
+    </p:ext>
+  </p:extLst>
 </p:presentation>
 </file>
 
@@ -264,7 +271,7 @@
           <a:p>
             <a:fld id="{D208048B-57AF-4F53-BC84-8E0A1033FBEC}" type="datetimeFigureOut">
               <a:rPr lang="en-US" smtClean="0"/>
-              <a:t>10/14/2021</a:t>
+              <a:t>10/15/2021</a:t>
             </a:fld>
             <a:endParaRPr lang="en-US"/>
           </a:p>
@@ -462,7 +469,7 @@
           <a:p>
             <a:fld id="{D208048B-57AF-4F53-BC84-8E0A1033FBEC}" type="datetimeFigureOut">
               <a:rPr lang="en-US" smtClean="0"/>
-              <a:t>10/14/2021</a:t>
+              <a:t>10/15/2021</a:t>
             </a:fld>
             <a:endParaRPr lang="en-US"/>
           </a:p>
@@ -1999,7 +2006,7 @@
           <a:p>
             <a:fld id="{D208048B-57AF-4F53-BC84-8E0A1033FBEC}" type="datetimeFigureOut">
               <a:rPr lang="en-US" smtClean="0"/>
-              <a:t>10/14/2021</a:t>
+              <a:t>10/15/2021</a:t>
             </a:fld>
             <a:endParaRPr lang="en-US"/>
           </a:p>
@@ -2199,7 +2206,7 @@
           <a:p>
             <a:fld id="{D208048B-57AF-4F53-BC84-8E0A1033FBEC}" type="datetimeFigureOut">
               <a:rPr lang="en-US" smtClean="0"/>
-              <a:t>10/14/2021</a:t>
+              <a:t>10/15/2021</a:t>
             </a:fld>
             <a:endParaRPr lang="en-US"/>
           </a:p>
@@ -2477,7 +2484,7 @@
           <a:p>
             <a:fld id="{D208048B-57AF-4F53-BC84-8E0A1033FBEC}" type="datetimeFigureOut">
               <a:rPr lang="en-US" smtClean="0"/>
-              <a:t>10/14/2021</a:t>
+              <a:t>10/15/2021</a:t>
             </a:fld>
             <a:endParaRPr lang="en-US"/>
           </a:p>
@@ -3455,7 +3462,7 @@
           <a:p>
             <a:fld id="{D208048B-57AF-4F53-BC84-8E0A1033FBEC}" type="datetimeFigureOut">
               <a:rPr lang="en-US" smtClean="0"/>
-              <a:t>10/14/2021</a:t>
+              <a:t>10/15/2021</a:t>
             </a:fld>
             <a:endParaRPr lang="en-US"/>
           </a:p>
@@ -4575,7 +4582,7 @@
           <a:p>
             <a:fld id="{D208048B-57AF-4F53-BC84-8E0A1033FBEC}" type="datetimeFigureOut">
               <a:rPr lang="en-US" smtClean="0"/>
-              <a:t>10/14/2021</a:t>
+              <a:t>10/15/2021</a:t>
             </a:fld>
             <a:endParaRPr lang="en-US"/>
           </a:p>
@@ -4722,7 +4729,7 @@
           <a:p>
             <a:fld id="{D208048B-57AF-4F53-BC84-8E0A1033FBEC}" type="datetimeFigureOut">
               <a:rPr lang="en-US" smtClean="0"/>
-              <a:t>10/14/2021</a:t>
+              <a:t>10/15/2021</a:t>
             </a:fld>
             <a:endParaRPr lang="en-US"/>
           </a:p>
@@ -4835,7 +4842,7 @@
           <a:p>
             <a:fld id="{D208048B-57AF-4F53-BC84-8E0A1033FBEC}" type="datetimeFigureOut">
               <a:rPr lang="en-US" smtClean="0"/>
-              <a:t>10/14/2021</a:t>
+              <a:t>10/15/2021</a:t>
             </a:fld>
             <a:endParaRPr lang="en-US"/>
           </a:p>
@@ -6481,7 +6488,7 @@
           <a:p>
             <a:fld id="{D208048B-57AF-4F53-BC84-8E0A1033FBEC}" type="datetimeFigureOut">
               <a:rPr lang="en-US" smtClean="0"/>
-              <a:t>10/14/2021</a:t>
+              <a:t>10/15/2021</a:t>
             </a:fld>
             <a:endParaRPr lang="en-US"/>
           </a:p>
@@ -8119,7 +8126,7 @@
           <a:p>
             <a:fld id="{D208048B-57AF-4F53-BC84-8E0A1033FBEC}" type="datetimeFigureOut">
               <a:rPr lang="en-US" smtClean="0"/>
-              <a:t>10/14/2021</a:t>
+              <a:t>10/15/2021</a:t>
             </a:fld>
             <a:endParaRPr lang="en-US"/>
           </a:p>
@@ -9042,7 +9049,7 @@
             <a:fld id="{D208048B-57AF-4F53-BC84-8E0A1033FBEC}" type="datetimeFigureOut">
               <a:rPr lang="en-US" smtClean="0"/>
               <a:pPr/>
-              <a:t>10/14/2021</a:t>
+              <a:t>10/15/2021</a:t>
             </a:fld>
             <a:endParaRPr lang="en-US" dirty="0"/>
           </a:p>
@@ -12840,7 +12847,19 @@
           <a:p>
             <a:r>
               <a:rPr lang="en-US" dirty="0"/>
-              <a:t>Why Rf model?</a:t>
+              <a:t>Why </a:t>
+            </a:r>
+            <a:r>
+              <a:rPr lang="en-US" b="1" u="sng" dirty="0">
+                <a:solidFill>
+                  <a:srgbClr val="00B050"/>
+                </a:solidFill>
+              </a:rPr>
+              <a:t>Rf model</a:t>
+            </a:r>
+            <a:r>
+              <a:rPr lang="en-US" dirty="0"/>
+              <a:t>?</a:t>
             </a:r>
           </a:p>
           <a:p>
@@ -12853,7 +12872,19 @@
           <a:p>
             <a:r>
               <a:rPr lang="en-US" dirty="0"/>
-              <a:t>For our F-T-W we used a neural network which is looking at daily return trends on our weekly fund picks. </a:t>
+              <a:t>For our F-T-W we used a </a:t>
+            </a:r>
+            <a:r>
+              <a:rPr lang="en-US" dirty="0">
+                <a:solidFill>
+                  <a:srgbClr val="00B0F0"/>
+                </a:solidFill>
+              </a:rPr>
+              <a:t>neural network </a:t>
+            </a:r>
+            <a:r>
+              <a:rPr lang="en-US" dirty="0"/>
+              <a:t>which is looking at daily return trends on our weekly fund picks. </a:t>
             </a:r>
           </a:p>
           <a:p>
@@ -12912,6 +12943,1975 @@
 </file>
 
 <file path=ppt/slides/slide4.xml><?xml version="1.0" encoding="utf-8"?>
+<p:sld xmlns:a="http://schemas.openxmlformats.org/drawingml/2006/main" xmlns:r="http://schemas.openxmlformats.org/officeDocument/2006/relationships" xmlns:p="http://schemas.openxmlformats.org/presentationml/2006/main">
+  <p:cSld>
+    <p:bg>
+      <p:bgPr>
+        <a:solidFill>
+          <a:schemeClr val="bg2"/>
+        </a:solidFill>
+        <a:effectLst/>
+      </p:bgPr>
+    </p:bg>
+    <p:spTree>
+      <p:nvGrpSpPr>
+        <p:cNvPr id="1" name=""/>
+        <p:cNvGrpSpPr/>
+        <p:nvPr/>
+      </p:nvGrpSpPr>
+      <p:grpSpPr>
+        <a:xfrm>
+          <a:off x="0" y="0"/>
+          <a:ext cx="0" cy="0"/>
+          <a:chOff x="0" y="0"/>
+          <a:chExt cx="0" cy="0"/>
+        </a:xfrm>
+      </p:grpSpPr>
+      <p:sp useBgFill="1">
+        <p:nvSpPr>
+          <p:cNvPr id="9" name="Background Fill">
+            <a:extLst>
+              <a:ext uri="{FF2B5EF4-FFF2-40B4-BE49-F238E27FC236}">
+                <a16:creationId xmlns:a16="http://schemas.microsoft.com/office/drawing/2014/main" id="{FAFB3478-4AEC-431E-93B2-1593839C16DA}"/>
+              </a:ext>
+              <a:ext uri="{C183D7F6-B498-43B3-948B-1728B52AA6E4}">
+                <adec:decorative xmlns:adec="http://schemas.microsoft.com/office/drawing/2017/decorative" val="1"/>
+              </a:ext>
+            </a:extLst>
+          </p:cNvPr>
+          <p:cNvSpPr>
+            <a:spLocks noGrp="1" noRot="1" noChangeAspect="1" noMove="1" noResize="1" noEditPoints="1" noAdjustHandles="1" noChangeArrowheads="1" noChangeShapeType="1" noTextEdit="1"/>
+          </p:cNvSpPr>
+          <p:nvPr>
+            <p:extLst>
+              <p:ext uri="{386F3935-93C4-4BCD-93E2-E3B085C9AB24}">
+                <p16:designElem xmlns:p16="http://schemas.microsoft.com/office/powerpoint/2015/main" val="1"/>
+              </p:ext>
+            </p:extLst>
+          </p:nvPr>
+        </p:nvSpPr>
+        <p:spPr>
+          <a:xfrm>
+            <a:off x="0" y="0"/>
+            <a:ext cx="12192000" cy="6858000"/>
+          </a:xfrm>
+          <a:prstGeom prst="rect">
+            <a:avLst/>
+          </a:prstGeom>
+          <a:ln w="9525" cap="flat">
+            <a:noFill/>
+            <a:prstDash val="solid"/>
+            <a:miter/>
+          </a:ln>
+        </p:spPr>
+        <p:txBody>
+          <a:bodyPr rtlCol="0" anchor="ctr"/>
+          <a:lstStyle/>
+          <a:p>
+            <a:endParaRPr lang="en-US">
+              <a:solidFill>
+                <a:schemeClr val="tx1"/>
+              </a:solidFill>
+            </a:endParaRPr>
+          </a:p>
+        </p:txBody>
+      </p:sp>
+      <p:sp>
+        <p:nvSpPr>
+          <p:cNvPr id="11" name="Color Fill">
+            <a:extLst>
+              <a:ext uri="{FF2B5EF4-FFF2-40B4-BE49-F238E27FC236}">
+                <a16:creationId xmlns:a16="http://schemas.microsoft.com/office/drawing/2014/main" id="{E0F166C3-D45F-4A92-A291-15B874AD1A56}"/>
+              </a:ext>
+              <a:ext uri="{C183D7F6-B498-43B3-948B-1728B52AA6E4}">
+                <adec:decorative xmlns:adec="http://schemas.microsoft.com/office/drawing/2017/decorative" val="1"/>
+              </a:ext>
+            </a:extLst>
+          </p:cNvPr>
+          <p:cNvSpPr>
+            <a:spLocks noGrp="1" noRot="1" noChangeAspect="1" noMove="1" noResize="1" noEditPoints="1" noAdjustHandles="1" noChangeArrowheads="1" noChangeShapeType="1" noTextEdit="1"/>
+          </p:cNvSpPr>
+          <p:nvPr>
+            <p:extLst>
+              <p:ext uri="{386F3935-93C4-4BCD-93E2-E3B085C9AB24}">
+                <p16:designElem xmlns:p16="http://schemas.microsoft.com/office/powerpoint/2015/main" val="1"/>
+              </p:ext>
+            </p:extLst>
+          </p:nvPr>
+        </p:nvSpPr>
+        <p:spPr>
+          <a:xfrm>
+            <a:off x="0" y="0"/>
+            <a:ext cx="12188952" cy="6858000"/>
+          </a:xfrm>
+          <a:prstGeom prst="rect">
+            <a:avLst/>
+          </a:prstGeom>
+          <a:solidFill>
+            <a:schemeClr val="bg2">
+              <a:lumMod val="75000"/>
+              <a:lumOff val="25000"/>
+              <a:alpha val="40000"/>
+            </a:schemeClr>
+          </a:solidFill>
+          <a:ln w="9525" cap="flat">
+            <a:noFill/>
+            <a:prstDash val="solid"/>
+            <a:miter/>
+          </a:ln>
+        </p:spPr>
+        <p:txBody>
+          <a:bodyPr rtlCol="0" anchor="ctr"/>
+          <a:lstStyle/>
+          <a:p>
+            <a:endParaRPr lang="en-US" dirty="0">
+              <a:solidFill>
+                <a:schemeClr val="bg2">
+                  <a:lumMod val="75000"/>
+                  <a:lumOff val="25000"/>
+                </a:schemeClr>
+              </a:solidFill>
+            </a:endParaRPr>
+          </a:p>
+        </p:txBody>
+      </p:sp>
+      <p:grpSp>
+        <p:nvGrpSpPr>
+          <p:cNvPr id="13" name="Group 12">
+            <a:extLst>
+              <a:ext uri="{FF2B5EF4-FFF2-40B4-BE49-F238E27FC236}">
+                <a16:creationId xmlns:a16="http://schemas.microsoft.com/office/drawing/2014/main" id="{D46CEC91-770B-42C4-A145-1B46A53147AF}"/>
+              </a:ext>
+              <a:ext uri="{C183D7F6-B498-43B3-948B-1728B52AA6E4}">
+                <adec:decorative xmlns:adec="http://schemas.microsoft.com/office/drawing/2017/decorative" val="1"/>
+              </a:ext>
+            </a:extLst>
+          </p:cNvPr>
+          <p:cNvGrpSpPr>
+            <a:grpSpLocks noGrp="1" noUngrp="1" noRot="1" noChangeAspect="1" noMove="1" noResize="1"/>
+          </p:cNvGrpSpPr>
+          <p:nvPr>
+            <p:extLst>
+              <p:ext uri="{386F3935-93C4-4BCD-93E2-E3B085C9AB24}">
+                <p16:designElem xmlns:p16="http://schemas.microsoft.com/office/powerpoint/2015/main" val="1"/>
+              </p:ext>
+            </p:extLst>
+          </p:nvPr>
+        </p:nvGrpSpPr>
+        <p:grpSpPr>
+          <a:xfrm>
+            <a:off x="7739089" y="-3532"/>
+            <a:ext cx="4449863" cy="6861532"/>
+            <a:chOff x="7739089" y="-3532"/>
+            <a:chExt cx="4449863" cy="6861532"/>
+          </a:xfrm>
+        </p:grpSpPr>
+        <p:sp>
+          <p:nvSpPr>
+            <p:cNvPr id="14" name="Oval 13">
+              <a:extLst>
+                <a:ext uri="{FF2B5EF4-FFF2-40B4-BE49-F238E27FC236}">
+                  <a16:creationId xmlns:a16="http://schemas.microsoft.com/office/drawing/2014/main" id="{1DD4806A-AF58-4453-B072-6A4A4F038B2D}"/>
+                </a:ext>
+                <a:ext uri="{C183D7F6-B498-43B3-948B-1728B52AA6E4}">
+                  <adec:decorative xmlns:adec="http://schemas.microsoft.com/office/drawing/2017/decorative" val="1"/>
+                </a:ext>
+              </a:extLst>
+            </p:cNvPr>
+            <p:cNvSpPr/>
+            <p:nvPr>
+              <p:extLst>
+                <p:ext uri="{386F3935-93C4-4BCD-93E2-E3B085C9AB24}">
+                  <p16:designElem xmlns:p16="http://schemas.microsoft.com/office/powerpoint/2015/main" val="1"/>
+                </p:ext>
+              </p:extLst>
+            </p:nvPr>
+          </p:nvSpPr>
+          <p:spPr>
+            <a:xfrm>
+              <a:off x="8907984" y="4121414"/>
+              <a:ext cx="514757" cy="516940"/>
+            </a:xfrm>
+            <a:prstGeom prst="ellipse">
+              <a:avLst/>
+            </a:prstGeom>
+            <a:solidFill>
+              <a:schemeClr val="accent3">
+                <a:lumMod val="60000"/>
+                <a:lumOff val="40000"/>
+              </a:schemeClr>
+            </a:solidFill>
+            <a:ln>
+              <a:noFill/>
+            </a:ln>
+          </p:spPr>
+          <p:style>
+            <a:lnRef idx="2">
+              <a:schemeClr val="accent1">
+                <a:shade val="50000"/>
+              </a:schemeClr>
+            </a:lnRef>
+            <a:fillRef idx="1">
+              <a:schemeClr val="accent1"/>
+            </a:fillRef>
+            <a:effectRef idx="0">
+              <a:schemeClr val="accent1"/>
+            </a:effectRef>
+            <a:fontRef idx="minor">
+              <a:schemeClr val="lt1"/>
+            </a:fontRef>
+          </p:style>
+          <p:txBody>
+            <a:bodyPr rtlCol="0" anchor="ctr"/>
+            <a:lstStyle/>
+            <a:p>
+              <a:pPr lvl="0" algn="ctr"/>
+              <a:endParaRPr lang="en-US" dirty="0"/>
+            </a:p>
+          </p:txBody>
+        </p:sp>
+        <p:sp>
+          <p:nvSpPr>
+            <p:cNvPr id="15" name="Freeform: Shape 14">
+              <a:extLst>
+                <a:ext uri="{FF2B5EF4-FFF2-40B4-BE49-F238E27FC236}">
+                  <a16:creationId xmlns:a16="http://schemas.microsoft.com/office/drawing/2014/main" id="{BA9DFD6B-459F-49A7-AC49-D1DFA73397FA}"/>
+                </a:ext>
+                <a:ext uri="{C183D7F6-B498-43B3-948B-1728B52AA6E4}">
+                  <adec:decorative xmlns:adec="http://schemas.microsoft.com/office/drawing/2017/decorative" val="1"/>
+                </a:ext>
+              </a:extLst>
+            </p:cNvPr>
+            <p:cNvSpPr/>
+            <p:nvPr>
+              <p:extLst>
+                <p:ext uri="{386F3935-93C4-4BCD-93E2-E3B085C9AB24}">
+                  <p16:designElem xmlns:p16="http://schemas.microsoft.com/office/powerpoint/2015/main" val="1"/>
+                </p:ext>
+              </p:extLst>
+            </p:nvPr>
+          </p:nvSpPr>
+          <p:spPr>
+            <a:xfrm>
+              <a:off x="8348375" y="4121414"/>
+              <a:ext cx="3266317" cy="2736586"/>
+            </a:xfrm>
+            <a:custGeom>
+              <a:avLst/>
+              <a:gdLst>
+                <a:gd name="connsiteX0" fmla="*/ 1635557 w 3266317"/>
+                <a:gd name="connsiteY0" fmla="*/ 0 h 2736586"/>
+                <a:gd name="connsiteX1" fmla="*/ 3266317 w 3266317"/>
+                <a:gd name="connsiteY1" fmla="*/ 0 h 2736586"/>
+                <a:gd name="connsiteX2" fmla="*/ 3266317 w 3266317"/>
+                <a:gd name="connsiteY2" fmla="*/ 1630760 h 2736586"/>
+                <a:gd name="connsiteX3" fmla="*/ 2892838 w 3266317"/>
+                <a:gd name="connsiteY3" fmla="*/ 2671131 h 2736586"/>
+                <a:gd name="connsiteX4" fmla="*/ 2833348 w 3266317"/>
+                <a:gd name="connsiteY4" fmla="*/ 2736586 h 2736586"/>
+                <a:gd name="connsiteX5" fmla="*/ 0 w 3266317"/>
+                <a:gd name="connsiteY5" fmla="*/ 2736586 h 2736586"/>
+                <a:gd name="connsiteX6" fmla="*/ 0 w 3266317"/>
+                <a:gd name="connsiteY6" fmla="*/ 1635558 h 2736586"/>
+                <a:gd name="connsiteX7" fmla="*/ 1635557 w 3266317"/>
+                <a:gd name="connsiteY7" fmla="*/ 0 h 2736586"/>
+              </a:gdLst>
+              <a:ahLst/>
+              <a:cxnLst>
+                <a:cxn ang="0">
+                  <a:pos x="connsiteX0" y="connsiteY0"/>
+                </a:cxn>
+                <a:cxn ang="0">
+                  <a:pos x="connsiteX1" y="connsiteY1"/>
+                </a:cxn>
+                <a:cxn ang="0">
+                  <a:pos x="connsiteX2" y="connsiteY2"/>
+                </a:cxn>
+                <a:cxn ang="0">
+                  <a:pos x="connsiteX3" y="connsiteY3"/>
+                </a:cxn>
+                <a:cxn ang="0">
+                  <a:pos x="connsiteX4" y="connsiteY4"/>
+                </a:cxn>
+                <a:cxn ang="0">
+                  <a:pos x="connsiteX5" y="connsiteY5"/>
+                </a:cxn>
+                <a:cxn ang="0">
+                  <a:pos x="connsiteX6" y="connsiteY6"/>
+                </a:cxn>
+                <a:cxn ang="0">
+                  <a:pos x="connsiteX7" y="connsiteY7"/>
+                </a:cxn>
+              </a:cxnLst>
+              <a:rect l="l" t="t" r="r" b="b"/>
+              <a:pathLst>
+                <a:path w="3266317" h="2736586">
+                  <a:moveTo>
+                    <a:pt x="1635557" y="0"/>
+                  </a:moveTo>
+                  <a:lnTo>
+                    <a:pt x="3266317" y="0"/>
+                  </a:lnTo>
+                  <a:lnTo>
+                    <a:pt x="3266317" y="1630760"/>
+                  </a:lnTo>
+                  <a:cubicBezTo>
+                    <a:pt x="3266317" y="2025955"/>
+                    <a:pt x="3126159" y="2388411"/>
+                    <a:pt x="2892838" y="2671131"/>
+                  </a:cubicBezTo>
+                  <a:lnTo>
+                    <a:pt x="2833348" y="2736586"/>
+                  </a:lnTo>
+                  <a:lnTo>
+                    <a:pt x="0" y="2736586"/>
+                  </a:lnTo>
+                  <a:lnTo>
+                    <a:pt x="0" y="1635558"/>
+                  </a:lnTo>
+                  <a:cubicBezTo>
+                    <a:pt x="0" y="732255"/>
+                    <a:pt x="732254" y="0"/>
+                    <a:pt x="1635557" y="0"/>
+                  </a:cubicBezTo>
+                  <a:close/>
+                </a:path>
+              </a:pathLst>
+            </a:custGeom>
+            <a:solidFill>
+              <a:schemeClr val="accent1">
+                <a:lumMod val="60000"/>
+                <a:lumOff val="40000"/>
+                <a:alpha val="60000"/>
+              </a:schemeClr>
+            </a:solidFill>
+            <a:ln w="9331" cap="flat">
+              <a:noFill/>
+              <a:prstDash val="solid"/>
+              <a:miter/>
+            </a:ln>
+          </p:spPr>
+          <p:txBody>
+            <a:bodyPr rtlCol="0" anchor="ctr"/>
+            <a:lstStyle/>
+            <a:p>
+              <a:pPr lvl="0"/>
+              <a:endParaRPr lang="en-US"/>
+            </a:p>
+          </p:txBody>
+        </p:sp>
+        <p:sp>
+          <p:nvSpPr>
+            <p:cNvPr id="16" name="Freeform: Shape 15">
+              <a:extLst>
+                <a:ext uri="{FF2B5EF4-FFF2-40B4-BE49-F238E27FC236}">
+                  <a16:creationId xmlns:a16="http://schemas.microsoft.com/office/drawing/2014/main" id="{4E8CB084-44E1-4B4B-91FF-4A20D55DFD3A}"/>
+                </a:ext>
+                <a:ext uri="{C183D7F6-B498-43B3-948B-1728B52AA6E4}">
+                  <adec:decorative xmlns:adec="http://schemas.microsoft.com/office/drawing/2017/decorative" val="1"/>
+                </a:ext>
+              </a:extLst>
+            </p:cNvPr>
+            <p:cNvSpPr/>
+            <p:nvPr>
+              <p:extLst>
+                <p:ext uri="{386F3935-93C4-4BCD-93E2-E3B085C9AB24}">
+                  <p16:designElem xmlns:p16="http://schemas.microsoft.com/office/powerpoint/2015/main" val="1"/>
+                </p:ext>
+              </p:extLst>
+            </p:nvPr>
+          </p:nvSpPr>
+          <p:spPr>
+            <a:xfrm>
+              <a:off x="11752627" y="3404614"/>
+              <a:ext cx="436325" cy="1309674"/>
+            </a:xfrm>
+            <a:custGeom>
+              <a:avLst/>
+              <a:gdLst>
+                <a:gd name="connsiteX0" fmla="*/ 470325 w 477612"/>
+                <a:gd name="connsiteY0" fmla="*/ 0 h 1433600"/>
+                <a:gd name="connsiteX1" fmla="*/ 475607 w 477612"/>
+                <a:gd name="connsiteY1" fmla="*/ 3701 h 1433600"/>
+                <a:gd name="connsiteX2" fmla="*/ 477612 w 477612"/>
+                <a:gd name="connsiteY2" fmla="*/ 5160 h 1433600"/>
+                <a:gd name="connsiteX3" fmla="*/ 477612 w 477612"/>
+                <a:gd name="connsiteY3" fmla="*/ 1428441 h 1433600"/>
+                <a:gd name="connsiteX4" fmla="*/ 475607 w 477612"/>
+                <a:gd name="connsiteY4" fmla="*/ 1429900 h 1433600"/>
+                <a:gd name="connsiteX5" fmla="*/ 470325 w 477612"/>
+                <a:gd name="connsiteY5" fmla="*/ 1433600 h 1433600"/>
+                <a:gd name="connsiteX6" fmla="*/ 0 w 477612"/>
+                <a:gd name="connsiteY6" fmla="*/ 716800 h 1433600"/>
+                <a:gd name="connsiteX7" fmla="*/ 470325 w 477612"/>
+                <a:gd name="connsiteY7" fmla="*/ 0 h 1433600"/>
+              </a:gdLst>
+              <a:ahLst/>
+              <a:cxnLst>
+                <a:cxn ang="0">
+                  <a:pos x="connsiteX0" y="connsiteY0"/>
+                </a:cxn>
+                <a:cxn ang="0">
+                  <a:pos x="connsiteX1" y="connsiteY1"/>
+                </a:cxn>
+                <a:cxn ang="0">
+                  <a:pos x="connsiteX2" y="connsiteY2"/>
+                </a:cxn>
+                <a:cxn ang="0">
+                  <a:pos x="connsiteX3" y="connsiteY3"/>
+                </a:cxn>
+                <a:cxn ang="0">
+                  <a:pos x="connsiteX4" y="connsiteY4"/>
+                </a:cxn>
+                <a:cxn ang="0">
+                  <a:pos x="connsiteX5" y="connsiteY5"/>
+                </a:cxn>
+                <a:cxn ang="0">
+                  <a:pos x="connsiteX6" y="connsiteY6"/>
+                </a:cxn>
+                <a:cxn ang="0">
+                  <a:pos x="connsiteX7" y="connsiteY7"/>
+                </a:cxn>
+              </a:cxnLst>
+              <a:rect l="l" t="t" r="r" b="b"/>
+              <a:pathLst>
+                <a:path w="477612" h="1433600">
+                  <a:moveTo>
+                    <a:pt x="470325" y="0"/>
+                  </a:moveTo>
+                  <a:cubicBezTo>
+                    <a:pt x="470325" y="0"/>
+                    <a:pt x="472162" y="1254"/>
+                    <a:pt x="475607" y="3701"/>
+                  </a:cubicBezTo>
+                  <a:lnTo>
+                    <a:pt x="477612" y="5160"/>
+                  </a:lnTo>
+                  <a:lnTo>
+                    <a:pt x="477612" y="1428441"/>
+                  </a:lnTo>
+                  <a:lnTo>
+                    <a:pt x="475607" y="1429900"/>
+                  </a:lnTo>
+                  <a:cubicBezTo>
+                    <a:pt x="472162" y="1432347"/>
+                    <a:pt x="470325" y="1433600"/>
+                    <a:pt x="470325" y="1433600"/>
+                  </a:cubicBezTo>
+                  <a:cubicBezTo>
+                    <a:pt x="470325" y="1433600"/>
+                    <a:pt x="0" y="1112672"/>
+                    <a:pt x="0" y="716800"/>
+                  </a:cubicBezTo>
+                  <a:cubicBezTo>
+                    <a:pt x="0" y="320929"/>
+                    <a:pt x="470325" y="0"/>
+                    <a:pt x="470325" y="0"/>
+                  </a:cubicBezTo>
+                  <a:close/>
+                </a:path>
+              </a:pathLst>
+            </a:custGeom>
+            <a:pattFill prst="pct5">
+              <a:fgClr>
+                <a:schemeClr val="tx2">
+                  <a:lumMod val="75000"/>
+                  <a:lumOff val="25000"/>
+                </a:schemeClr>
+              </a:fgClr>
+              <a:bgClr>
+                <a:schemeClr val="accent1">
+                  <a:lumMod val="60000"/>
+                  <a:lumOff val="40000"/>
+                </a:schemeClr>
+              </a:bgClr>
+            </a:pattFill>
+            <a:ln w="9525" cap="flat">
+              <a:noFill/>
+              <a:prstDash val="solid"/>
+              <a:miter/>
+            </a:ln>
+          </p:spPr>
+          <p:txBody>
+            <a:bodyPr wrap="square" rtlCol="0" anchor="ctr">
+              <a:noAutofit/>
+            </a:bodyPr>
+            <a:lstStyle/>
+            <a:p>
+              <a:pPr lvl="0"/>
+              <a:endParaRPr lang="en-US" dirty="0"/>
+            </a:p>
+          </p:txBody>
+        </p:sp>
+        <p:sp>
+          <p:nvSpPr>
+            <p:cNvPr id="17" name="Graphic 9">
+              <a:extLst>
+                <a:ext uri="{FF2B5EF4-FFF2-40B4-BE49-F238E27FC236}">
+                  <a16:creationId xmlns:a16="http://schemas.microsoft.com/office/drawing/2014/main" id="{6C295B8D-0725-41E2-9095-AF10CED978EE}"/>
+                </a:ext>
+                <a:ext uri="{C183D7F6-B498-43B3-948B-1728B52AA6E4}">
+                  <adec:decorative xmlns:adec="http://schemas.microsoft.com/office/drawing/2017/decorative" val="1"/>
+                </a:ext>
+              </a:extLst>
+            </p:cNvPr>
+            <p:cNvSpPr/>
+            <p:nvPr>
+              <p:extLst>
+                <p:ext uri="{386F3935-93C4-4BCD-93E2-E3B085C9AB24}">
+                  <p16:designElem xmlns:p16="http://schemas.microsoft.com/office/powerpoint/2015/main" val="1"/>
+                </p:ext>
+              </p:extLst>
+            </p:nvPr>
+          </p:nvSpPr>
+          <p:spPr>
+            <a:xfrm>
+              <a:off x="7739089" y="-3532"/>
+              <a:ext cx="3875603" cy="3875603"/>
+            </a:xfrm>
+            <a:custGeom>
+              <a:avLst/>
+              <a:gdLst>
+                <a:gd name="connsiteX0" fmla="*/ 6861546 w 6861545"/>
+                <a:gd name="connsiteY0" fmla="*/ 6861546 h 6861545"/>
+                <a:gd name="connsiteX1" fmla="*/ 3435812 w 6861545"/>
+                <a:gd name="connsiteY1" fmla="*/ 6861546 h 6861545"/>
+                <a:gd name="connsiteX2" fmla="*/ 0 w 6861545"/>
+                <a:gd name="connsiteY2" fmla="*/ 3425734 h 6861545"/>
+                <a:gd name="connsiteX3" fmla="*/ 0 w 6861545"/>
+                <a:gd name="connsiteY3" fmla="*/ 0 h 6861545"/>
+                <a:gd name="connsiteX4" fmla="*/ 3425734 w 6861545"/>
+                <a:gd name="connsiteY4" fmla="*/ 0 h 6861545"/>
+                <a:gd name="connsiteX5" fmla="*/ 6861546 w 6861545"/>
+                <a:gd name="connsiteY5" fmla="*/ 3435812 h 6861545"/>
+                <a:gd name="connsiteX6" fmla="*/ 6861546 w 6861545"/>
+                <a:gd name="connsiteY6" fmla="*/ 6861546 h 6861545"/>
+              </a:gdLst>
+              <a:ahLst/>
+              <a:cxnLst>
+                <a:cxn ang="0">
+                  <a:pos x="connsiteX0" y="connsiteY0"/>
+                </a:cxn>
+                <a:cxn ang="0">
+                  <a:pos x="connsiteX1" y="connsiteY1"/>
+                </a:cxn>
+                <a:cxn ang="0">
+                  <a:pos x="connsiteX2" y="connsiteY2"/>
+                </a:cxn>
+                <a:cxn ang="0">
+                  <a:pos x="connsiteX3" y="connsiteY3"/>
+                </a:cxn>
+                <a:cxn ang="0">
+                  <a:pos x="connsiteX4" y="connsiteY4"/>
+                </a:cxn>
+                <a:cxn ang="0">
+                  <a:pos x="connsiteX5" y="connsiteY5"/>
+                </a:cxn>
+                <a:cxn ang="0">
+                  <a:pos x="connsiteX6" y="connsiteY6"/>
+                </a:cxn>
+              </a:cxnLst>
+              <a:rect l="l" t="t" r="r" b="b"/>
+              <a:pathLst>
+                <a:path w="6861545" h="6861545">
+                  <a:moveTo>
+                    <a:pt x="6861546" y="6861546"/>
+                  </a:moveTo>
+                  <a:lnTo>
+                    <a:pt x="3435812" y="6861546"/>
+                  </a:lnTo>
+                  <a:cubicBezTo>
+                    <a:pt x="1538245" y="6861546"/>
+                    <a:pt x="0" y="5323301"/>
+                    <a:pt x="0" y="3425734"/>
+                  </a:cubicBezTo>
+                  <a:lnTo>
+                    <a:pt x="0" y="0"/>
+                  </a:lnTo>
+                  <a:lnTo>
+                    <a:pt x="3425734" y="0"/>
+                  </a:lnTo>
+                  <a:cubicBezTo>
+                    <a:pt x="5323301" y="0"/>
+                    <a:pt x="6861546" y="1538245"/>
+                    <a:pt x="6861546" y="3435812"/>
+                  </a:cubicBezTo>
+                  <a:lnTo>
+                    <a:pt x="6861546" y="6861546"/>
+                  </a:lnTo>
+                  <a:close/>
+                </a:path>
+              </a:pathLst>
+            </a:custGeom>
+            <a:solidFill>
+              <a:schemeClr val="tx2">
+                <a:lumMod val="25000"/>
+                <a:lumOff val="75000"/>
+                <a:alpha val="20000"/>
+              </a:schemeClr>
+            </a:solidFill>
+            <a:ln w="209550" cap="flat">
+              <a:noFill/>
+              <a:prstDash val="solid"/>
+              <a:miter/>
+            </a:ln>
+          </p:spPr>
+          <p:txBody>
+            <a:bodyPr rtlCol="0" anchor="ctr"/>
+            <a:lstStyle/>
+            <a:p>
+              <a:pPr lvl="0"/>
+              <a:endParaRPr lang="en-US"/>
+            </a:p>
+          </p:txBody>
+        </p:sp>
+        <p:sp>
+          <p:nvSpPr>
+            <p:cNvPr id="18" name="Graphic 9">
+              <a:extLst>
+                <a:ext uri="{FF2B5EF4-FFF2-40B4-BE49-F238E27FC236}">
+                  <a16:creationId xmlns:a16="http://schemas.microsoft.com/office/drawing/2014/main" id="{BB0B65EA-ACB0-4F3D-96BE-DC8EB96A759C}"/>
+                </a:ext>
+                <a:ext uri="{C183D7F6-B498-43B3-948B-1728B52AA6E4}">
+                  <adec:decorative xmlns:adec="http://schemas.microsoft.com/office/drawing/2017/decorative" val="1"/>
+                </a:ext>
+              </a:extLst>
+            </p:cNvPr>
+            <p:cNvSpPr/>
+            <p:nvPr>
+              <p:extLst>
+                <p:ext uri="{386F3935-93C4-4BCD-93E2-E3B085C9AB24}">
+                  <p16:designElem xmlns:p16="http://schemas.microsoft.com/office/powerpoint/2015/main" val="1"/>
+                </p:ext>
+              </p:extLst>
+            </p:nvPr>
+          </p:nvSpPr>
+          <p:spPr>
+            <a:xfrm>
+              <a:off x="8355862" y="556562"/>
+              <a:ext cx="2681635" cy="2681635"/>
+            </a:xfrm>
+            <a:custGeom>
+              <a:avLst/>
+              <a:gdLst>
+                <a:gd name="connsiteX0" fmla="*/ 6861546 w 6861545"/>
+                <a:gd name="connsiteY0" fmla="*/ 6861546 h 6861545"/>
+                <a:gd name="connsiteX1" fmla="*/ 3435812 w 6861545"/>
+                <a:gd name="connsiteY1" fmla="*/ 6861546 h 6861545"/>
+                <a:gd name="connsiteX2" fmla="*/ 0 w 6861545"/>
+                <a:gd name="connsiteY2" fmla="*/ 3425734 h 6861545"/>
+                <a:gd name="connsiteX3" fmla="*/ 0 w 6861545"/>
+                <a:gd name="connsiteY3" fmla="*/ 0 h 6861545"/>
+                <a:gd name="connsiteX4" fmla="*/ 3425734 w 6861545"/>
+                <a:gd name="connsiteY4" fmla="*/ 0 h 6861545"/>
+                <a:gd name="connsiteX5" fmla="*/ 6861546 w 6861545"/>
+                <a:gd name="connsiteY5" fmla="*/ 3435812 h 6861545"/>
+                <a:gd name="connsiteX6" fmla="*/ 6861546 w 6861545"/>
+                <a:gd name="connsiteY6" fmla="*/ 6861546 h 6861545"/>
+              </a:gdLst>
+              <a:ahLst/>
+              <a:cxnLst>
+                <a:cxn ang="0">
+                  <a:pos x="connsiteX0" y="connsiteY0"/>
+                </a:cxn>
+                <a:cxn ang="0">
+                  <a:pos x="connsiteX1" y="connsiteY1"/>
+                </a:cxn>
+                <a:cxn ang="0">
+                  <a:pos x="connsiteX2" y="connsiteY2"/>
+                </a:cxn>
+                <a:cxn ang="0">
+                  <a:pos x="connsiteX3" y="connsiteY3"/>
+                </a:cxn>
+                <a:cxn ang="0">
+                  <a:pos x="connsiteX4" y="connsiteY4"/>
+                </a:cxn>
+                <a:cxn ang="0">
+                  <a:pos x="connsiteX5" y="connsiteY5"/>
+                </a:cxn>
+                <a:cxn ang="0">
+                  <a:pos x="connsiteX6" y="connsiteY6"/>
+                </a:cxn>
+              </a:cxnLst>
+              <a:rect l="l" t="t" r="r" b="b"/>
+              <a:pathLst>
+                <a:path w="6861545" h="6861545">
+                  <a:moveTo>
+                    <a:pt x="6861546" y="6861546"/>
+                  </a:moveTo>
+                  <a:lnTo>
+                    <a:pt x="3435812" y="6861546"/>
+                  </a:lnTo>
+                  <a:cubicBezTo>
+                    <a:pt x="1538245" y="6861546"/>
+                    <a:pt x="0" y="5323301"/>
+                    <a:pt x="0" y="3425734"/>
+                  </a:cubicBezTo>
+                  <a:lnTo>
+                    <a:pt x="0" y="0"/>
+                  </a:lnTo>
+                  <a:lnTo>
+                    <a:pt x="3425734" y="0"/>
+                  </a:lnTo>
+                  <a:cubicBezTo>
+                    <a:pt x="5323301" y="0"/>
+                    <a:pt x="6861546" y="1538245"/>
+                    <a:pt x="6861546" y="3435812"/>
+                  </a:cubicBezTo>
+                  <a:lnTo>
+                    <a:pt x="6861546" y="6861546"/>
+                  </a:lnTo>
+                  <a:close/>
+                </a:path>
+              </a:pathLst>
+            </a:custGeom>
+            <a:pattFill prst="pct5">
+              <a:fgClr>
+                <a:schemeClr val="accent4">
+                  <a:lumMod val="60000"/>
+                  <a:lumOff val="40000"/>
+                </a:schemeClr>
+              </a:fgClr>
+              <a:bgClr>
+                <a:schemeClr val="accent1">
+                  <a:lumMod val="75000"/>
+                </a:schemeClr>
+              </a:bgClr>
+            </a:pattFill>
+            <a:ln w="9525" cap="flat">
+              <a:noFill/>
+              <a:prstDash val="solid"/>
+              <a:miter/>
+            </a:ln>
+          </p:spPr>
+          <p:txBody>
+            <a:bodyPr rtlCol="0" anchor="ctr"/>
+            <a:lstStyle/>
+            <a:p>
+              <a:endParaRPr lang="en-US" dirty="0"/>
+            </a:p>
+          </p:txBody>
+        </p:sp>
+        <p:sp>
+          <p:nvSpPr>
+            <p:cNvPr id="19" name="Graphic 9">
+              <a:extLst>
+                <a:ext uri="{FF2B5EF4-FFF2-40B4-BE49-F238E27FC236}">
+                  <a16:creationId xmlns:a16="http://schemas.microsoft.com/office/drawing/2014/main" id="{8D1B1F2F-C82A-4502-A778-98238C1B0C0E}"/>
+                </a:ext>
+                <a:ext uri="{C183D7F6-B498-43B3-948B-1728B52AA6E4}">
+                  <adec:decorative xmlns:adec="http://schemas.microsoft.com/office/drawing/2017/decorative" val="1"/>
+                </a:ext>
+              </a:extLst>
+            </p:cNvPr>
+            <p:cNvSpPr/>
+            <p:nvPr>
+              <p:extLst>
+                <p:ext uri="{386F3935-93C4-4BCD-93E2-E3B085C9AB24}">
+                  <p16:designElem xmlns:p16="http://schemas.microsoft.com/office/powerpoint/2015/main" val="1"/>
+                </p:ext>
+              </p:extLst>
+            </p:nvPr>
+          </p:nvSpPr>
+          <p:spPr>
+            <a:xfrm>
+              <a:off x="7756735" y="12053"/>
+              <a:ext cx="3857958" cy="3875603"/>
+            </a:xfrm>
+            <a:custGeom>
+              <a:avLst/>
+              <a:gdLst>
+                <a:gd name="connsiteX0" fmla="*/ 6861546 w 6861545"/>
+                <a:gd name="connsiteY0" fmla="*/ 6861546 h 6861545"/>
+                <a:gd name="connsiteX1" fmla="*/ 3435812 w 6861545"/>
+                <a:gd name="connsiteY1" fmla="*/ 6861546 h 6861545"/>
+                <a:gd name="connsiteX2" fmla="*/ 0 w 6861545"/>
+                <a:gd name="connsiteY2" fmla="*/ 3425734 h 6861545"/>
+                <a:gd name="connsiteX3" fmla="*/ 0 w 6861545"/>
+                <a:gd name="connsiteY3" fmla="*/ 0 h 6861545"/>
+                <a:gd name="connsiteX4" fmla="*/ 3425734 w 6861545"/>
+                <a:gd name="connsiteY4" fmla="*/ 0 h 6861545"/>
+                <a:gd name="connsiteX5" fmla="*/ 6861546 w 6861545"/>
+                <a:gd name="connsiteY5" fmla="*/ 3435812 h 6861545"/>
+                <a:gd name="connsiteX6" fmla="*/ 6861546 w 6861545"/>
+                <a:gd name="connsiteY6" fmla="*/ 6861546 h 6861545"/>
+              </a:gdLst>
+              <a:ahLst/>
+              <a:cxnLst>
+                <a:cxn ang="0">
+                  <a:pos x="connsiteX0" y="connsiteY0"/>
+                </a:cxn>
+                <a:cxn ang="0">
+                  <a:pos x="connsiteX1" y="connsiteY1"/>
+                </a:cxn>
+                <a:cxn ang="0">
+                  <a:pos x="connsiteX2" y="connsiteY2"/>
+                </a:cxn>
+                <a:cxn ang="0">
+                  <a:pos x="connsiteX3" y="connsiteY3"/>
+                </a:cxn>
+                <a:cxn ang="0">
+                  <a:pos x="connsiteX4" y="connsiteY4"/>
+                </a:cxn>
+                <a:cxn ang="0">
+                  <a:pos x="connsiteX5" y="connsiteY5"/>
+                </a:cxn>
+                <a:cxn ang="0">
+                  <a:pos x="connsiteX6" y="connsiteY6"/>
+                </a:cxn>
+              </a:cxnLst>
+              <a:rect l="l" t="t" r="r" b="b"/>
+              <a:pathLst>
+                <a:path w="6861545" h="6861545">
+                  <a:moveTo>
+                    <a:pt x="6861546" y="6861546"/>
+                  </a:moveTo>
+                  <a:lnTo>
+                    <a:pt x="3435812" y="6861546"/>
+                  </a:lnTo>
+                  <a:cubicBezTo>
+                    <a:pt x="1538245" y="6861546"/>
+                    <a:pt x="0" y="5323301"/>
+                    <a:pt x="0" y="3425734"/>
+                  </a:cubicBezTo>
+                  <a:lnTo>
+                    <a:pt x="0" y="0"/>
+                  </a:lnTo>
+                  <a:lnTo>
+                    <a:pt x="3425734" y="0"/>
+                  </a:lnTo>
+                  <a:cubicBezTo>
+                    <a:pt x="5323301" y="0"/>
+                    <a:pt x="6861546" y="1538245"/>
+                    <a:pt x="6861546" y="3435812"/>
+                  </a:cubicBezTo>
+                  <a:lnTo>
+                    <a:pt x="6861546" y="6861546"/>
+                  </a:lnTo>
+                  <a:close/>
+                </a:path>
+              </a:pathLst>
+            </a:custGeom>
+            <a:solidFill>
+              <a:srgbClr val="FFFFFF"/>
+            </a:solidFill>
+            <a:ln w="38100" cap="flat">
+              <a:solidFill>
+                <a:srgbClr val="F7F7F7"/>
+              </a:solidFill>
+              <a:prstDash val="solid"/>
+              <a:miter/>
+            </a:ln>
+          </p:spPr>
+          <p:txBody>
+            <a:bodyPr rtlCol="0" anchor="ctr"/>
+            <a:lstStyle/>
+            <a:p>
+              <a:endParaRPr lang="en-US" dirty="0"/>
+            </a:p>
+          </p:txBody>
+        </p:sp>
+      </p:grpSp>
+      <p:sp>
+        <p:nvSpPr>
+          <p:cNvPr id="21" name="Texture">
+            <a:extLst>
+              <a:ext uri="{FF2B5EF4-FFF2-40B4-BE49-F238E27FC236}">
+                <a16:creationId xmlns:a16="http://schemas.microsoft.com/office/drawing/2014/main" id="{1A4066CF-83FA-4BF2-8618-AD3CF2DCEE2D}"/>
+              </a:ext>
+              <a:ext uri="{C183D7F6-B498-43B3-948B-1728B52AA6E4}">
+                <adec:decorative xmlns:adec="http://schemas.microsoft.com/office/drawing/2017/decorative" val="1"/>
+              </a:ext>
+            </a:extLst>
+          </p:cNvPr>
+          <p:cNvSpPr>
+            <a:spLocks noGrp="1" noRot="1" noChangeAspect="1" noMove="1" noResize="1" noEditPoints="1" noAdjustHandles="1" noChangeArrowheads="1" noChangeShapeType="1" noTextEdit="1"/>
+          </p:cNvSpPr>
+          <p:nvPr>
+            <p:extLst>
+              <p:ext uri="{386F3935-93C4-4BCD-93E2-E3B085C9AB24}">
+                <p16:designElem xmlns:p16="http://schemas.microsoft.com/office/powerpoint/2015/main" val="1"/>
+              </p:ext>
+            </p:extLst>
+          </p:nvPr>
+        </p:nvSpPr>
+        <p:spPr>
+          <a:xfrm>
+            <a:off x="-3048" y="0"/>
+            <a:ext cx="12188952" cy="6858000"/>
+          </a:xfrm>
+          <a:prstGeom prst="rect">
+            <a:avLst/>
+          </a:prstGeom>
+          <a:blipFill dpi="0" rotWithShape="1">
+            <a:blip r:embed="rId2">
+              <a:alphaModFix amt="6000"/>
+            </a:blip>
+            <a:srcRect/>
+            <a:tile tx="0" ty="0" sx="100000" sy="100000" flip="none" algn="tl"/>
+          </a:blipFill>
+          <a:ln w="9525" cap="flat">
+            <a:noFill/>
+            <a:prstDash val="solid"/>
+            <a:miter/>
+          </a:ln>
+        </p:spPr>
+        <p:txBody>
+          <a:bodyPr rtlCol="0" anchor="ctr"/>
+          <a:lstStyle/>
+          <a:p>
+            <a:endParaRPr lang="en-US" dirty="0"/>
+          </a:p>
+        </p:txBody>
+      </p:sp>
+      <p:sp>
+        <p:nvSpPr>
+          <p:cNvPr id="2" name="Title 1">
+            <a:extLst>
+              <a:ext uri="{FF2B5EF4-FFF2-40B4-BE49-F238E27FC236}">
+                <a16:creationId xmlns:a16="http://schemas.microsoft.com/office/drawing/2014/main" id="{52C75A07-70F2-42F6-9632-0873C4C47A49}"/>
+              </a:ext>
+            </a:extLst>
+          </p:cNvPr>
+          <p:cNvSpPr>
+            <a:spLocks noGrp="1"/>
+          </p:cNvSpPr>
+          <p:nvPr>
+            <p:ph type="title"/>
+          </p:nvPr>
+        </p:nvSpPr>
+        <p:spPr>
+          <a:xfrm>
+            <a:off x="457200" y="758952"/>
+            <a:ext cx="6943725" cy="1325563"/>
+          </a:xfrm>
+        </p:spPr>
+        <p:txBody>
+          <a:bodyPr anchor="b">
+            <a:normAutofit/>
+          </a:bodyPr>
+          <a:lstStyle/>
+          <a:p>
+            <a:r>
+              <a:rPr lang="en-US" dirty="0"/>
+              <a:t>Portfolios	</a:t>
+            </a:r>
+          </a:p>
+        </p:txBody>
+      </p:sp>
+      <p:sp>
+        <p:nvSpPr>
+          <p:cNvPr id="3" name="Content Placeholder 2">
+            <a:extLst>
+              <a:ext uri="{FF2B5EF4-FFF2-40B4-BE49-F238E27FC236}">
+                <a16:creationId xmlns:a16="http://schemas.microsoft.com/office/drawing/2014/main" id="{FD3E45F1-1854-4650-83DA-6F57B8EEF2D3}"/>
+              </a:ext>
+            </a:extLst>
+          </p:cNvPr>
+          <p:cNvSpPr>
+            <a:spLocks noGrp="1"/>
+          </p:cNvSpPr>
+          <p:nvPr>
+            <p:ph idx="1"/>
+          </p:nvPr>
+        </p:nvSpPr>
+        <p:spPr>
+          <a:xfrm>
+            <a:off x="457200" y="2286000"/>
+            <a:ext cx="6943725" cy="3875603"/>
+          </a:xfrm>
+        </p:spPr>
+        <p:txBody>
+          <a:bodyPr>
+            <a:normAutofit/>
+          </a:bodyPr>
+          <a:lstStyle/>
+          <a:p>
+            <a:r>
+              <a:rPr lang="en-US" dirty="0"/>
+              <a:t>Hand picked by the team.</a:t>
+            </a:r>
+          </a:p>
+          <a:p>
+            <a:r>
+              <a:rPr lang="en-US" dirty="0"/>
+              <a:t>The goal is to create a well-rounded portfolio for the user</a:t>
+            </a:r>
+          </a:p>
+          <a:p>
+            <a:r>
+              <a:rPr lang="en-US" dirty="0"/>
+              <a:t>An easy way to get integrated with Crypto</a:t>
+            </a:r>
+          </a:p>
+          <a:p>
+            <a:r>
+              <a:rPr lang="en-US" dirty="0"/>
+              <a:t>The portfolios are based off of risk tolerance of the user. </a:t>
+            </a:r>
+          </a:p>
+          <a:p>
+            <a:r>
+              <a:rPr lang="en-US" dirty="0"/>
+              <a:t>Starting from a no risk, pure bond, to a high-risk using stocks and crypto currencies</a:t>
+            </a:r>
+          </a:p>
+        </p:txBody>
+      </p:sp>
+      <p:pic>
+        <p:nvPicPr>
+          <p:cNvPr id="4" name="Picture 3">
+            <a:extLst>
+              <a:ext uri="{FF2B5EF4-FFF2-40B4-BE49-F238E27FC236}">
+                <a16:creationId xmlns:a16="http://schemas.microsoft.com/office/drawing/2014/main" id="{146B1B05-65DC-4FB0-8335-79C989AEDAA3}"/>
+              </a:ext>
+            </a:extLst>
+          </p:cNvPr>
+          <p:cNvPicPr>
+            <a:picLocks noChangeAspect="1"/>
+          </p:cNvPicPr>
+          <p:nvPr/>
+        </p:nvPicPr>
+        <p:blipFill>
+          <a:blip r:embed="rId3"/>
+          <a:stretch>
+            <a:fillRect/>
+          </a:stretch>
+        </p:blipFill>
+        <p:spPr>
+          <a:xfrm>
+            <a:off x="8980190" y="725850"/>
+            <a:ext cx="1633866" cy="2625125"/>
+          </a:xfrm>
+          <a:prstGeom prst="rect">
+            <a:avLst/>
+          </a:prstGeom>
+        </p:spPr>
+      </p:pic>
+    </p:spTree>
+    <p:extLst>
+      <p:ext uri="{BB962C8B-B14F-4D97-AF65-F5344CB8AC3E}">
+        <p14:creationId xmlns:p14="http://schemas.microsoft.com/office/powerpoint/2010/main" val="3244771359"/>
+      </p:ext>
+    </p:extLst>
+  </p:cSld>
+  <p:clrMapOvr>
+    <a:masterClrMapping/>
+  </p:clrMapOvr>
+</p:sld>
+</file>
+
+<file path=ppt/slides/slide5.xml><?xml version="1.0" encoding="utf-8"?>
+<p:sld xmlns:a="http://schemas.openxmlformats.org/drawingml/2006/main" xmlns:r="http://schemas.openxmlformats.org/officeDocument/2006/relationships" xmlns:p="http://schemas.openxmlformats.org/presentationml/2006/main">
+  <p:cSld>
+    <p:bg>
+      <p:bgPr>
+        <a:solidFill>
+          <a:schemeClr val="bg2"/>
+        </a:solidFill>
+        <a:effectLst/>
+      </p:bgPr>
+    </p:bg>
+    <p:spTree>
+      <p:nvGrpSpPr>
+        <p:cNvPr id="1" name=""/>
+        <p:cNvGrpSpPr/>
+        <p:nvPr/>
+      </p:nvGrpSpPr>
+      <p:grpSpPr>
+        <a:xfrm>
+          <a:off x="0" y="0"/>
+          <a:ext cx="0" cy="0"/>
+          <a:chOff x="0" y="0"/>
+          <a:chExt cx="0" cy="0"/>
+        </a:xfrm>
+      </p:grpSpPr>
+      <p:sp useBgFill="1">
+        <p:nvSpPr>
+          <p:cNvPr id="9" name="Background Fill">
+            <a:extLst>
+              <a:ext uri="{FF2B5EF4-FFF2-40B4-BE49-F238E27FC236}">
+                <a16:creationId xmlns:a16="http://schemas.microsoft.com/office/drawing/2014/main" id="{FAFB3478-4AEC-431E-93B2-1593839C16DA}"/>
+              </a:ext>
+              <a:ext uri="{C183D7F6-B498-43B3-948B-1728B52AA6E4}">
+                <adec:decorative xmlns:adec="http://schemas.microsoft.com/office/drawing/2017/decorative" val="1"/>
+              </a:ext>
+            </a:extLst>
+          </p:cNvPr>
+          <p:cNvSpPr>
+            <a:spLocks noGrp="1" noRot="1" noChangeAspect="1" noMove="1" noResize="1" noEditPoints="1" noAdjustHandles="1" noChangeArrowheads="1" noChangeShapeType="1" noTextEdit="1"/>
+          </p:cNvSpPr>
+          <p:nvPr>
+            <p:extLst>
+              <p:ext uri="{386F3935-93C4-4BCD-93E2-E3B085C9AB24}">
+                <p16:designElem xmlns:p16="http://schemas.microsoft.com/office/powerpoint/2015/main" val="1"/>
+              </p:ext>
+            </p:extLst>
+          </p:nvPr>
+        </p:nvSpPr>
+        <p:spPr>
+          <a:xfrm>
+            <a:off x="0" y="0"/>
+            <a:ext cx="12192000" cy="6858000"/>
+          </a:xfrm>
+          <a:prstGeom prst="rect">
+            <a:avLst/>
+          </a:prstGeom>
+          <a:ln w="9525" cap="flat">
+            <a:noFill/>
+            <a:prstDash val="solid"/>
+            <a:miter/>
+          </a:ln>
+        </p:spPr>
+        <p:txBody>
+          <a:bodyPr rtlCol="0" anchor="ctr"/>
+          <a:lstStyle/>
+          <a:p>
+            <a:endParaRPr lang="en-US">
+              <a:solidFill>
+                <a:schemeClr val="tx1"/>
+              </a:solidFill>
+            </a:endParaRPr>
+          </a:p>
+        </p:txBody>
+      </p:sp>
+      <p:sp>
+        <p:nvSpPr>
+          <p:cNvPr id="11" name="Color Fill">
+            <a:extLst>
+              <a:ext uri="{FF2B5EF4-FFF2-40B4-BE49-F238E27FC236}">
+                <a16:creationId xmlns:a16="http://schemas.microsoft.com/office/drawing/2014/main" id="{A8A68745-355E-4D81-AA5F-942C71082A1E}"/>
+              </a:ext>
+              <a:ext uri="{C183D7F6-B498-43B3-948B-1728B52AA6E4}">
+                <adec:decorative xmlns:adec="http://schemas.microsoft.com/office/drawing/2017/decorative" val="1"/>
+              </a:ext>
+            </a:extLst>
+          </p:cNvPr>
+          <p:cNvSpPr>
+            <a:spLocks noGrp="1" noRot="1" noChangeAspect="1" noMove="1" noResize="1" noEditPoints="1" noAdjustHandles="1" noChangeArrowheads="1" noChangeShapeType="1" noTextEdit="1"/>
+          </p:cNvSpPr>
+          <p:nvPr>
+            <p:extLst>
+              <p:ext uri="{386F3935-93C4-4BCD-93E2-E3B085C9AB24}">
+                <p16:designElem xmlns:p16="http://schemas.microsoft.com/office/powerpoint/2015/main" val="1"/>
+              </p:ext>
+            </p:extLst>
+          </p:nvPr>
+        </p:nvSpPr>
+        <p:spPr>
+          <a:xfrm>
+            <a:off x="0" y="0"/>
+            <a:ext cx="12188952" cy="6858000"/>
+          </a:xfrm>
+          <a:prstGeom prst="rect">
+            <a:avLst/>
+          </a:prstGeom>
+          <a:solidFill>
+            <a:schemeClr val="bg2">
+              <a:lumMod val="75000"/>
+              <a:lumOff val="25000"/>
+              <a:alpha val="40000"/>
+            </a:schemeClr>
+          </a:solidFill>
+          <a:ln w="9525" cap="flat">
+            <a:noFill/>
+            <a:prstDash val="solid"/>
+            <a:miter/>
+          </a:ln>
+        </p:spPr>
+        <p:txBody>
+          <a:bodyPr rtlCol="0" anchor="ctr"/>
+          <a:lstStyle/>
+          <a:p>
+            <a:endParaRPr lang="en-US" dirty="0">
+              <a:solidFill>
+                <a:schemeClr val="bg2">
+                  <a:lumMod val="75000"/>
+                  <a:lumOff val="25000"/>
+                </a:schemeClr>
+              </a:solidFill>
+            </a:endParaRPr>
+          </a:p>
+        </p:txBody>
+      </p:sp>
+      <p:grpSp>
+        <p:nvGrpSpPr>
+          <p:cNvPr id="13" name="Group 12">
+            <a:extLst>
+              <a:ext uri="{FF2B5EF4-FFF2-40B4-BE49-F238E27FC236}">
+                <a16:creationId xmlns:a16="http://schemas.microsoft.com/office/drawing/2014/main" id="{ACFFE4B1-0C8D-42AF-8708-9452BBC0F4DE}"/>
+              </a:ext>
+              <a:ext uri="{C183D7F6-B498-43B3-948B-1728B52AA6E4}">
+                <adec:decorative xmlns:adec="http://schemas.microsoft.com/office/drawing/2017/decorative" val="1"/>
+              </a:ext>
+            </a:extLst>
+          </p:cNvPr>
+          <p:cNvGrpSpPr>
+            <a:grpSpLocks noGrp="1" noUngrp="1" noRot="1" noChangeAspect="1" noMove="1" noResize="1"/>
+          </p:cNvGrpSpPr>
+          <p:nvPr>
+            <p:extLst>
+              <p:ext uri="{386F3935-93C4-4BCD-93E2-E3B085C9AB24}">
+                <p16:designElem xmlns:p16="http://schemas.microsoft.com/office/powerpoint/2015/main" val="1"/>
+              </p:ext>
+            </p:extLst>
+          </p:nvPr>
+        </p:nvGrpSpPr>
+        <p:grpSpPr>
+          <a:xfrm>
+            <a:off x="6968058" y="0"/>
+            <a:ext cx="4842451" cy="6290051"/>
+            <a:chOff x="6968058" y="0"/>
+            <a:chExt cx="4842451" cy="6290051"/>
+          </a:xfrm>
+        </p:grpSpPr>
+        <p:sp>
+          <p:nvSpPr>
+            <p:cNvPr id="14" name="Oval 13">
+              <a:extLst>
+                <a:ext uri="{FF2B5EF4-FFF2-40B4-BE49-F238E27FC236}">
+                  <a16:creationId xmlns:a16="http://schemas.microsoft.com/office/drawing/2014/main" id="{F2640A5D-6AAA-4BD0-8F9E-947D32E86AF3}"/>
+                </a:ext>
+                <a:ext uri="{C183D7F6-B498-43B3-948B-1728B52AA6E4}">
+                  <adec:decorative xmlns:adec="http://schemas.microsoft.com/office/drawing/2017/decorative" val="1"/>
+                </a:ext>
+              </a:extLst>
+            </p:cNvPr>
+            <p:cNvSpPr/>
+            <p:nvPr>
+              <p:extLst>
+                <p:ext uri="{386F3935-93C4-4BCD-93E2-E3B085C9AB24}">
+                  <p16:designElem xmlns:p16="http://schemas.microsoft.com/office/powerpoint/2015/main" val="1"/>
+                </p:ext>
+              </p:extLst>
+            </p:nvPr>
+          </p:nvSpPr>
+          <p:spPr>
+            <a:xfrm>
+              <a:off x="11202463" y="453951"/>
+              <a:ext cx="608046" cy="608046"/>
+            </a:xfrm>
+            <a:prstGeom prst="ellipse">
+              <a:avLst/>
+            </a:prstGeom>
+            <a:solidFill>
+              <a:schemeClr val="accent1">
+                <a:lumMod val="60000"/>
+                <a:lumOff val="40000"/>
+                <a:alpha val="60000"/>
+              </a:schemeClr>
+            </a:solidFill>
+            <a:ln w="9331" cap="flat">
+              <a:noFill/>
+              <a:prstDash val="solid"/>
+              <a:miter/>
+            </a:ln>
+          </p:spPr>
+          <p:txBody>
+            <a:bodyPr rtlCol="0" anchor="ctr"/>
+            <a:lstStyle/>
+            <a:p>
+              <a:endParaRPr lang="en-US">
+                <a:solidFill>
+                  <a:schemeClr val="tx1"/>
+                </a:solidFill>
+              </a:endParaRPr>
+            </a:p>
+          </p:txBody>
+        </p:sp>
+        <p:sp>
+          <p:nvSpPr>
+            <p:cNvPr id="15" name="Graphic 18">
+              <a:extLst>
+                <a:ext uri="{FF2B5EF4-FFF2-40B4-BE49-F238E27FC236}">
+                  <a16:creationId xmlns:a16="http://schemas.microsoft.com/office/drawing/2014/main" id="{5004930C-818C-41BC-8346-DD8A8AA56ECA}"/>
+                </a:ext>
+                <a:ext uri="{C183D7F6-B498-43B3-948B-1728B52AA6E4}">
+                  <adec:decorative xmlns:adec="http://schemas.microsoft.com/office/drawing/2017/decorative" val="1"/>
+                </a:ext>
+              </a:extLst>
+            </p:cNvPr>
+            <p:cNvSpPr/>
+            <p:nvPr>
+              <p:extLst>
+                <p:ext uri="{386F3935-93C4-4BCD-93E2-E3B085C9AB24}">
+                  <p16:designElem xmlns:p16="http://schemas.microsoft.com/office/powerpoint/2015/main" val="1"/>
+                </p:ext>
+              </p:extLst>
+            </p:nvPr>
+          </p:nvSpPr>
+          <p:spPr>
+            <a:xfrm rot="3600000">
+              <a:off x="7192513" y="5208982"/>
+              <a:ext cx="856614" cy="1305524"/>
+            </a:xfrm>
+            <a:custGeom>
+              <a:avLst/>
+              <a:gdLst>
+                <a:gd name="connsiteX0" fmla="*/ 3413379 w 3413378"/>
+                <a:gd name="connsiteY0" fmla="*/ 3266028 h 6532054"/>
+                <a:gd name="connsiteX1" fmla="*/ 1706689 w 3413378"/>
+                <a:gd name="connsiteY1" fmla="*/ 6532055 h 6532054"/>
+                <a:gd name="connsiteX2" fmla="*/ 0 w 3413378"/>
+                <a:gd name="connsiteY2" fmla="*/ 3266028 h 6532054"/>
+                <a:gd name="connsiteX3" fmla="*/ 1706689 w 3413378"/>
+                <a:gd name="connsiteY3" fmla="*/ 0 h 6532054"/>
+                <a:gd name="connsiteX4" fmla="*/ 3413379 w 3413378"/>
+                <a:gd name="connsiteY4" fmla="*/ 3266028 h 6532054"/>
+              </a:gdLst>
+              <a:ahLst/>
+              <a:cxnLst>
+                <a:cxn ang="0">
+                  <a:pos x="connsiteX0" y="connsiteY0"/>
+                </a:cxn>
+                <a:cxn ang="0">
+                  <a:pos x="connsiteX1" y="connsiteY1"/>
+                </a:cxn>
+                <a:cxn ang="0">
+                  <a:pos x="connsiteX2" y="connsiteY2"/>
+                </a:cxn>
+                <a:cxn ang="0">
+                  <a:pos x="connsiteX3" y="connsiteY3"/>
+                </a:cxn>
+                <a:cxn ang="0">
+                  <a:pos x="connsiteX4" y="connsiteY4"/>
+                </a:cxn>
+              </a:cxnLst>
+              <a:rect l="l" t="t" r="r" b="b"/>
+              <a:pathLst>
+                <a:path w="3413378" h="6532054">
+                  <a:moveTo>
+                    <a:pt x="3413379" y="3266028"/>
+                  </a:moveTo>
+                  <a:cubicBezTo>
+                    <a:pt x="3413379" y="5069777"/>
+                    <a:pt x="1706689" y="6532055"/>
+                    <a:pt x="1706689" y="6532055"/>
+                  </a:cubicBezTo>
+                  <a:cubicBezTo>
+                    <a:pt x="1706689" y="6532055"/>
+                    <a:pt x="0" y="5069777"/>
+                    <a:pt x="0" y="3266028"/>
+                  </a:cubicBezTo>
+                  <a:cubicBezTo>
+                    <a:pt x="0" y="1462278"/>
+                    <a:pt x="1706689" y="0"/>
+                    <a:pt x="1706689" y="0"/>
+                  </a:cubicBezTo>
+                  <a:cubicBezTo>
+                    <a:pt x="1706689" y="0"/>
+                    <a:pt x="3413379" y="1462278"/>
+                    <a:pt x="3413379" y="3266028"/>
+                  </a:cubicBezTo>
+                  <a:close/>
+                </a:path>
+              </a:pathLst>
+            </a:custGeom>
+            <a:pattFill prst="pct5">
+              <a:fgClr>
+                <a:schemeClr val="accent4">
+                  <a:lumMod val="60000"/>
+                  <a:lumOff val="40000"/>
+                </a:schemeClr>
+              </a:fgClr>
+              <a:bgClr>
+                <a:schemeClr val="accent1">
+                  <a:lumMod val="75000"/>
+                </a:schemeClr>
+              </a:bgClr>
+            </a:pattFill>
+            <a:ln w="9525" cap="flat">
+              <a:noFill/>
+              <a:prstDash val="solid"/>
+              <a:miter/>
+            </a:ln>
+          </p:spPr>
+          <p:txBody>
+            <a:bodyPr rtlCol="0" anchor="ctr"/>
+            <a:lstStyle/>
+            <a:p>
+              <a:endParaRPr lang="en-US"/>
+            </a:p>
+          </p:txBody>
+        </p:sp>
+        <p:sp>
+          <p:nvSpPr>
+            <p:cNvPr id="16" name="Oval 15">
+              <a:extLst>
+                <a:ext uri="{FF2B5EF4-FFF2-40B4-BE49-F238E27FC236}">
+                  <a16:creationId xmlns:a16="http://schemas.microsoft.com/office/drawing/2014/main" id="{F2150E4F-A492-4FF2-A7B7-3275EAEDDADC}"/>
+                </a:ext>
+                <a:ext uri="{C183D7F6-B498-43B3-948B-1728B52AA6E4}">
+                  <adec:decorative xmlns:adec="http://schemas.microsoft.com/office/drawing/2017/decorative" val="1"/>
+                </a:ext>
+              </a:extLst>
+            </p:cNvPr>
+            <p:cNvSpPr/>
+            <p:nvPr>
+              <p:extLst>
+                <p:ext uri="{386F3935-93C4-4BCD-93E2-E3B085C9AB24}">
+                  <p16:designElem xmlns:p16="http://schemas.microsoft.com/office/powerpoint/2015/main" val="1"/>
+                </p:ext>
+              </p:extLst>
+            </p:nvPr>
+          </p:nvSpPr>
+          <p:spPr>
+            <a:xfrm>
+              <a:off x="7028124" y="4672162"/>
+              <a:ext cx="256132" cy="256132"/>
+            </a:xfrm>
+            <a:prstGeom prst="ellipse">
+              <a:avLst/>
+            </a:prstGeom>
+            <a:solidFill>
+              <a:schemeClr val="accent5"/>
+            </a:solidFill>
+            <a:ln>
+              <a:noFill/>
+            </a:ln>
+          </p:spPr>
+          <p:style>
+            <a:lnRef idx="2">
+              <a:schemeClr val="accent1">
+                <a:shade val="50000"/>
+              </a:schemeClr>
+            </a:lnRef>
+            <a:fillRef idx="1">
+              <a:schemeClr val="accent1"/>
+            </a:fillRef>
+            <a:effectRef idx="0">
+              <a:schemeClr val="accent1"/>
+            </a:effectRef>
+            <a:fontRef idx="minor">
+              <a:schemeClr val="lt1"/>
+            </a:fontRef>
+          </p:style>
+          <p:txBody>
+            <a:bodyPr rtlCol="0" anchor="ctr"/>
+            <a:lstStyle/>
+            <a:p>
+              <a:pPr algn="ctr"/>
+              <a:endParaRPr lang="en-US"/>
+            </a:p>
+          </p:txBody>
+        </p:sp>
+        <p:sp>
+          <p:nvSpPr>
+            <p:cNvPr id="17" name="Freeform: Shape 16">
+              <a:extLst>
+                <a:ext uri="{FF2B5EF4-FFF2-40B4-BE49-F238E27FC236}">
+                  <a16:creationId xmlns:a16="http://schemas.microsoft.com/office/drawing/2014/main" id="{178181CF-FD84-4C33-A523-4227DD0AB883}"/>
+                </a:ext>
+                <a:ext uri="{C183D7F6-B498-43B3-948B-1728B52AA6E4}">
+                  <adec:decorative xmlns:adec="http://schemas.microsoft.com/office/drawing/2017/decorative" val="1"/>
+                </a:ext>
+              </a:extLst>
+            </p:cNvPr>
+            <p:cNvSpPr/>
+            <p:nvPr>
+              <p:extLst>
+                <p:ext uri="{386F3935-93C4-4BCD-93E2-E3B085C9AB24}">
+                  <p16:designElem xmlns:p16="http://schemas.microsoft.com/office/powerpoint/2015/main" val="1"/>
+                </p:ext>
+              </p:extLst>
+            </p:nvPr>
+          </p:nvSpPr>
+          <p:spPr>
+            <a:xfrm>
+              <a:off x="7300707" y="0"/>
+              <a:ext cx="3721476" cy="1682047"/>
+            </a:xfrm>
+            <a:custGeom>
+              <a:avLst/>
+              <a:gdLst>
+                <a:gd name="connsiteX0" fmla="*/ 0 w 3721476"/>
+                <a:gd name="connsiteY0" fmla="*/ 0 h 1682047"/>
+                <a:gd name="connsiteX1" fmla="*/ 3721476 w 3721476"/>
+                <a:gd name="connsiteY1" fmla="*/ 0 h 1682047"/>
+                <a:gd name="connsiteX2" fmla="*/ 3721230 w 3721476"/>
+                <a:gd name="connsiteY2" fmla="*/ 4881 h 1682047"/>
+                <a:gd name="connsiteX3" fmla="*/ 1862697 w 3721476"/>
+                <a:gd name="connsiteY3" fmla="*/ 1682047 h 1682047"/>
+                <a:gd name="connsiteX4" fmla="*/ 0 w 3721476"/>
+                <a:gd name="connsiteY4" fmla="*/ 1682047 h 1682047"/>
+              </a:gdLst>
+              <a:ahLst/>
+              <a:cxnLst>
+                <a:cxn ang="0">
+                  <a:pos x="connsiteX0" y="connsiteY0"/>
+                </a:cxn>
+                <a:cxn ang="0">
+                  <a:pos x="connsiteX1" y="connsiteY1"/>
+                </a:cxn>
+                <a:cxn ang="0">
+                  <a:pos x="connsiteX2" y="connsiteY2"/>
+                </a:cxn>
+                <a:cxn ang="0">
+                  <a:pos x="connsiteX3" y="connsiteY3"/>
+                </a:cxn>
+                <a:cxn ang="0">
+                  <a:pos x="connsiteX4" y="connsiteY4"/>
+                </a:cxn>
+              </a:cxnLst>
+              <a:rect l="l" t="t" r="r" b="b"/>
+              <a:pathLst>
+                <a:path w="3721476" h="1682047">
+                  <a:moveTo>
+                    <a:pt x="0" y="0"/>
+                  </a:moveTo>
+                  <a:lnTo>
+                    <a:pt x="3721476" y="0"/>
+                  </a:lnTo>
+                  <a:lnTo>
+                    <a:pt x="3721230" y="4881"/>
+                  </a:lnTo>
+                  <a:cubicBezTo>
+                    <a:pt x="3625562" y="946929"/>
+                    <a:pt x="2829989" y="1682047"/>
+                    <a:pt x="1862697" y="1682047"/>
+                  </a:cubicBezTo>
+                  <a:lnTo>
+                    <a:pt x="0" y="1682047"/>
+                  </a:lnTo>
+                  <a:close/>
+                </a:path>
+              </a:pathLst>
+            </a:custGeom>
+            <a:solidFill>
+              <a:schemeClr val="accent1">
+                <a:alpha val="60000"/>
+              </a:schemeClr>
+            </a:solidFill>
+            <a:ln w="9331" cap="flat">
+              <a:noFill/>
+              <a:prstDash val="solid"/>
+              <a:miter/>
+            </a:ln>
+          </p:spPr>
+          <p:txBody>
+            <a:bodyPr rtlCol="0" anchor="ctr"/>
+            <a:lstStyle/>
+            <a:p>
+              <a:endParaRPr lang="en-US"/>
+            </a:p>
+          </p:txBody>
+        </p:sp>
+        <p:sp>
+          <p:nvSpPr>
+            <p:cNvPr id="18" name="Freeform: Shape 17">
+              <a:extLst>
+                <a:ext uri="{FF2B5EF4-FFF2-40B4-BE49-F238E27FC236}">
+                  <a16:creationId xmlns:a16="http://schemas.microsoft.com/office/drawing/2014/main" id="{A4291BA4-6012-4E62-9967-AAF860BC23C7}"/>
+                </a:ext>
+                <a:ext uri="{C183D7F6-B498-43B3-948B-1728B52AA6E4}">
+                  <adec:decorative xmlns:adec="http://schemas.microsoft.com/office/drawing/2017/decorative" val="1"/>
+                </a:ext>
+              </a:extLst>
+            </p:cNvPr>
+            <p:cNvSpPr/>
+            <p:nvPr>
+              <p:extLst>
+                <p:ext uri="{386F3935-93C4-4BCD-93E2-E3B085C9AB24}">
+                  <p16:designElem xmlns:p16="http://schemas.microsoft.com/office/powerpoint/2015/main" val="1"/>
+                </p:ext>
+              </p:extLst>
+            </p:nvPr>
+          </p:nvSpPr>
+          <p:spPr>
+            <a:xfrm>
+              <a:off x="7494494" y="0"/>
+              <a:ext cx="3281081" cy="1452282"/>
+            </a:xfrm>
+            <a:custGeom>
+              <a:avLst/>
+              <a:gdLst>
+                <a:gd name="connsiteX0" fmla="*/ 0 w 2872279"/>
+                <a:gd name="connsiteY0" fmla="*/ 0 h 1183937"/>
+                <a:gd name="connsiteX1" fmla="*/ 2872279 w 2872279"/>
+                <a:gd name="connsiteY1" fmla="*/ 0 h 1183937"/>
+                <a:gd name="connsiteX2" fmla="*/ 2868418 w 2872279"/>
+                <a:gd name="connsiteY2" fmla="*/ 25304 h 1183937"/>
+                <a:gd name="connsiteX3" fmla="*/ 1446821 w 2872279"/>
+                <a:gd name="connsiteY3" fmla="*/ 1183937 h 1183937"/>
+                <a:gd name="connsiteX4" fmla="*/ 0 w 2872279"/>
+                <a:gd name="connsiteY4" fmla="*/ 1183937 h 1183937"/>
+              </a:gdLst>
+              <a:ahLst/>
+              <a:cxnLst>
+                <a:cxn ang="0">
+                  <a:pos x="connsiteX0" y="connsiteY0"/>
+                </a:cxn>
+                <a:cxn ang="0">
+                  <a:pos x="connsiteX1" y="connsiteY1"/>
+                </a:cxn>
+                <a:cxn ang="0">
+                  <a:pos x="connsiteX2" y="connsiteY2"/>
+                </a:cxn>
+                <a:cxn ang="0">
+                  <a:pos x="connsiteX3" y="connsiteY3"/>
+                </a:cxn>
+                <a:cxn ang="0">
+                  <a:pos x="connsiteX4" y="connsiteY4"/>
+                </a:cxn>
+              </a:cxnLst>
+              <a:rect l="l" t="t" r="r" b="b"/>
+              <a:pathLst>
+                <a:path w="2872279" h="1183937">
+                  <a:moveTo>
+                    <a:pt x="0" y="0"/>
+                  </a:moveTo>
+                  <a:lnTo>
+                    <a:pt x="2872279" y="0"/>
+                  </a:lnTo>
+                  <a:lnTo>
+                    <a:pt x="2868418" y="25304"/>
+                  </a:lnTo>
+                  <a:cubicBezTo>
+                    <a:pt x="2733112" y="686540"/>
+                    <a:pt x="2148060" y="1183937"/>
+                    <a:pt x="1446821" y="1183937"/>
+                  </a:cubicBezTo>
+                  <a:lnTo>
+                    <a:pt x="0" y="1183937"/>
+                  </a:lnTo>
+                  <a:close/>
+                </a:path>
+              </a:pathLst>
+            </a:custGeom>
+            <a:pattFill prst="pct5">
+              <a:fgClr>
+                <a:schemeClr val="accent4">
+                  <a:lumMod val="60000"/>
+                  <a:lumOff val="40000"/>
+                </a:schemeClr>
+              </a:fgClr>
+              <a:bgClr>
+                <a:schemeClr val="bg2">
+                  <a:lumMod val="75000"/>
+                  <a:lumOff val="25000"/>
+                </a:schemeClr>
+              </a:bgClr>
+            </a:pattFill>
+            <a:ln w="9525" cap="flat">
+              <a:noFill/>
+              <a:prstDash val="solid"/>
+              <a:miter/>
+            </a:ln>
+          </p:spPr>
+          <p:txBody>
+            <a:bodyPr rtlCol="0" anchor="ctr"/>
+            <a:lstStyle/>
+            <a:p>
+              <a:endParaRPr lang="en-US"/>
+            </a:p>
+          </p:txBody>
+        </p:sp>
+        <p:sp>
+          <p:nvSpPr>
+            <p:cNvPr id="19" name="Graphic 9">
+              <a:extLst>
+                <a:ext uri="{FF2B5EF4-FFF2-40B4-BE49-F238E27FC236}">
+                  <a16:creationId xmlns:a16="http://schemas.microsoft.com/office/drawing/2014/main" id="{DB4C2B0A-BA86-462E-AECA-6706FA6C90C8}"/>
+                </a:ext>
+                <a:ext uri="{C183D7F6-B498-43B3-948B-1728B52AA6E4}">
+                  <adec:decorative xmlns:adec="http://schemas.microsoft.com/office/drawing/2017/decorative" val="1"/>
+                </a:ext>
+              </a:extLst>
+            </p:cNvPr>
+            <p:cNvSpPr/>
+            <p:nvPr>
+              <p:extLst>
+                <p:ext uri="{386F3935-93C4-4BCD-93E2-E3B085C9AB24}">
+                  <p16:designElem xmlns:p16="http://schemas.microsoft.com/office/powerpoint/2015/main" val="1"/>
+                </p:ext>
+              </p:extLst>
+            </p:nvPr>
+          </p:nvSpPr>
+          <p:spPr>
+            <a:xfrm>
+              <a:off x="7300707" y="1837752"/>
+              <a:ext cx="4389377" cy="4389374"/>
+            </a:xfrm>
+            <a:custGeom>
+              <a:avLst/>
+              <a:gdLst>
+                <a:gd name="connsiteX0" fmla="*/ 6861546 w 6861545"/>
+                <a:gd name="connsiteY0" fmla="*/ 6861546 h 6861545"/>
+                <a:gd name="connsiteX1" fmla="*/ 3435812 w 6861545"/>
+                <a:gd name="connsiteY1" fmla="*/ 6861546 h 6861545"/>
+                <a:gd name="connsiteX2" fmla="*/ 0 w 6861545"/>
+                <a:gd name="connsiteY2" fmla="*/ 3425734 h 6861545"/>
+                <a:gd name="connsiteX3" fmla="*/ 0 w 6861545"/>
+                <a:gd name="connsiteY3" fmla="*/ 0 h 6861545"/>
+                <a:gd name="connsiteX4" fmla="*/ 3425734 w 6861545"/>
+                <a:gd name="connsiteY4" fmla="*/ 0 h 6861545"/>
+                <a:gd name="connsiteX5" fmla="*/ 6861546 w 6861545"/>
+                <a:gd name="connsiteY5" fmla="*/ 3435812 h 6861545"/>
+                <a:gd name="connsiteX6" fmla="*/ 6861546 w 6861545"/>
+                <a:gd name="connsiteY6" fmla="*/ 6861546 h 6861545"/>
+              </a:gdLst>
+              <a:ahLst/>
+              <a:cxnLst>
+                <a:cxn ang="0">
+                  <a:pos x="connsiteX0" y="connsiteY0"/>
+                </a:cxn>
+                <a:cxn ang="0">
+                  <a:pos x="connsiteX1" y="connsiteY1"/>
+                </a:cxn>
+                <a:cxn ang="0">
+                  <a:pos x="connsiteX2" y="connsiteY2"/>
+                </a:cxn>
+                <a:cxn ang="0">
+                  <a:pos x="connsiteX3" y="connsiteY3"/>
+                </a:cxn>
+                <a:cxn ang="0">
+                  <a:pos x="connsiteX4" y="connsiteY4"/>
+                </a:cxn>
+                <a:cxn ang="0">
+                  <a:pos x="connsiteX5" y="connsiteY5"/>
+                </a:cxn>
+                <a:cxn ang="0">
+                  <a:pos x="connsiteX6" y="connsiteY6"/>
+                </a:cxn>
+              </a:cxnLst>
+              <a:rect l="l" t="t" r="r" b="b"/>
+              <a:pathLst>
+                <a:path w="6861545" h="6861545">
+                  <a:moveTo>
+                    <a:pt x="6861546" y="6861546"/>
+                  </a:moveTo>
+                  <a:lnTo>
+                    <a:pt x="3435812" y="6861546"/>
+                  </a:lnTo>
+                  <a:cubicBezTo>
+                    <a:pt x="1538245" y="6861546"/>
+                    <a:pt x="0" y="5323301"/>
+                    <a:pt x="0" y="3425734"/>
+                  </a:cubicBezTo>
+                  <a:lnTo>
+                    <a:pt x="0" y="0"/>
+                  </a:lnTo>
+                  <a:lnTo>
+                    <a:pt x="3425734" y="0"/>
+                  </a:lnTo>
+                  <a:cubicBezTo>
+                    <a:pt x="5323301" y="0"/>
+                    <a:pt x="6861546" y="1538245"/>
+                    <a:pt x="6861546" y="3435812"/>
+                  </a:cubicBezTo>
+                  <a:lnTo>
+                    <a:pt x="6861546" y="6861546"/>
+                  </a:lnTo>
+                  <a:close/>
+                </a:path>
+              </a:pathLst>
+            </a:custGeom>
+            <a:solidFill>
+              <a:srgbClr val="FFFFFF"/>
+            </a:solidFill>
+            <a:ln w="38100" cap="flat">
+              <a:solidFill>
+                <a:srgbClr val="F7F7F7"/>
+              </a:solidFill>
+              <a:prstDash val="solid"/>
+              <a:miter/>
+            </a:ln>
+          </p:spPr>
+          <p:txBody>
+            <a:bodyPr rtlCol="0" anchor="ctr"/>
+            <a:lstStyle/>
+            <a:p>
+              <a:endParaRPr lang="en-US" dirty="0"/>
+            </a:p>
+          </p:txBody>
+        </p:sp>
+      </p:grpSp>
+      <p:sp>
+        <p:nvSpPr>
+          <p:cNvPr id="21" name="Texture">
+            <a:extLst>
+              <a:ext uri="{FF2B5EF4-FFF2-40B4-BE49-F238E27FC236}">
+                <a16:creationId xmlns:a16="http://schemas.microsoft.com/office/drawing/2014/main" id="{2E922E9E-A29B-4164-A634-B718A43369CA}"/>
+              </a:ext>
+              <a:ext uri="{C183D7F6-B498-43B3-948B-1728B52AA6E4}">
+                <adec:decorative xmlns:adec="http://schemas.microsoft.com/office/drawing/2017/decorative" val="1"/>
+              </a:ext>
+            </a:extLst>
+          </p:cNvPr>
+          <p:cNvSpPr>
+            <a:spLocks noGrp="1" noRot="1" noChangeAspect="1" noMove="1" noResize="1" noEditPoints="1" noAdjustHandles="1" noChangeArrowheads="1" noChangeShapeType="1" noTextEdit="1"/>
+          </p:cNvSpPr>
+          <p:nvPr>
+            <p:extLst>
+              <p:ext uri="{386F3935-93C4-4BCD-93E2-E3B085C9AB24}">
+                <p16:designElem xmlns:p16="http://schemas.microsoft.com/office/powerpoint/2015/main" val="1"/>
+              </p:ext>
+            </p:extLst>
+          </p:nvPr>
+        </p:nvSpPr>
+        <p:spPr>
+          <a:xfrm>
+            <a:off x="3048" y="0"/>
+            <a:ext cx="12188952" cy="6858000"/>
+          </a:xfrm>
+          <a:prstGeom prst="rect">
+            <a:avLst/>
+          </a:prstGeom>
+          <a:blipFill dpi="0" rotWithShape="1">
+            <a:blip r:embed="rId2">
+              <a:alphaModFix amt="6000"/>
+            </a:blip>
+            <a:srcRect/>
+            <a:tile tx="0" ty="0" sx="100000" sy="100000" flip="none" algn="tl"/>
+          </a:blipFill>
+          <a:ln w="9525" cap="flat">
+            <a:noFill/>
+            <a:prstDash val="solid"/>
+            <a:miter/>
+          </a:ln>
+        </p:spPr>
+        <p:txBody>
+          <a:bodyPr rtlCol="0" anchor="ctr"/>
+          <a:lstStyle/>
+          <a:p>
+            <a:endParaRPr lang="en-US" dirty="0"/>
+          </a:p>
+        </p:txBody>
+      </p:sp>
+      <p:sp>
+        <p:nvSpPr>
+          <p:cNvPr id="2" name="Title 1">
+            <a:extLst>
+              <a:ext uri="{FF2B5EF4-FFF2-40B4-BE49-F238E27FC236}">
+                <a16:creationId xmlns:a16="http://schemas.microsoft.com/office/drawing/2014/main" id="{6D0F2D0A-03EA-4F89-B7AC-387AA3AE9759}"/>
+              </a:ext>
+            </a:extLst>
+          </p:cNvPr>
+          <p:cNvSpPr>
+            <a:spLocks noGrp="1"/>
+          </p:cNvSpPr>
+          <p:nvPr>
+            <p:ph type="title"/>
+          </p:nvPr>
+        </p:nvSpPr>
+        <p:spPr>
+          <a:xfrm>
+            <a:off x="457200" y="758952"/>
+            <a:ext cx="6158753" cy="1325563"/>
+          </a:xfrm>
+        </p:spPr>
+        <p:txBody>
+          <a:bodyPr anchor="b">
+            <a:normAutofit/>
+          </a:bodyPr>
+          <a:lstStyle/>
+          <a:p>
+            <a:r>
+              <a:rPr lang="en-US" dirty="0"/>
+              <a:t>RoCry Bot	</a:t>
+            </a:r>
+          </a:p>
+        </p:txBody>
+      </p:sp>
+      <p:sp>
+        <p:nvSpPr>
+          <p:cNvPr id="3" name="Content Placeholder 2">
+            <a:extLst>
+              <a:ext uri="{FF2B5EF4-FFF2-40B4-BE49-F238E27FC236}">
+                <a16:creationId xmlns:a16="http://schemas.microsoft.com/office/drawing/2014/main" id="{9D4BB55A-9182-44AB-AC4C-663F892BA7A6}"/>
+              </a:ext>
+            </a:extLst>
+          </p:cNvPr>
+          <p:cNvSpPr>
+            <a:spLocks noGrp="1"/>
+          </p:cNvSpPr>
+          <p:nvPr>
+            <p:ph idx="1"/>
+          </p:nvPr>
+        </p:nvSpPr>
+        <p:spPr>
+          <a:xfrm>
+            <a:off x="457200" y="2286000"/>
+            <a:ext cx="6158753" cy="3878707"/>
+          </a:xfrm>
+        </p:spPr>
+        <p:txBody>
+          <a:bodyPr>
+            <a:normAutofit/>
+          </a:bodyPr>
+          <a:lstStyle/>
+          <a:p>
+            <a:r>
+              <a:rPr lang="en-US" dirty="0"/>
+              <a:t>RoCry is our chat bot for the user to get acquainted with investing.</a:t>
+            </a:r>
+          </a:p>
+          <a:p>
+            <a:r>
+              <a:rPr lang="en-US" dirty="0"/>
+              <a:t>The goal is to create an interactive bot which will give recommendations for which portfolio we will provide</a:t>
+            </a:r>
+          </a:p>
+          <a:p>
+            <a:r>
+              <a:rPr lang="en-US" dirty="0"/>
+              <a:t>RoCry will be using Lambda for its functions and </a:t>
+            </a:r>
+            <a:r>
+              <a:rPr lang="en-US" dirty="0" err="1"/>
+              <a:t>Kommunicate</a:t>
+            </a:r>
+            <a:r>
+              <a:rPr lang="en-US" dirty="0"/>
+              <a:t> for its integration to the dash</a:t>
+            </a:r>
+          </a:p>
+        </p:txBody>
+      </p:sp>
+      <p:pic>
+        <p:nvPicPr>
+          <p:cNvPr id="4" name="Picture 3">
+            <a:extLst>
+              <a:ext uri="{FF2B5EF4-FFF2-40B4-BE49-F238E27FC236}">
+                <a16:creationId xmlns:a16="http://schemas.microsoft.com/office/drawing/2014/main" id="{E4CB734A-86CC-44A7-BD3D-6ACD5BF49808}"/>
+              </a:ext>
+            </a:extLst>
+          </p:cNvPr>
+          <p:cNvPicPr>
+            <a:picLocks noChangeAspect="1"/>
+          </p:cNvPicPr>
+          <p:nvPr/>
+        </p:nvPicPr>
+        <p:blipFill>
+          <a:blip r:embed="rId3"/>
+          <a:stretch>
+            <a:fillRect/>
+          </a:stretch>
+        </p:blipFill>
+        <p:spPr>
+          <a:xfrm>
+            <a:off x="8510255" y="2457802"/>
+            <a:ext cx="1905433" cy="3061451"/>
+          </a:xfrm>
+          <a:prstGeom prst="rect">
+            <a:avLst/>
+          </a:prstGeom>
+        </p:spPr>
+      </p:pic>
+    </p:spTree>
+    <p:extLst>
+      <p:ext uri="{BB962C8B-B14F-4D97-AF65-F5344CB8AC3E}">
+        <p14:creationId xmlns:p14="http://schemas.microsoft.com/office/powerpoint/2010/main" val="2549323149"/>
+      </p:ext>
+    </p:extLst>
+  </p:cSld>
+  <p:clrMapOvr>
+    <a:masterClrMapping/>
+  </p:clrMapOvr>
+</p:sld>
+</file>
+
+<file path=ppt/slides/slide6.xml><?xml version="1.0" encoding="utf-8"?>
 <p:sld xmlns:a="http://schemas.openxmlformats.org/drawingml/2006/main" xmlns:r="http://schemas.openxmlformats.org/officeDocument/2006/relationships" xmlns:p="http://schemas.openxmlformats.org/presentationml/2006/main">
   <p:cSld>
     <p:bg>
@@ -14785,8 +16785,8 @@
               <a:buNone/>
             </a:pPr>
             <a:r>
-              <a:rPr lang="en-US" sz="2400"/>
-              <a:t>Let's take a dive into our website and meet the team along with Cibi our chat bot!</a:t>
+              <a:rPr lang="en-US" sz="2400" dirty="0"/>
+              <a:t>Let's take a dive into our dash and meet the team along with RoCry our chat bot!</a:t>
             </a:r>
           </a:p>
         </p:txBody>
@@ -14834,7 +16834,1062 @@
 </p:sld>
 </file>
 
-<file path=ppt/slides/slide5.xml><?xml version="1.0" encoding="utf-8"?>
+<file path=ppt/slides/slide7.xml><?xml version="1.0" encoding="utf-8"?>
+<p:sld xmlns:a="http://schemas.openxmlformats.org/drawingml/2006/main" xmlns:r="http://schemas.openxmlformats.org/officeDocument/2006/relationships" xmlns:p="http://schemas.openxmlformats.org/presentationml/2006/main">
+  <p:cSld>
+    <p:bg>
+      <p:bgPr>
+        <a:solidFill>
+          <a:schemeClr val="bg2"/>
+        </a:solidFill>
+        <a:effectLst/>
+      </p:bgPr>
+    </p:bg>
+    <p:spTree>
+      <p:nvGrpSpPr>
+        <p:cNvPr id="1" name=""/>
+        <p:cNvGrpSpPr/>
+        <p:nvPr/>
+      </p:nvGrpSpPr>
+      <p:grpSpPr>
+        <a:xfrm>
+          <a:off x="0" y="0"/>
+          <a:ext cx="0" cy="0"/>
+          <a:chOff x="0" y="0"/>
+          <a:chExt cx="0" cy="0"/>
+        </a:xfrm>
+      </p:grpSpPr>
+      <p:sp useBgFill="1">
+        <p:nvSpPr>
+          <p:cNvPr id="11" name="Background Fill">
+            <a:extLst>
+              <a:ext uri="{FF2B5EF4-FFF2-40B4-BE49-F238E27FC236}">
+                <a16:creationId xmlns:a16="http://schemas.microsoft.com/office/drawing/2014/main" id="{FAFB3478-4AEC-431E-93B2-1593839C16DA}"/>
+              </a:ext>
+              <a:ext uri="{C183D7F6-B498-43B3-948B-1728B52AA6E4}">
+                <adec:decorative xmlns:adec="http://schemas.microsoft.com/office/drawing/2017/decorative" val="1"/>
+              </a:ext>
+            </a:extLst>
+          </p:cNvPr>
+          <p:cNvSpPr>
+            <a:spLocks noGrp="1" noRot="1" noChangeAspect="1" noMove="1" noResize="1" noEditPoints="1" noAdjustHandles="1" noChangeArrowheads="1" noChangeShapeType="1" noTextEdit="1"/>
+          </p:cNvSpPr>
+          <p:nvPr>
+            <p:extLst>
+              <p:ext uri="{386F3935-93C4-4BCD-93E2-E3B085C9AB24}">
+                <p16:designElem xmlns:p16="http://schemas.microsoft.com/office/powerpoint/2015/main" val="1"/>
+              </p:ext>
+            </p:extLst>
+          </p:nvPr>
+        </p:nvSpPr>
+        <p:spPr>
+          <a:xfrm>
+            <a:off x="0" y="0"/>
+            <a:ext cx="12192000" cy="6858000"/>
+          </a:xfrm>
+          <a:prstGeom prst="rect">
+            <a:avLst/>
+          </a:prstGeom>
+          <a:ln w="9525" cap="flat">
+            <a:noFill/>
+            <a:prstDash val="solid"/>
+            <a:miter/>
+          </a:ln>
+        </p:spPr>
+        <p:txBody>
+          <a:bodyPr rtlCol="0" anchor="ctr"/>
+          <a:lstStyle/>
+          <a:p>
+            <a:endParaRPr lang="en-US">
+              <a:solidFill>
+                <a:schemeClr val="tx1"/>
+              </a:solidFill>
+            </a:endParaRPr>
+          </a:p>
+        </p:txBody>
+      </p:sp>
+      <p:sp>
+        <p:nvSpPr>
+          <p:cNvPr id="13" name="Color Fill">
+            <a:extLst>
+              <a:ext uri="{FF2B5EF4-FFF2-40B4-BE49-F238E27FC236}">
+                <a16:creationId xmlns:a16="http://schemas.microsoft.com/office/drawing/2014/main" id="{5AABFA05-E806-48B0-BA38-42F01BD6324C}"/>
+              </a:ext>
+              <a:ext uri="{C183D7F6-B498-43B3-948B-1728B52AA6E4}">
+                <adec:decorative xmlns:adec="http://schemas.microsoft.com/office/drawing/2017/decorative" val="1"/>
+              </a:ext>
+            </a:extLst>
+          </p:cNvPr>
+          <p:cNvSpPr>
+            <a:spLocks noGrp="1" noRot="1" noChangeAspect="1" noMove="1" noResize="1" noEditPoints="1" noAdjustHandles="1" noChangeArrowheads="1" noChangeShapeType="1" noTextEdit="1"/>
+          </p:cNvSpPr>
+          <p:nvPr>
+            <p:extLst>
+              <p:ext uri="{386F3935-93C4-4BCD-93E2-E3B085C9AB24}">
+                <p16:designElem xmlns:p16="http://schemas.microsoft.com/office/powerpoint/2015/main" val="1"/>
+              </p:ext>
+            </p:extLst>
+          </p:nvPr>
+        </p:nvSpPr>
+        <p:spPr>
+          <a:xfrm>
+            <a:off x="0" y="0"/>
+            <a:ext cx="12188952" cy="6858000"/>
+          </a:xfrm>
+          <a:prstGeom prst="rect">
+            <a:avLst/>
+          </a:prstGeom>
+          <a:solidFill>
+            <a:schemeClr val="bg2">
+              <a:lumMod val="75000"/>
+              <a:lumOff val="25000"/>
+              <a:alpha val="40000"/>
+            </a:schemeClr>
+          </a:solidFill>
+          <a:ln w="9525" cap="flat">
+            <a:noFill/>
+            <a:prstDash val="solid"/>
+            <a:miter/>
+          </a:ln>
+        </p:spPr>
+        <p:txBody>
+          <a:bodyPr rtlCol="0" anchor="ctr"/>
+          <a:lstStyle/>
+          <a:p>
+            <a:endParaRPr lang="en-US" dirty="0">
+              <a:solidFill>
+                <a:schemeClr val="bg2">
+                  <a:lumMod val="75000"/>
+                  <a:lumOff val="25000"/>
+                </a:schemeClr>
+              </a:solidFill>
+            </a:endParaRPr>
+          </a:p>
+        </p:txBody>
+      </p:sp>
+      <p:grpSp>
+        <p:nvGrpSpPr>
+          <p:cNvPr id="15" name="Group 14">
+            <a:extLst>
+              <a:ext uri="{FF2B5EF4-FFF2-40B4-BE49-F238E27FC236}">
+                <a16:creationId xmlns:a16="http://schemas.microsoft.com/office/drawing/2014/main" id="{42DDC377-BE64-4F1B-80B7-057C9566551E}"/>
+              </a:ext>
+              <a:ext uri="{C183D7F6-B498-43B3-948B-1728B52AA6E4}">
+                <adec:decorative xmlns:adec="http://schemas.microsoft.com/office/drawing/2017/decorative" val="1"/>
+              </a:ext>
+            </a:extLst>
+          </p:cNvPr>
+          <p:cNvGrpSpPr>
+            <a:grpSpLocks noGrp="1" noUngrp="1" noRot="1" noChangeAspect="1" noMove="1" noResize="1"/>
+          </p:cNvGrpSpPr>
+          <p:nvPr>
+            <p:extLst>
+              <p:ext uri="{386F3935-93C4-4BCD-93E2-E3B085C9AB24}">
+                <p16:designElem xmlns:p16="http://schemas.microsoft.com/office/powerpoint/2015/main" val="1"/>
+              </p:ext>
+            </p:extLst>
+          </p:nvPr>
+        </p:nvGrpSpPr>
+        <p:grpSpPr>
+          <a:xfrm>
+            <a:off x="7935972" y="-1"/>
+            <a:ext cx="4112311" cy="6858001"/>
+            <a:chOff x="7935972" y="-1"/>
+            <a:chExt cx="4112311" cy="6858001"/>
+          </a:xfrm>
+        </p:grpSpPr>
+        <p:sp>
+          <p:nvSpPr>
+            <p:cNvPr id="16" name="Oval 15">
+              <a:extLst>
+                <a:ext uri="{FF2B5EF4-FFF2-40B4-BE49-F238E27FC236}">
+                  <a16:creationId xmlns:a16="http://schemas.microsoft.com/office/drawing/2014/main" id="{704EC963-D536-4453-AA53-8431AB5EFFD1}"/>
+                </a:ext>
+                <a:ext uri="{C183D7F6-B498-43B3-948B-1728B52AA6E4}">
+                  <adec:decorative xmlns:adec="http://schemas.microsoft.com/office/drawing/2017/decorative" val="1"/>
+                </a:ext>
+              </a:extLst>
+            </p:cNvPr>
+            <p:cNvSpPr/>
+            <p:nvPr>
+              <p:extLst>
+                <p:ext uri="{386F3935-93C4-4BCD-93E2-E3B085C9AB24}">
+                  <p16:designElem xmlns:p16="http://schemas.microsoft.com/office/powerpoint/2015/main" val="1"/>
+                </p:ext>
+              </p:extLst>
+            </p:nvPr>
+          </p:nvSpPr>
+          <p:spPr>
+            <a:xfrm>
+              <a:off x="11450769" y="756967"/>
+              <a:ext cx="438100" cy="438100"/>
+            </a:xfrm>
+            <a:prstGeom prst="ellipse">
+              <a:avLst/>
+            </a:prstGeom>
+            <a:solidFill>
+              <a:schemeClr val="accent2"/>
+            </a:solidFill>
+            <a:ln>
+              <a:noFill/>
+            </a:ln>
+          </p:spPr>
+          <p:style>
+            <a:lnRef idx="2">
+              <a:schemeClr val="accent1">
+                <a:shade val="50000"/>
+              </a:schemeClr>
+            </a:lnRef>
+            <a:fillRef idx="1">
+              <a:schemeClr val="accent1"/>
+            </a:fillRef>
+            <a:effectRef idx="0">
+              <a:schemeClr val="accent1"/>
+            </a:effectRef>
+            <a:fontRef idx="minor">
+              <a:schemeClr val="lt1"/>
+            </a:fontRef>
+          </p:style>
+          <p:txBody>
+            <a:bodyPr rtlCol="0" anchor="ctr"/>
+            <a:lstStyle/>
+            <a:p>
+              <a:pPr algn="ctr"/>
+              <a:endParaRPr lang="en-US"/>
+            </a:p>
+          </p:txBody>
+        </p:sp>
+        <p:sp>
+          <p:nvSpPr>
+            <p:cNvPr id="17" name="Graphic 18">
+              <a:extLst>
+                <a:ext uri="{FF2B5EF4-FFF2-40B4-BE49-F238E27FC236}">
+                  <a16:creationId xmlns:a16="http://schemas.microsoft.com/office/drawing/2014/main" id="{9830F5A7-3C8A-4FDD-A9D3-679558CA64F9}"/>
+                </a:ext>
+                <a:ext uri="{C183D7F6-B498-43B3-948B-1728B52AA6E4}">
+                  <adec:decorative xmlns:adec="http://schemas.microsoft.com/office/drawing/2017/decorative" val="1"/>
+                </a:ext>
+              </a:extLst>
+            </p:cNvPr>
+            <p:cNvSpPr/>
+            <p:nvPr>
+              <p:extLst>
+                <p:ext uri="{386F3935-93C4-4BCD-93E2-E3B085C9AB24}">
+                  <p16:designElem xmlns:p16="http://schemas.microsoft.com/office/powerpoint/2015/main" val="1"/>
+                </p:ext>
+              </p:extLst>
+            </p:nvPr>
+          </p:nvSpPr>
+          <p:spPr>
+            <a:xfrm>
+              <a:off x="7935972" y="4013148"/>
+              <a:ext cx="813897" cy="1240422"/>
+            </a:xfrm>
+            <a:custGeom>
+              <a:avLst/>
+              <a:gdLst>
+                <a:gd name="connsiteX0" fmla="*/ 3413379 w 3413378"/>
+                <a:gd name="connsiteY0" fmla="*/ 3266028 h 6532054"/>
+                <a:gd name="connsiteX1" fmla="*/ 1706689 w 3413378"/>
+                <a:gd name="connsiteY1" fmla="*/ 6532055 h 6532054"/>
+                <a:gd name="connsiteX2" fmla="*/ 0 w 3413378"/>
+                <a:gd name="connsiteY2" fmla="*/ 3266028 h 6532054"/>
+                <a:gd name="connsiteX3" fmla="*/ 1706689 w 3413378"/>
+                <a:gd name="connsiteY3" fmla="*/ 0 h 6532054"/>
+                <a:gd name="connsiteX4" fmla="*/ 3413379 w 3413378"/>
+                <a:gd name="connsiteY4" fmla="*/ 3266028 h 6532054"/>
+              </a:gdLst>
+              <a:ahLst/>
+              <a:cxnLst>
+                <a:cxn ang="0">
+                  <a:pos x="connsiteX0" y="connsiteY0"/>
+                </a:cxn>
+                <a:cxn ang="0">
+                  <a:pos x="connsiteX1" y="connsiteY1"/>
+                </a:cxn>
+                <a:cxn ang="0">
+                  <a:pos x="connsiteX2" y="connsiteY2"/>
+                </a:cxn>
+                <a:cxn ang="0">
+                  <a:pos x="connsiteX3" y="connsiteY3"/>
+                </a:cxn>
+                <a:cxn ang="0">
+                  <a:pos x="connsiteX4" y="connsiteY4"/>
+                </a:cxn>
+              </a:cxnLst>
+              <a:rect l="l" t="t" r="r" b="b"/>
+              <a:pathLst>
+                <a:path w="3413378" h="6532054">
+                  <a:moveTo>
+                    <a:pt x="3413379" y="3266028"/>
+                  </a:moveTo>
+                  <a:cubicBezTo>
+                    <a:pt x="3413379" y="5069777"/>
+                    <a:pt x="1706689" y="6532055"/>
+                    <a:pt x="1706689" y="6532055"/>
+                  </a:cubicBezTo>
+                  <a:cubicBezTo>
+                    <a:pt x="1706689" y="6532055"/>
+                    <a:pt x="0" y="5069777"/>
+                    <a:pt x="0" y="3266028"/>
+                  </a:cubicBezTo>
+                  <a:cubicBezTo>
+                    <a:pt x="0" y="1462278"/>
+                    <a:pt x="1706689" y="0"/>
+                    <a:pt x="1706689" y="0"/>
+                  </a:cubicBezTo>
+                  <a:cubicBezTo>
+                    <a:pt x="1706689" y="0"/>
+                    <a:pt x="3413379" y="1462278"/>
+                    <a:pt x="3413379" y="3266028"/>
+                  </a:cubicBezTo>
+                  <a:close/>
+                </a:path>
+              </a:pathLst>
+            </a:custGeom>
+            <a:pattFill prst="pct5">
+              <a:fgClr>
+                <a:schemeClr val="accent4">
+                  <a:lumMod val="60000"/>
+                  <a:lumOff val="40000"/>
+                </a:schemeClr>
+              </a:fgClr>
+              <a:bgClr>
+                <a:schemeClr val="accent1">
+                  <a:lumMod val="75000"/>
+                </a:schemeClr>
+              </a:bgClr>
+            </a:pattFill>
+            <a:ln w="9525" cap="flat">
+              <a:noFill/>
+              <a:prstDash val="solid"/>
+              <a:miter/>
+            </a:ln>
+          </p:spPr>
+          <p:txBody>
+            <a:bodyPr rtlCol="0" anchor="ctr"/>
+            <a:lstStyle/>
+            <a:p>
+              <a:endParaRPr lang="en-US" dirty="0"/>
+            </a:p>
+          </p:txBody>
+        </p:sp>
+        <p:sp>
+          <p:nvSpPr>
+            <p:cNvPr id="18" name="Graphic 9">
+              <a:extLst>
+                <a:ext uri="{FF2B5EF4-FFF2-40B4-BE49-F238E27FC236}">
+                  <a16:creationId xmlns:a16="http://schemas.microsoft.com/office/drawing/2014/main" id="{279D6A93-291B-4380-BF71-74648EA48FA5}"/>
+                </a:ext>
+                <a:ext uri="{C183D7F6-B498-43B3-948B-1728B52AA6E4}">
+                  <adec:decorative xmlns:adec="http://schemas.microsoft.com/office/drawing/2017/decorative" val="1"/>
+                </a:ext>
+              </a:extLst>
+            </p:cNvPr>
+            <p:cNvSpPr/>
+            <p:nvPr>
+              <p:extLst>
+                <p:ext uri="{386F3935-93C4-4BCD-93E2-E3B085C9AB24}">
+                  <p16:designElem xmlns:p16="http://schemas.microsoft.com/office/powerpoint/2015/main" val="1"/>
+                </p:ext>
+              </p:extLst>
+            </p:nvPr>
+          </p:nvSpPr>
+          <p:spPr>
+            <a:xfrm>
+              <a:off x="8508034" y="1063796"/>
+              <a:ext cx="3518852" cy="3518851"/>
+            </a:xfrm>
+            <a:custGeom>
+              <a:avLst/>
+              <a:gdLst>
+                <a:gd name="connsiteX0" fmla="*/ 6861546 w 6861545"/>
+                <a:gd name="connsiteY0" fmla="*/ 6861546 h 6861545"/>
+                <a:gd name="connsiteX1" fmla="*/ 3435812 w 6861545"/>
+                <a:gd name="connsiteY1" fmla="*/ 6861546 h 6861545"/>
+                <a:gd name="connsiteX2" fmla="*/ 0 w 6861545"/>
+                <a:gd name="connsiteY2" fmla="*/ 3425734 h 6861545"/>
+                <a:gd name="connsiteX3" fmla="*/ 0 w 6861545"/>
+                <a:gd name="connsiteY3" fmla="*/ 0 h 6861545"/>
+                <a:gd name="connsiteX4" fmla="*/ 3425734 w 6861545"/>
+                <a:gd name="connsiteY4" fmla="*/ 0 h 6861545"/>
+                <a:gd name="connsiteX5" fmla="*/ 6861546 w 6861545"/>
+                <a:gd name="connsiteY5" fmla="*/ 3435812 h 6861545"/>
+                <a:gd name="connsiteX6" fmla="*/ 6861546 w 6861545"/>
+                <a:gd name="connsiteY6" fmla="*/ 6861546 h 6861545"/>
+              </a:gdLst>
+              <a:ahLst/>
+              <a:cxnLst>
+                <a:cxn ang="0">
+                  <a:pos x="connsiteX0" y="connsiteY0"/>
+                </a:cxn>
+                <a:cxn ang="0">
+                  <a:pos x="connsiteX1" y="connsiteY1"/>
+                </a:cxn>
+                <a:cxn ang="0">
+                  <a:pos x="connsiteX2" y="connsiteY2"/>
+                </a:cxn>
+                <a:cxn ang="0">
+                  <a:pos x="connsiteX3" y="connsiteY3"/>
+                </a:cxn>
+                <a:cxn ang="0">
+                  <a:pos x="connsiteX4" y="connsiteY4"/>
+                </a:cxn>
+                <a:cxn ang="0">
+                  <a:pos x="connsiteX5" y="connsiteY5"/>
+                </a:cxn>
+                <a:cxn ang="0">
+                  <a:pos x="connsiteX6" y="connsiteY6"/>
+                </a:cxn>
+              </a:cxnLst>
+              <a:rect l="l" t="t" r="r" b="b"/>
+              <a:pathLst>
+                <a:path w="6861545" h="6861545">
+                  <a:moveTo>
+                    <a:pt x="6861546" y="6861546"/>
+                  </a:moveTo>
+                  <a:lnTo>
+                    <a:pt x="3435812" y="6861546"/>
+                  </a:lnTo>
+                  <a:cubicBezTo>
+                    <a:pt x="1538245" y="6861546"/>
+                    <a:pt x="0" y="5323301"/>
+                    <a:pt x="0" y="3425734"/>
+                  </a:cubicBezTo>
+                  <a:lnTo>
+                    <a:pt x="0" y="0"/>
+                  </a:lnTo>
+                  <a:lnTo>
+                    <a:pt x="3425734" y="0"/>
+                  </a:lnTo>
+                  <a:cubicBezTo>
+                    <a:pt x="5323301" y="0"/>
+                    <a:pt x="6861546" y="1538245"/>
+                    <a:pt x="6861546" y="3435812"/>
+                  </a:cubicBezTo>
+                  <a:lnTo>
+                    <a:pt x="6861546" y="6861546"/>
+                  </a:lnTo>
+                  <a:close/>
+                </a:path>
+              </a:pathLst>
+            </a:custGeom>
+            <a:pattFill prst="pct5">
+              <a:fgClr>
+                <a:schemeClr val="accent4">
+                  <a:lumMod val="75000"/>
+                </a:schemeClr>
+              </a:fgClr>
+              <a:bgClr>
+                <a:schemeClr val="accent4">
+                  <a:lumMod val="60000"/>
+                  <a:lumOff val="40000"/>
+                </a:schemeClr>
+              </a:bgClr>
+            </a:pattFill>
+            <a:ln w="9525" cap="flat">
+              <a:noFill/>
+              <a:prstDash val="solid"/>
+              <a:miter/>
+            </a:ln>
+          </p:spPr>
+          <p:txBody>
+            <a:bodyPr rtlCol="0" anchor="ctr"/>
+            <a:lstStyle/>
+            <a:p>
+              <a:endParaRPr lang="en-US" dirty="0"/>
+            </a:p>
+          </p:txBody>
+        </p:sp>
+        <p:sp>
+          <p:nvSpPr>
+            <p:cNvPr id="19" name="Oval 18">
+              <a:extLst>
+                <a:ext uri="{FF2B5EF4-FFF2-40B4-BE49-F238E27FC236}">
+                  <a16:creationId xmlns:a16="http://schemas.microsoft.com/office/drawing/2014/main" id="{67F4B6ED-6E4B-4600-BF49-D0B0A2F6EBAF}"/>
+                </a:ext>
+                <a:ext uri="{C183D7F6-B498-43B3-948B-1728B52AA6E4}">
+                  <adec:decorative xmlns:adec="http://schemas.microsoft.com/office/drawing/2017/decorative" val="1"/>
+                </a:ext>
+              </a:extLst>
+            </p:cNvPr>
+            <p:cNvSpPr/>
+            <p:nvPr>
+              <p:extLst>
+                <p:ext uri="{386F3935-93C4-4BCD-93E2-E3B085C9AB24}">
+                  <p16:designElem xmlns:p16="http://schemas.microsoft.com/office/powerpoint/2015/main" val="1"/>
+                </p:ext>
+              </p:extLst>
+            </p:nvPr>
+          </p:nvSpPr>
+          <p:spPr>
+            <a:xfrm>
+              <a:off x="9012156" y="4526823"/>
+              <a:ext cx="260714" cy="260714"/>
+            </a:xfrm>
+            <a:prstGeom prst="ellipse">
+              <a:avLst/>
+            </a:prstGeom>
+            <a:solidFill>
+              <a:schemeClr val="accent1">
+                <a:lumMod val="60000"/>
+                <a:lumOff val="40000"/>
+              </a:schemeClr>
+            </a:solidFill>
+            <a:ln w="9331" cap="flat">
+              <a:noFill/>
+              <a:prstDash val="solid"/>
+              <a:miter/>
+            </a:ln>
+          </p:spPr>
+          <p:txBody>
+            <a:bodyPr rtlCol="0" anchor="ctr"/>
+            <a:lstStyle/>
+            <a:p>
+              <a:endParaRPr lang="en-US">
+                <a:solidFill>
+                  <a:schemeClr val="tx1"/>
+                </a:solidFill>
+              </a:endParaRPr>
+            </a:p>
+          </p:txBody>
+        </p:sp>
+        <p:sp>
+          <p:nvSpPr>
+            <p:cNvPr id="20" name="Graphic 9">
+              <a:extLst>
+                <a:ext uri="{FF2B5EF4-FFF2-40B4-BE49-F238E27FC236}">
+                  <a16:creationId xmlns:a16="http://schemas.microsoft.com/office/drawing/2014/main" id="{C7015312-5A36-4C0D-8547-E8CCA22DCA3C}"/>
+                </a:ext>
+                <a:ext uri="{C183D7F6-B498-43B3-948B-1728B52AA6E4}">
+                  <adec:decorative xmlns:adec="http://schemas.microsoft.com/office/drawing/2017/decorative" val="1"/>
+                </a:ext>
+              </a:extLst>
+            </p:cNvPr>
+            <p:cNvSpPr/>
+            <p:nvPr>
+              <p:extLst>
+                <p:ext uri="{386F3935-93C4-4BCD-93E2-E3B085C9AB24}">
+                  <p16:designElem xmlns:p16="http://schemas.microsoft.com/office/powerpoint/2015/main" val="1"/>
+                </p:ext>
+              </p:extLst>
+            </p:nvPr>
+          </p:nvSpPr>
+          <p:spPr>
+            <a:xfrm>
+              <a:off x="8508034" y="1063157"/>
+              <a:ext cx="3540249" cy="3540247"/>
+            </a:xfrm>
+            <a:custGeom>
+              <a:avLst/>
+              <a:gdLst>
+                <a:gd name="connsiteX0" fmla="*/ 6861546 w 6861545"/>
+                <a:gd name="connsiteY0" fmla="*/ 6861546 h 6861545"/>
+                <a:gd name="connsiteX1" fmla="*/ 3435812 w 6861545"/>
+                <a:gd name="connsiteY1" fmla="*/ 6861546 h 6861545"/>
+                <a:gd name="connsiteX2" fmla="*/ 0 w 6861545"/>
+                <a:gd name="connsiteY2" fmla="*/ 3425734 h 6861545"/>
+                <a:gd name="connsiteX3" fmla="*/ 0 w 6861545"/>
+                <a:gd name="connsiteY3" fmla="*/ 0 h 6861545"/>
+                <a:gd name="connsiteX4" fmla="*/ 3425734 w 6861545"/>
+                <a:gd name="connsiteY4" fmla="*/ 0 h 6861545"/>
+                <a:gd name="connsiteX5" fmla="*/ 6861546 w 6861545"/>
+                <a:gd name="connsiteY5" fmla="*/ 3435812 h 6861545"/>
+                <a:gd name="connsiteX6" fmla="*/ 6861546 w 6861545"/>
+                <a:gd name="connsiteY6" fmla="*/ 6861546 h 6861545"/>
+              </a:gdLst>
+              <a:ahLst/>
+              <a:cxnLst>
+                <a:cxn ang="0">
+                  <a:pos x="connsiteX0" y="connsiteY0"/>
+                </a:cxn>
+                <a:cxn ang="0">
+                  <a:pos x="connsiteX1" y="connsiteY1"/>
+                </a:cxn>
+                <a:cxn ang="0">
+                  <a:pos x="connsiteX2" y="connsiteY2"/>
+                </a:cxn>
+                <a:cxn ang="0">
+                  <a:pos x="connsiteX3" y="connsiteY3"/>
+                </a:cxn>
+                <a:cxn ang="0">
+                  <a:pos x="connsiteX4" y="connsiteY4"/>
+                </a:cxn>
+                <a:cxn ang="0">
+                  <a:pos x="connsiteX5" y="connsiteY5"/>
+                </a:cxn>
+                <a:cxn ang="0">
+                  <a:pos x="connsiteX6" y="connsiteY6"/>
+                </a:cxn>
+              </a:cxnLst>
+              <a:rect l="l" t="t" r="r" b="b"/>
+              <a:pathLst>
+                <a:path w="6861545" h="6861545">
+                  <a:moveTo>
+                    <a:pt x="6861546" y="6861546"/>
+                  </a:moveTo>
+                  <a:lnTo>
+                    <a:pt x="3435812" y="6861546"/>
+                  </a:lnTo>
+                  <a:cubicBezTo>
+                    <a:pt x="1538245" y="6861546"/>
+                    <a:pt x="0" y="5323301"/>
+                    <a:pt x="0" y="3425734"/>
+                  </a:cubicBezTo>
+                  <a:lnTo>
+                    <a:pt x="0" y="0"/>
+                  </a:lnTo>
+                  <a:lnTo>
+                    <a:pt x="3425734" y="0"/>
+                  </a:lnTo>
+                  <a:cubicBezTo>
+                    <a:pt x="5323301" y="0"/>
+                    <a:pt x="6861546" y="1538245"/>
+                    <a:pt x="6861546" y="3435812"/>
+                  </a:cubicBezTo>
+                  <a:lnTo>
+                    <a:pt x="6861546" y="6861546"/>
+                  </a:lnTo>
+                  <a:close/>
+                </a:path>
+              </a:pathLst>
+            </a:custGeom>
+            <a:solidFill>
+              <a:srgbClr val="FFFFFF"/>
+            </a:solidFill>
+            <a:ln w="38100" cap="flat">
+              <a:solidFill>
+                <a:srgbClr val="F7F7F7"/>
+              </a:solidFill>
+              <a:prstDash val="solid"/>
+              <a:miter/>
+            </a:ln>
+          </p:spPr>
+          <p:txBody>
+            <a:bodyPr rtlCol="0" anchor="ctr"/>
+            <a:lstStyle/>
+            <a:p>
+              <a:endParaRPr lang="en-US" dirty="0"/>
+            </a:p>
+          </p:txBody>
+        </p:sp>
+        <p:sp>
+          <p:nvSpPr>
+            <p:cNvPr id="21" name="Freeform: Shape 20">
+              <a:extLst>
+                <a:ext uri="{FF2B5EF4-FFF2-40B4-BE49-F238E27FC236}">
+                  <a16:creationId xmlns:a16="http://schemas.microsoft.com/office/drawing/2014/main" id="{DE6E37D0-F1F6-4779-A0DD-BE7107CC5ABD}"/>
+                </a:ext>
+                <a:ext uri="{C183D7F6-B498-43B3-948B-1728B52AA6E4}">
+                  <adec:decorative xmlns:adec="http://schemas.microsoft.com/office/drawing/2017/decorative" val="1"/>
+                </a:ext>
+              </a:extLst>
+            </p:cNvPr>
+            <p:cNvSpPr/>
+            <p:nvPr>
+              <p:extLst>
+                <p:ext uri="{386F3935-93C4-4BCD-93E2-E3B085C9AB24}">
+                  <p16:designElem xmlns:p16="http://schemas.microsoft.com/office/powerpoint/2015/main" val="1"/>
+                </p:ext>
+              </p:extLst>
+            </p:nvPr>
+          </p:nvSpPr>
+          <p:spPr>
+            <a:xfrm>
+              <a:off x="8508034" y="4793253"/>
+              <a:ext cx="3518852" cy="2064747"/>
+            </a:xfrm>
+            <a:custGeom>
+              <a:avLst/>
+              <a:gdLst>
+                <a:gd name="connsiteX0" fmla="*/ 1762010 w 3518852"/>
+                <a:gd name="connsiteY0" fmla="*/ 0 h 2212102"/>
+                <a:gd name="connsiteX1" fmla="*/ 3518852 w 3518852"/>
+                <a:gd name="connsiteY1" fmla="*/ 0 h 2212102"/>
+                <a:gd name="connsiteX2" fmla="*/ 3518852 w 3518852"/>
+                <a:gd name="connsiteY2" fmla="*/ 1747195 h 2212102"/>
+                <a:gd name="connsiteX3" fmla="*/ 3483055 w 3518852"/>
+                <a:gd name="connsiteY3" fmla="*/ 2100355 h 2212102"/>
+                <a:gd name="connsiteX4" fmla="*/ 3454163 w 3518852"/>
+                <a:gd name="connsiteY4" fmla="*/ 2212102 h 2212102"/>
+                <a:gd name="connsiteX5" fmla="*/ 0 w 3518852"/>
+                <a:gd name="connsiteY5" fmla="*/ 2212102 h 2212102"/>
+                <a:gd name="connsiteX6" fmla="*/ 0 w 3518852"/>
+                <a:gd name="connsiteY6" fmla="*/ 1752335 h 2212102"/>
+                <a:gd name="connsiteX7" fmla="*/ 1762010 w 3518852"/>
+                <a:gd name="connsiteY7" fmla="*/ 0 h 2212102"/>
+              </a:gdLst>
+              <a:ahLst/>
+              <a:cxnLst>
+                <a:cxn ang="0">
+                  <a:pos x="connsiteX0" y="connsiteY0"/>
+                </a:cxn>
+                <a:cxn ang="0">
+                  <a:pos x="connsiteX1" y="connsiteY1"/>
+                </a:cxn>
+                <a:cxn ang="0">
+                  <a:pos x="connsiteX2" y="connsiteY2"/>
+                </a:cxn>
+                <a:cxn ang="0">
+                  <a:pos x="connsiteX3" y="connsiteY3"/>
+                </a:cxn>
+                <a:cxn ang="0">
+                  <a:pos x="connsiteX4" y="connsiteY4"/>
+                </a:cxn>
+                <a:cxn ang="0">
+                  <a:pos x="connsiteX5" y="connsiteY5"/>
+                </a:cxn>
+                <a:cxn ang="0">
+                  <a:pos x="connsiteX6" y="connsiteY6"/>
+                </a:cxn>
+                <a:cxn ang="0">
+                  <a:pos x="connsiteX7" y="connsiteY7"/>
+                </a:cxn>
+              </a:cxnLst>
+              <a:rect l="l" t="t" r="r" b="b"/>
+              <a:pathLst>
+                <a:path w="3518852" h="2212102">
+                  <a:moveTo>
+                    <a:pt x="1762010" y="0"/>
+                  </a:moveTo>
+                  <a:lnTo>
+                    <a:pt x="3518852" y="0"/>
+                  </a:lnTo>
+                  <a:lnTo>
+                    <a:pt x="3518852" y="1747195"/>
+                  </a:lnTo>
+                  <a:cubicBezTo>
+                    <a:pt x="3518852" y="1868170"/>
+                    <a:pt x="3506526" y="1986282"/>
+                    <a:pt x="3483055" y="2100355"/>
+                  </a:cubicBezTo>
+                  <a:lnTo>
+                    <a:pt x="3454163" y="2212102"/>
+                  </a:lnTo>
+                  <a:lnTo>
+                    <a:pt x="0" y="2212102"/>
+                  </a:lnTo>
+                  <a:lnTo>
+                    <a:pt x="0" y="1752335"/>
+                  </a:lnTo>
+                  <a:cubicBezTo>
+                    <a:pt x="0" y="784537"/>
+                    <a:pt x="788868" y="0"/>
+                    <a:pt x="1762010" y="0"/>
+                  </a:cubicBezTo>
+                  <a:close/>
+                </a:path>
+              </a:pathLst>
+            </a:custGeom>
+            <a:solidFill>
+              <a:schemeClr val="accent4">
+                <a:lumMod val="40000"/>
+                <a:lumOff val="60000"/>
+                <a:alpha val="30000"/>
+              </a:schemeClr>
+            </a:solidFill>
+            <a:ln w="9525" cap="flat">
+              <a:noFill/>
+              <a:prstDash val="solid"/>
+              <a:miter/>
+            </a:ln>
+          </p:spPr>
+          <p:txBody>
+            <a:bodyPr wrap="square" rtlCol="0" anchor="ctr">
+              <a:noAutofit/>
+            </a:bodyPr>
+            <a:lstStyle/>
+            <a:p>
+              <a:endParaRPr lang="en-US" dirty="0"/>
+            </a:p>
+          </p:txBody>
+        </p:sp>
+        <p:sp>
+          <p:nvSpPr>
+            <p:cNvPr id="22" name="Freeform: Shape 21">
+              <a:extLst>
+                <a:ext uri="{FF2B5EF4-FFF2-40B4-BE49-F238E27FC236}">
+                  <a16:creationId xmlns:a16="http://schemas.microsoft.com/office/drawing/2014/main" id="{FDB3FC3E-AEEC-4250-B91C-26CA109ED2AB}"/>
+                </a:ext>
+                <a:ext uri="{C183D7F6-B498-43B3-948B-1728B52AA6E4}">
+                  <adec:decorative xmlns:adec="http://schemas.microsoft.com/office/drawing/2017/decorative" val="1"/>
+                </a:ext>
+              </a:extLst>
+            </p:cNvPr>
+            <p:cNvSpPr/>
+            <p:nvPr>
+              <p:extLst>
+                <p:ext uri="{386F3935-93C4-4BCD-93E2-E3B085C9AB24}">
+                  <p16:designElem xmlns:p16="http://schemas.microsoft.com/office/powerpoint/2015/main" val="1"/>
+                </p:ext>
+              </p:extLst>
+            </p:nvPr>
+          </p:nvSpPr>
+          <p:spPr>
+            <a:xfrm>
+              <a:off x="8508785" y="-1"/>
+              <a:ext cx="3316434" cy="976017"/>
+            </a:xfrm>
+            <a:custGeom>
+              <a:avLst/>
+              <a:gdLst>
+                <a:gd name="connsiteX0" fmla="*/ 0 w 2779229"/>
+                <a:gd name="connsiteY0" fmla="*/ 0 h 817919"/>
+                <a:gd name="connsiteX1" fmla="*/ 2779229 w 2779229"/>
+                <a:gd name="connsiteY1" fmla="*/ 0 h 817919"/>
+                <a:gd name="connsiteX2" fmla="*/ 2755430 w 2779229"/>
+                <a:gd name="connsiteY2" fmla="*/ 49404 h 817919"/>
+                <a:gd name="connsiteX3" fmla="*/ 1464180 w 2779229"/>
+                <a:gd name="connsiteY3" fmla="*/ 817919 h 817919"/>
+                <a:gd name="connsiteX4" fmla="*/ 0 w 2779229"/>
+                <a:gd name="connsiteY4" fmla="*/ 817919 h 817919"/>
+              </a:gdLst>
+              <a:ahLst/>
+              <a:cxnLst>
+                <a:cxn ang="0">
+                  <a:pos x="connsiteX0" y="connsiteY0"/>
+                </a:cxn>
+                <a:cxn ang="0">
+                  <a:pos x="connsiteX1" y="connsiteY1"/>
+                </a:cxn>
+                <a:cxn ang="0">
+                  <a:pos x="connsiteX2" y="connsiteY2"/>
+                </a:cxn>
+                <a:cxn ang="0">
+                  <a:pos x="connsiteX3" y="connsiteY3"/>
+                </a:cxn>
+                <a:cxn ang="0">
+                  <a:pos x="connsiteX4" y="connsiteY4"/>
+                </a:cxn>
+              </a:cxnLst>
+              <a:rect l="l" t="t" r="r" b="b"/>
+              <a:pathLst>
+                <a:path w="2779229" h="817919">
+                  <a:moveTo>
+                    <a:pt x="0" y="0"/>
+                  </a:moveTo>
+                  <a:lnTo>
+                    <a:pt x="2779229" y="0"/>
+                  </a:lnTo>
+                  <a:lnTo>
+                    <a:pt x="2755430" y="49404"/>
+                  </a:lnTo>
+                  <a:cubicBezTo>
+                    <a:pt x="2506760" y="507168"/>
+                    <a:pt x="2021765" y="817919"/>
+                    <a:pt x="1464180" y="817919"/>
+                  </a:cubicBezTo>
+                  <a:lnTo>
+                    <a:pt x="0" y="817919"/>
+                  </a:lnTo>
+                  <a:close/>
+                </a:path>
+              </a:pathLst>
+            </a:custGeom>
+            <a:solidFill>
+              <a:schemeClr val="accent1">
+                <a:lumMod val="75000"/>
+              </a:schemeClr>
+            </a:solidFill>
+            <a:ln w="9331" cap="flat">
+              <a:noFill/>
+              <a:prstDash val="solid"/>
+              <a:miter/>
+            </a:ln>
+          </p:spPr>
+          <p:txBody>
+            <a:bodyPr rtlCol="0" anchor="ctr"/>
+            <a:lstStyle/>
+            <a:p>
+              <a:endParaRPr lang="en-US"/>
+            </a:p>
+          </p:txBody>
+        </p:sp>
+      </p:grpSp>
+      <p:sp>
+        <p:nvSpPr>
+          <p:cNvPr id="24" name="Texture">
+            <a:extLst>
+              <a:ext uri="{FF2B5EF4-FFF2-40B4-BE49-F238E27FC236}">
+                <a16:creationId xmlns:a16="http://schemas.microsoft.com/office/drawing/2014/main" id="{2E922E9E-A29B-4164-A634-B718A43369CA}"/>
+              </a:ext>
+              <a:ext uri="{C183D7F6-B498-43B3-948B-1728B52AA6E4}">
+                <adec:decorative xmlns:adec="http://schemas.microsoft.com/office/drawing/2017/decorative" val="1"/>
+              </a:ext>
+            </a:extLst>
+          </p:cNvPr>
+          <p:cNvSpPr>
+            <a:spLocks noGrp="1" noRot="1" noChangeAspect="1" noMove="1" noResize="1" noEditPoints="1" noAdjustHandles="1" noChangeArrowheads="1" noChangeShapeType="1" noTextEdit="1"/>
+          </p:cNvSpPr>
+          <p:nvPr>
+            <p:extLst>
+              <p:ext uri="{386F3935-93C4-4BCD-93E2-E3B085C9AB24}">
+                <p16:designElem xmlns:p16="http://schemas.microsoft.com/office/powerpoint/2015/main" val="1"/>
+              </p:ext>
+            </p:extLst>
+          </p:nvPr>
+        </p:nvSpPr>
+        <p:spPr>
+          <a:xfrm>
+            <a:off x="3048" y="0"/>
+            <a:ext cx="12188952" cy="6858000"/>
+          </a:xfrm>
+          <a:prstGeom prst="rect">
+            <a:avLst/>
+          </a:prstGeom>
+          <a:blipFill dpi="0" rotWithShape="1">
+            <a:blip r:embed="rId2">
+              <a:alphaModFix amt="6000"/>
+            </a:blip>
+            <a:srcRect/>
+            <a:tile tx="0" ty="0" sx="100000" sy="100000" flip="none" algn="tl"/>
+          </a:blipFill>
+          <a:ln w="9525" cap="flat">
+            <a:noFill/>
+            <a:prstDash val="solid"/>
+            <a:miter/>
+          </a:ln>
+        </p:spPr>
+        <p:txBody>
+          <a:bodyPr rtlCol="0" anchor="ctr"/>
+          <a:lstStyle/>
+          <a:p>
+            <a:endParaRPr lang="en-US" dirty="0"/>
+          </a:p>
+        </p:txBody>
+      </p:sp>
+      <p:sp>
+        <p:nvSpPr>
+          <p:cNvPr id="2" name="Title 1">
+            <a:extLst>
+              <a:ext uri="{FF2B5EF4-FFF2-40B4-BE49-F238E27FC236}">
+                <a16:creationId xmlns:a16="http://schemas.microsoft.com/office/drawing/2014/main" id="{6E9A8FF1-89C5-4816-A5AA-A92FD91695B9}"/>
+              </a:ext>
+            </a:extLst>
+          </p:cNvPr>
+          <p:cNvSpPr>
+            <a:spLocks noGrp="1"/>
+          </p:cNvSpPr>
+          <p:nvPr>
+            <p:ph type="title"/>
+          </p:nvPr>
+        </p:nvSpPr>
+        <p:spPr>
+          <a:xfrm>
+            <a:off x="457200" y="758952"/>
+            <a:ext cx="6943725" cy="1325563"/>
+          </a:xfrm>
+        </p:spPr>
+        <p:txBody>
+          <a:bodyPr anchor="b">
+            <a:normAutofit/>
+          </a:bodyPr>
+          <a:lstStyle/>
+          <a:p>
+            <a:r>
+              <a:rPr lang="en-US" dirty="0"/>
+              <a:t>Struggles</a:t>
+            </a:r>
+          </a:p>
+        </p:txBody>
+      </p:sp>
+      <p:sp>
+        <p:nvSpPr>
+          <p:cNvPr id="3" name="Content Placeholder 2">
+            <a:extLst>
+              <a:ext uri="{FF2B5EF4-FFF2-40B4-BE49-F238E27FC236}">
+                <a16:creationId xmlns:a16="http://schemas.microsoft.com/office/drawing/2014/main" id="{B5B5FE5A-58DD-46FE-B641-060792E939AD}"/>
+              </a:ext>
+            </a:extLst>
+          </p:cNvPr>
+          <p:cNvSpPr>
+            <a:spLocks noGrp="1"/>
+          </p:cNvSpPr>
+          <p:nvPr>
+            <p:ph idx="1"/>
+          </p:nvPr>
+        </p:nvSpPr>
+        <p:spPr>
+          <a:xfrm>
+            <a:off x="457200" y="2286000"/>
+            <a:ext cx="6943725" cy="3872995"/>
+          </a:xfrm>
+        </p:spPr>
+        <p:txBody>
+          <a:bodyPr>
+            <a:normAutofit/>
+          </a:bodyPr>
+          <a:lstStyle/>
+          <a:p>
+            <a:r>
+              <a:rPr lang="en-US" dirty="0"/>
+              <a:t>Being able to integrate the bot with Lambda and using voice chat rather than text chat</a:t>
+            </a:r>
+          </a:p>
+          <a:p>
+            <a:r>
+              <a:rPr lang="en-US" dirty="0"/>
+              <a:t>Getting a large amount of data and then cleaning it for the user</a:t>
+            </a:r>
+          </a:p>
+          <a:p>
+            <a:r>
+              <a:rPr lang="en-US" dirty="0"/>
+              <a:t>Finding the machine learning that correctly fit with our goal at RoCry</a:t>
+            </a:r>
+          </a:p>
+          <a:p>
+            <a:r>
+              <a:rPr lang="en-US" dirty="0"/>
+              <a:t>Speech bot only works with Google and not Lex</a:t>
+            </a:r>
+          </a:p>
+        </p:txBody>
+      </p:sp>
+      <p:pic>
+        <p:nvPicPr>
+          <p:cNvPr id="6" name="Picture 5">
+            <a:extLst>
+              <a:ext uri="{FF2B5EF4-FFF2-40B4-BE49-F238E27FC236}">
+                <a16:creationId xmlns:a16="http://schemas.microsoft.com/office/drawing/2014/main" id="{97F5ED44-6668-401E-AD94-8D97CB6C559A}"/>
+              </a:ext>
+            </a:extLst>
+          </p:cNvPr>
+          <p:cNvPicPr>
+            <a:picLocks noChangeAspect="1"/>
+          </p:cNvPicPr>
+          <p:nvPr/>
+        </p:nvPicPr>
+        <p:blipFill>
+          <a:blip r:embed="rId3"/>
+          <a:stretch>
+            <a:fillRect/>
+          </a:stretch>
+        </p:blipFill>
+        <p:spPr>
+          <a:xfrm>
+            <a:off x="9538577" y="1614529"/>
+            <a:ext cx="1521486" cy="2442050"/>
+          </a:xfrm>
+          <a:prstGeom prst="rect">
+            <a:avLst/>
+          </a:prstGeom>
+        </p:spPr>
+      </p:pic>
+    </p:spTree>
+    <p:extLst>
+      <p:ext uri="{BB962C8B-B14F-4D97-AF65-F5344CB8AC3E}">
+        <p14:creationId xmlns:p14="http://schemas.microsoft.com/office/powerpoint/2010/main" val="701105779"/>
+      </p:ext>
+    </p:extLst>
+  </p:cSld>
+  <p:clrMapOvr>
+    <a:masterClrMapping/>
+  </p:clrMapOvr>
+</p:sld>
+</file>
+
+<file path=ppt/slides/slide8.xml><?xml version="1.0" encoding="utf-8"?>
 <p:sld xmlns:a="http://schemas.openxmlformats.org/drawingml/2006/main" xmlns:r="http://schemas.openxmlformats.org/officeDocument/2006/relationships" xmlns:p="http://schemas.openxmlformats.org/presentationml/2006/main">
   <p:cSld>
     <p:bg>
@@ -15693,6 +18748,23 @@
               <a:t>Build on with our site and create an even more interactive UI for the user</a:t>
             </a:r>
           </a:p>
+          <a:p>
+            <a:r>
+              <a:rPr lang="en-US" dirty="0"/>
+              <a:t>Have RoCry be voice activated and be able to handle a full transaction</a:t>
+            </a:r>
+          </a:p>
+          <a:p>
+            <a:r>
+              <a:rPr lang="en-US" dirty="0"/>
+              <a:t>Be able to implement machine learning/natural language processing for RoCry to be constantly </a:t>
+            </a:r>
+            <a:r>
+              <a:rPr lang="en-US" dirty="0" err="1"/>
+              <a:t>evovling</a:t>
+            </a:r>
+            <a:endParaRPr lang="en-US" dirty="0"/>
+          </a:p>
         </p:txBody>
       </p:sp>
       <p:pic>
@@ -15738,1056 +18810,7 @@
 </p:sld>
 </file>
 
-<file path=ppt/slides/slide6.xml><?xml version="1.0" encoding="utf-8"?>
-<p:sld xmlns:a="http://schemas.openxmlformats.org/drawingml/2006/main" xmlns:r="http://schemas.openxmlformats.org/officeDocument/2006/relationships" xmlns:p="http://schemas.openxmlformats.org/presentationml/2006/main">
-  <p:cSld>
-    <p:bg>
-      <p:bgPr>
-        <a:solidFill>
-          <a:schemeClr val="bg2"/>
-        </a:solidFill>
-        <a:effectLst/>
-      </p:bgPr>
-    </p:bg>
-    <p:spTree>
-      <p:nvGrpSpPr>
-        <p:cNvPr id="1" name=""/>
-        <p:cNvGrpSpPr/>
-        <p:nvPr/>
-      </p:nvGrpSpPr>
-      <p:grpSpPr>
-        <a:xfrm>
-          <a:off x="0" y="0"/>
-          <a:ext cx="0" cy="0"/>
-          <a:chOff x="0" y="0"/>
-          <a:chExt cx="0" cy="0"/>
-        </a:xfrm>
-      </p:grpSpPr>
-      <p:sp useBgFill="1">
-        <p:nvSpPr>
-          <p:cNvPr id="11" name="Background Fill">
-            <a:extLst>
-              <a:ext uri="{FF2B5EF4-FFF2-40B4-BE49-F238E27FC236}">
-                <a16:creationId xmlns:a16="http://schemas.microsoft.com/office/drawing/2014/main" id="{FAFB3478-4AEC-431E-93B2-1593839C16DA}"/>
-              </a:ext>
-              <a:ext uri="{C183D7F6-B498-43B3-948B-1728B52AA6E4}">
-                <adec:decorative xmlns:adec="http://schemas.microsoft.com/office/drawing/2017/decorative" val="1"/>
-              </a:ext>
-            </a:extLst>
-          </p:cNvPr>
-          <p:cNvSpPr>
-            <a:spLocks noGrp="1" noRot="1" noChangeAspect="1" noMove="1" noResize="1" noEditPoints="1" noAdjustHandles="1" noChangeArrowheads="1" noChangeShapeType="1" noTextEdit="1"/>
-          </p:cNvSpPr>
-          <p:nvPr>
-            <p:extLst>
-              <p:ext uri="{386F3935-93C4-4BCD-93E2-E3B085C9AB24}">
-                <p16:designElem xmlns:p16="http://schemas.microsoft.com/office/powerpoint/2015/main" val="1"/>
-              </p:ext>
-            </p:extLst>
-          </p:nvPr>
-        </p:nvSpPr>
-        <p:spPr>
-          <a:xfrm>
-            <a:off x="0" y="0"/>
-            <a:ext cx="12192000" cy="6858000"/>
-          </a:xfrm>
-          <a:prstGeom prst="rect">
-            <a:avLst/>
-          </a:prstGeom>
-          <a:ln w="9525" cap="flat">
-            <a:noFill/>
-            <a:prstDash val="solid"/>
-            <a:miter/>
-          </a:ln>
-        </p:spPr>
-        <p:txBody>
-          <a:bodyPr rtlCol="0" anchor="ctr"/>
-          <a:lstStyle/>
-          <a:p>
-            <a:endParaRPr lang="en-US">
-              <a:solidFill>
-                <a:schemeClr val="tx1"/>
-              </a:solidFill>
-            </a:endParaRPr>
-          </a:p>
-        </p:txBody>
-      </p:sp>
-      <p:sp>
-        <p:nvSpPr>
-          <p:cNvPr id="13" name="Color Fill">
-            <a:extLst>
-              <a:ext uri="{FF2B5EF4-FFF2-40B4-BE49-F238E27FC236}">
-                <a16:creationId xmlns:a16="http://schemas.microsoft.com/office/drawing/2014/main" id="{5AABFA05-E806-48B0-BA38-42F01BD6324C}"/>
-              </a:ext>
-              <a:ext uri="{C183D7F6-B498-43B3-948B-1728B52AA6E4}">
-                <adec:decorative xmlns:adec="http://schemas.microsoft.com/office/drawing/2017/decorative" val="1"/>
-              </a:ext>
-            </a:extLst>
-          </p:cNvPr>
-          <p:cNvSpPr>
-            <a:spLocks noGrp="1" noRot="1" noChangeAspect="1" noMove="1" noResize="1" noEditPoints="1" noAdjustHandles="1" noChangeArrowheads="1" noChangeShapeType="1" noTextEdit="1"/>
-          </p:cNvSpPr>
-          <p:nvPr>
-            <p:extLst>
-              <p:ext uri="{386F3935-93C4-4BCD-93E2-E3B085C9AB24}">
-                <p16:designElem xmlns:p16="http://schemas.microsoft.com/office/powerpoint/2015/main" val="1"/>
-              </p:ext>
-            </p:extLst>
-          </p:nvPr>
-        </p:nvSpPr>
-        <p:spPr>
-          <a:xfrm>
-            <a:off x="0" y="0"/>
-            <a:ext cx="12188952" cy="6858000"/>
-          </a:xfrm>
-          <a:prstGeom prst="rect">
-            <a:avLst/>
-          </a:prstGeom>
-          <a:solidFill>
-            <a:schemeClr val="bg2">
-              <a:lumMod val="75000"/>
-              <a:lumOff val="25000"/>
-              <a:alpha val="40000"/>
-            </a:schemeClr>
-          </a:solidFill>
-          <a:ln w="9525" cap="flat">
-            <a:noFill/>
-            <a:prstDash val="solid"/>
-            <a:miter/>
-          </a:ln>
-        </p:spPr>
-        <p:txBody>
-          <a:bodyPr rtlCol="0" anchor="ctr"/>
-          <a:lstStyle/>
-          <a:p>
-            <a:endParaRPr lang="en-US" dirty="0">
-              <a:solidFill>
-                <a:schemeClr val="bg2">
-                  <a:lumMod val="75000"/>
-                  <a:lumOff val="25000"/>
-                </a:schemeClr>
-              </a:solidFill>
-            </a:endParaRPr>
-          </a:p>
-        </p:txBody>
-      </p:sp>
-      <p:grpSp>
-        <p:nvGrpSpPr>
-          <p:cNvPr id="15" name="Group 14">
-            <a:extLst>
-              <a:ext uri="{FF2B5EF4-FFF2-40B4-BE49-F238E27FC236}">
-                <a16:creationId xmlns:a16="http://schemas.microsoft.com/office/drawing/2014/main" id="{42DDC377-BE64-4F1B-80B7-057C9566551E}"/>
-              </a:ext>
-              <a:ext uri="{C183D7F6-B498-43B3-948B-1728B52AA6E4}">
-                <adec:decorative xmlns:adec="http://schemas.microsoft.com/office/drawing/2017/decorative" val="1"/>
-              </a:ext>
-            </a:extLst>
-          </p:cNvPr>
-          <p:cNvGrpSpPr>
-            <a:grpSpLocks noGrp="1" noUngrp="1" noRot="1" noChangeAspect="1" noMove="1" noResize="1"/>
-          </p:cNvGrpSpPr>
-          <p:nvPr>
-            <p:extLst>
-              <p:ext uri="{386F3935-93C4-4BCD-93E2-E3B085C9AB24}">
-                <p16:designElem xmlns:p16="http://schemas.microsoft.com/office/powerpoint/2015/main" val="1"/>
-              </p:ext>
-            </p:extLst>
-          </p:nvPr>
-        </p:nvGrpSpPr>
-        <p:grpSpPr>
-          <a:xfrm>
-            <a:off x="7935972" y="-1"/>
-            <a:ext cx="4112311" cy="6858001"/>
-            <a:chOff x="7935972" y="-1"/>
-            <a:chExt cx="4112311" cy="6858001"/>
-          </a:xfrm>
-        </p:grpSpPr>
-        <p:sp>
-          <p:nvSpPr>
-            <p:cNvPr id="16" name="Oval 15">
-              <a:extLst>
-                <a:ext uri="{FF2B5EF4-FFF2-40B4-BE49-F238E27FC236}">
-                  <a16:creationId xmlns:a16="http://schemas.microsoft.com/office/drawing/2014/main" id="{704EC963-D536-4453-AA53-8431AB5EFFD1}"/>
-                </a:ext>
-                <a:ext uri="{C183D7F6-B498-43B3-948B-1728B52AA6E4}">
-                  <adec:decorative xmlns:adec="http://schemas.microsoft.com/office/drawing/2017/decorative" val="1"/>
-                </a:ext>
-              </a:extLst>
-            </p:cNvPr>
-            <p:cNvSpPr/>
-            <p:nvPr>
-              <p:extLst>
-                <p:ext uri="{386F3935-93C4-4BCD-93E2-E3B085C9AB24}">
-                  <p16:designElem xmlns:p16="http://schemas.microsoft.com/office/powerpoint/2015/main" val="1"/>
-                </p:ext>
-              </p:extLst>
-            </p:nvPr>
-          </p:nvSpPr>
-          <p:spPr>
-            <a:xfrm>
-              <a:off x="11450769" y="756967"/>
-              <a:ext cx="438100" cy="438100"/>
-            </a:xfrm>
-            <a:prstGeom prst="ellipse">
-              <a:avLst/>
-            </a:prstGeom>
-            <a:solidFill>
-              <a:schemeClr val="accent2"/>
-            </a:solidFill>
-            <a:ln>
-              <a:noFill/>
-            </a:ln>
-          </p:spPr>
-          <p:style>
-            <a:lnRef idx="2">
-              <a:schemeClr val="accent1">
-                <a:shade val="50000"/>
-              </a:schemeClr>
-            </a:lnRef>
-            <a:fillRef idx="1">
-              <a:schemeClr val="accent1"/>
-            </a:fillRef>
-            <a:effectRef idx="0">
-              <a:schemeClr val="accent1"/>
-            </a:effectRef>
-            <a:fontRef idx="minor">
-              <a:schemeClr val="lt1"/>
-            </a:fontRef>
-          </p:style>
-          <p:txBody>
-            <a:bodyPr rtlCol="0" anchor="ctr"/>
-            <a:lstStyle/>
-            <a:p>
-              <a:pPr algn="ctr"/>
-              <a:endParaRPr lang="en-US"/>
-            </a:p>
-          </p:txBody>
-        </p:sp>
-        <p:sp>
-          <p:nvSpPr>
-            <p:cNvPr id="17" name="Graphic 18">
-              <a:extLst>
-                <a:ext uri="{FF2B5EF4-FFF2-40B4-BE49-F238E27FC236}">
-                  <a16:creationId xmlns:a16="http://schemas.microsoft.com/office/drawing/2014/main" id="{9830F5A7-3C8A-4FDD-A9D3-679558CA64F9}"/>
-                </a:ext>
-                <a:ext uri="{C183D7F6-B498-43B3-948B-1728B52AA6E4}">
-                  <adec:decorative xmlns:adec="http://schemas.microsoft.com/office/drawing/2017/decorative" val="1"/>
-                </a:ext>
-              </a:extLst>
-            </p:cNvPr>
-            <p:cNvSpPr/>
-            <p:nvPr>
-              <p:extLst>
-                <p:ext uri="{386F3935-93C4-4BCD-93E2-E3B085C9AB24}">
-                  <p16:designElem xmlns:p16="http://schemas.microsoft.com/office/powerpoint/2015/main" val="1"/>
-                </p:ext>
-              </p:extLst>
-            </p:nvPr>
-          </p:nvSpPr>
-          <p:spPr>
-            <a:xfrm>
-              <a:off x="7935972" y="4013148"/>
-              <a:ext cx="813897" cy="1240422"/>
-            </a:xfrm>
-            <a:custGeom>
-              <a:avLst/>
-              <a:gdLst>
-                <a:gd name="connsiteX0" fmla="*/ 3413379 w 3413378"/>
-                <a:gd name="connsiteY0" fmla="*/ 3266028 h 6532054"/>
-                <a:gd name="connsiteX1" fmla="*/ 1706689 w 3413378"/>
-                <a:gd name="connsiteY1" fmla="*/ 6532055 h 6532054"/>
-                <a:gd name="connsiteX2" fmla="*/ 0 w 3413378"/>
-                <a:gd name="connsiteY2" fmla="*/ 3266028 h 6532054"/>
-                <a:gd name="connsiteX3" fmla="*/ 1706689 w 3413378"/>
-                <a:gd name="connsiteY3" fmla="*/ 0 h 6532054"/>
-                <a:gd name="connsiteX4" fmla="*/ 3413379 w 3413378"/>
-                <a:gd name="connsiteY4" fmla="*/ 3266028 h 6532054"/>
-              </a:gdLst>
-              <a:ahLst/>
-              <a:cxnLst>
-                <a:cxn ang="0">
-                  <a:pos x="connsiteX0" y="connsiteY0"/>
-                </a:cxn>
-                <a:cxn ang="0">
-                  <a:pos x="connsiteX1" y="connsiteY1"/>
-                </a:cxn>
-                <a:cxn ang="0">
-                  <a:pos x="connsiteX2" y="connsiteY2"/>
-                </a:cxn>
-                <a:cxn ang="0">
-                  <a:pos x="connsiteX3" y="connsiteY3"/>
-                </a:cxn>
-                <a:cxn ang="0">
-                  <a:pos x="connsiteX4" y="connsiteY4"/>
-                </a:cxn>
-              </a:cxnLst>
-              <a:rect l="l" t="t" r="r" b="b"/>
-              <a:pathLst>
-                <a:path w="3413378" h="6532054">
-                  <a:moveTo>
-                    <a:pt x="3413379" y="3266028"/>
-                  </a:moveTo>
-                  <a:cubicBezTo>
-                    <a:pt x="3413379" y="5069777"/>
-                    <a:pt x="1706689" y="6532055"/>
-                    <a:pt x="1706689" y="6532055"/>
-                  </a:cubicBezTo>
-                  <a:cubicBezTo>
-                    <a:pt x="1706689" y="6532055"/>
-                    <a:pt x="0" y="5069777"/>
-                    <a:pt x="0" y="3266028"/>
-                  </a:cubicBezTo>
-                  <a:cubicBezTo>
-                    <a:pt x="0" y="1462278"/>
-                    <a:pt x="1706689" y="0"/>
-                    <a:pt x="1706689" y="0"/>
-                  </a:cubicBezTo>
-                  <a:cubicBezTo>
-                    <a:pt x="1706689" y="0"/>
-                    <a:pt x="3413379" y="1462278"/>
-                    <a:pt x="3413379" y="3266028"/>
-                  </a:cubicBezTo>
-                  <a:close/>
-                </a:path>
-              </a:pathLst>
-            </a:custGeom>
-            <a:pattFill prst="pct5">
-              <a:fgClr>
-                <a:schemeClr val="accent4">
-                  <a:lumMod val="60000"/>
-                  <a:lumOff val="40000"/>
-                </a:schemeClr>
-              </a:fgClr>
-              <a:bgClr>
-                <a:schemeClr val="accent1">
-                  <a:lumMod val="75000"/>
-                </a:schemeClr>
-              </a:bgClr>
-            </a:pattFill>
-            <a:ln w="9525" cap="flat">
-              <a:noFill/>
-              <a:prstDash val="solid"/>
-              <a:miter/>
-            </a:ln>
-          </p:spPr>
-          <p:txBody>
-            <a:bodyPr rtlCol="0" anchor="ctr"/>
-            <a:lstStyle/>
-            <a:p>
-              <a:endParaRPr lang="en-US" dirty="0"/>
-            </a:p>
-          </p:txBody>
-        </p:sp>
-        <p:sp>
-          <p:nvSpPr>
-            <p:cNvPr id="18" name="Graphic 9">
-              <a:extLst>
-                <a:ext uri="{FF2B5EF4-FFF2-40B4-BE49-F238E27FC236}">
-                  <a16:creationId xmlns:a16="http://schemas.microsoft.com/office/drawing/2014/main" id="{279D6A93-291B-4380-BF71-74648EA48FA5}"/>
-                </a:ext>
-                <a:ext uri="{C183D7F6-B498-43B3-948B-1728B52AA6E4}">
-                  <adec:decorative xmlns:adec="http://schemas.microsoft.com/office/drawing/2017/decorative" val="1"/>
-                </a:ext>
-              </a:extLst>
-            </p:cNvPr>
-            <p:cNvSpPr/>
-            <p:nvPr>
-              <p:extLst>
-                <p:ext uri="{386F3935-93C4-4BCD-93E2-E3B085C9AB24}">
-                  <p16:designElem xmlns:p16="http://schemas.microsoft.com/office/powerpoint/2015/main" val="1"/>
-                </p:ext>
-              </p:extLst>
-            </p:nvPr>
-          </p:nvSpPr>
-          <p:spPr>
-            <a:xfrm>
-              <a:off x="8508034" y="1063796"/>
-              <a:ext cx="3518852" cy="3518851"/>
-            </a:xfrm>
-            <a:custGeom>
-              <a:avLst/>
-              <a:gdLst>
-                <a:gd name="connsiteX0" fmla="*/ 6861546 w 6861545"/>
-                <a:gd name="connsiteY0" fmla="*/ 6861546 h 6861545"/>
-                <a:gd name="connsiteX1" fmla="*/ 3435812 w 6861545"/>
-                <a:gd name="connsiteY1" fmla="*/ 6861546 h 6861545"/>
-                <a:gd name="connsiteX2" fmla="*/ 0 w 6861545"/>
-                <a:gd name="connsiteY2" fmla="*/ 3425734 h 6861545"/>
-                <a:gd name="connsiteX3" fmla="*/ 0 w 6861545"/>
-                <a:gd name="connsiteY3" fmla="*/ 0 h 6861545"/>
-                <a:gd name="connsiteX4" fmla="*/ 3425734 w 6861545"/>
-                <a:gd name="connsiteY4" fmla="*/ 0 h 6861545"/>
-                <a:gd name="connsiteX5" fmla="*/ 6861546 w 6861545"/>
-                <a:gd name="connsiteY5" fmla="*/ 3435812 h 6861545"/>
-                <a:gd name="connsiteX6" fmla="*/ 6861546 w 6861545"/>
-                <a:gd name="connsiteY6" fmla="*/ 6861546 h 6861545"/>
-              </a:gdLst>
-              <a:ahLst/>
-              <a:cxnLst>
-                <a:cxn ang="0">
-                  <a:pos x="connsiteX0" y="connsiteY0"/>
-                </a:cxn>
-                <a:cxn ang="0">
-                  <a:pos x="connsiteX1" y="connsiteY1"/>
-                </a:cxn>
-                <a:cxn ang="0">
-                  <a:pos x="connsiteX2" y="connsiteY2"/>
-                </a:cxn>
-                <a:cxn ang="0">
-                  <a:pos x="connsiteX3" y="connsiteY3"/>
-                </a:cxn>
-                <a:cxn ang="0">
-                  <a:pos x="connsiteX4" y="connsiteY4"/>
-                </a:cxn>
-                <a:cxn ang="0">
-                  <a:pos x="connsiteX5" y="connsiteY5"/>
-                </a:cxn>
-                <a:cxn ang="0">
-                  <a:pos x="connsiteX6" y="connsiteY6"/>
-                </a:cxn>
-              </a:cxnLst>
-              <a:rect l="l" t="t" r="r" b="b"/>
-              <a:pathLst>
-                <a:path w="6861545" h="6861545">
-                  <a:moveTo>
-                    <a:pt x="6861546" y="6861546"/>
-                  </a:moveTo>
-                  <a:lnTo>
-                    <a:pt x="3435812" y="6861546"/>
-                  </a:lnTo>
-                  <a:cubicBezTo>
-                    <a:pt x="1538245" y="6861546"/>
-                    <a:pt x="0" y="5323301"/>
-                    <a:pt x="0" y="3425734"/>
-                  </a:cubicBezTo>
-                  <a:lnTo>
-                    <a:pt x="0" y="0"/>
-                  </a:lnTo>
-                  <a:lnTo>
-                    <a:pt x="3425734" y="0"/>
-                  </a:lnTo>
-                  <a:cubicBezTo>
-                    <a:pt x="5323301" y="0"/>
-                    <a:pt x="6861546" y="1538245"/>
-                    <a:pt x="6861546" y="3435812"/>
-                  </a:cubicBezTo>
-                  <a:lnTo>
-                    <a:pt x="6861546" y="6861546"/>
-                  </a:lnTo>
-                  <a:close/>
-                </a:path>
-              </a:pathLst>
-            </a:custGeom>
-            <a:pattFill prst="pct5">
-              <a:fgClr>
-                <a:schemeClr val="accent4">
-                  <a:lumMod val="75000"/>
-                </a:schemeClr>
-              </a:fgClr>
-              <a:bgClr>
-                <a:schemeClr val="accent4">
-                  <a:lumMod val="60000"/>
-                  <a:lumOff val="40000"/>
-                </a:schemeClr>
-              </a:bgClr>
-            </a:pattFill>
-            <a:ln w="9525" cap="flat">
-              <a:noFill/>
-              <a:prstDash val="solid"/>
-              <a:miter/>
-            </a:ln>
-          </p:spPr>
-          <p:txBody>
-            <a:bodyPr rtlCol="0" anchor="ctr"/>
-            <a:lstStyle/>
-            <a:p>
-              <a:endParaRPr lang="en-US" dirty="0"/>
-            </a:p>
-          </p:txBody>
-        </p:sp>
-        <p:sp>
-          <p:nvSpPr>
-            <p:cNvPr id="19" name="Oval 18">
-              <a:extLst>
-                <a:ext uri="{FF2B5EF4-FFF2-40B4-BE49-F238E27FC236}">
-                  <a16:creationId xmlns:a16="http://schemas.microsoft.com/office/drawing/2014/main" id="{67F4B6ED-6E4B-4600-BF49-D0B0A2F6EBAF}"/>
-                </a:ext>
-                <a:ext uri="{C183D7F6-B498-43B3-948B-1728B52AA6E4}">
-                  <adec:decorative xmlns:adec="http://schemas.microsoft.com/office/drawing/2017/decorative" val="1"/>
-                </a:ext>
-              </a:extLst>
-            </p:cNvPr>
-            <p:cNvSpPr/>
-            <p:nvPr>
-              <p:extLst>
-                <p:ext uri="{386F3935-93C4-4BCD-93E2-E3B085C9AB24}">
-                  <p16:designElem xmlns:p16="http://schemas.microsoft.com/office/powerpoint/2015/main" val="1"/>
-                </p:ext>
-              </p:extLst>
-            </p:nvPr>
-          </p:nvSpPr>
-          <p:spPr>
-            <a:xfrm>
-              <a:off x="9012156" y="4526823"/>
-              <a:ext cx="260714" cy="260714"/>
-            </a:xfrm>
-            <a:prstGeom prst="ellipse">
-              <a:avLst/>
-            </a:prstGeom>
-            <a:solidFill>
-              <a:schemeClr val="accent1">
-                <a:lumMod val="60000"/>
-                <a:lumOff val="40000"/>
-              </a:schemeClr>
-            </a:solidFill>
-            <a:ln w="9331" cap="flat">
-              <a:noFill/>
-              <a:prstDash val="solid"/>
-              <a:miter/>
-            </a:ln>
-          </p:spPr>
-          <p:txBody>
-            <a:bodyPr rtlCol="0" anchor="ctr"/>
-            <a:lstStyle/>
-            <a:p>
-              <a:endParaRPr lang="en-US">
-                <a:solidFill>
-                  <a:schemeClr val="tx1"/>
-                </a:solidFill>
-              </a:endParaRPr>
-            </a:p>
-          </p:txBody>
-        </p:sp>
-        <p:sp>
-          <p:nvSpPr>
-            <p:cNvPr id="20" name="Graphic 9">
-              <a:extLst>
-                <a:ext uri="{FF2B5EF4-FFF2-40B4-BE49-F238E27FC236}">
-                  <a16:creationId xmlns:a16="http://schemas.microsoft.com/office/drawing/2014/main" id="{C7015312-5A36-4C0D-8547-E8CCA22DCA3C}"/>
-                </a:ext>
-                <a:ext uri="{C183D7F6-B498-43B3-948B-1728B52AA6E4}">
-                  <adec:decorative xmlns:adec="http://schemas.microsoft.com/office/drawing/2017/decorative" val="1"/>
-                </a:ext>
-              </a:extLst>
-            </p:cNvPr>
-            <p:cNvSpPr/>
-            <p:nvPr>
-              <p:extLst>
-                <p:ext uri="{386F3935-93C4-4BCD-93E2-E3B085C9AB24}">
-                  <p16:designElem xmlns:p16="http://schemas.microsoft.com/office/powerpoint/2015/main" val="1"/>
-                </p:ext>
-              </p:extLst>
-            </p:nvPr>
-          </p:nvSpPr>
-          <p:spPr>
-            <a:xfrm>
-              <a:off x="8508034" y="1063157"/>
-              <a:ext cx="3540249" cy="3540247"/>
-            </a:xfrm>
-            <a:custGeom>
-              <a:avLst/>
-              <a:gdLst>
-                <a:gd name="connsiteX0" fmla="*/ 6861546 w 6861545"/>
-                <a:gd name="connsiteY0" fmla="*/ 6861546 h 6861545"/>
-                <a:gd name="connsiteX1" fmla="*/ 3435812 w 6861545"/>
-                <a:gd name="connsiteY1" fmla="*/ 6861546 h 6861545"/>
-                <a:gd name="connsiteX2" fmla="*/ 0 w 6861545"/>
-                <a:gd name="connsiteY2" fmla="*/ 3425734 h 6861545"/>
-                <a:gd name="connsiteX3" fmla="*/ 0 w 6861545"/>
-                <a:gd name="connsiteY3" fmla="*/ 0 h 6861545"/>
-                <a:gd name="connsiteX4" fmla="*/ 3425734 w 6861545"/>
-                <a:gd name="connsiteY4" fmla="*/ 0 h 6861545"/>
-                <a:gd name="connsiteX5" fmla="*/ 6861546 w 6861545"/>
-                <a:gd name="connsiteY5" fmla="*/ 3435812 h 6861545"/>
-                <a:gd name="connsiteX6" fmla="*/ 6861546 w 6861545"/>
-                <a:gd name="connsiteY6" fmla="*/ 6861546 h 6861545"/>
-              </a:gdLst>
-              <a:ahLst/>
-              <a:cxnLst>
-                <a:cxn ang="0">
-                  <a:pos x="connsiteX0" y="connsiteY0"/>
-                </a:cxn>
-                <a:cxn ang="0">
-                  <a:pos x="connsiteX1" y="connsiteY1"/>
-                </a:cxn>
-                <a:cxn ang="0">
-                  <a:pos x="connsiteX2" y="connsiteY2"/>
-                </a:cxn>
-                <a:cxn ang="0">
-                  <a:pos x="connsiteX3" y="connsiteY3"/>
-                </a:cxn>
-                <a:cxn ang="0">
-                  <a:pos x="connsiteX4" y="connsiteY4"/>
-                </a:cxn>
-                <a:cxn ang="0">
-                  <a:pos x="connsiteX5" y="connsiteY5"/>
-                </a:cxn>
-                <a:cxn ang="0">
-                  <a:pos x="connsiteX6" y="connsiteY6"/>
-                </a:cxn>
-              </a:cxnLst>
-              <a:rect l="l" t="t" r="r" b="b"/>
-              <a:pathLst>
-                <a:path w="6861545" h="6861545">
-                  <a:moveTo>
-                    <a:pt x="6861546" y="6861546"/>
-                  </a:moveTo>
-                  <a:lnTo>
-                    <a:pt x="3435812" y="6861546"/>
-                  </a:lnTo>
-                  <a:cubicBezTo>
-                    <a:pt x="1538245" y="6861546"/>
-                    <a:pt x="0" y="5323301"/>
-                    <a:pt x="0" y="3425734"/>
-                  </a:cubicBezTo>
-                  <a:lnTo>
-                    <a:pt x="0" y="0"/>
-                  </a:lnTo>
-                  <a:lnTo>
-                    <a:pt x="3425734" y="0"/>
-                  </a:lnTo>
-                  <a:cubicBezTo>
-                    <a:pt x="5323301" y="0"/>
-                    <a:pt x="6861546" y="1538245"/>
-                    <a:pt x="6861546" y="3435812"/>
-                  </a:cubicBezTo>
-                  <a:lnTo>
-                    <a:pt x="6861546" y="6861546"/>
-                  </a:lnTo>
-                  <a:close/>
-                </a:path>
-              </a:pathLst>
-            </a:custGeom>
-            <a:solidFill>
-              <a:srgbClr val="FFFFFF"/>
-            </a:solidFill>
-            <a:ln w="38100" cap="flat">
-              <a:solidFill>
-                <a:srgbClr val="F7F7F7"/>
-              </a:solidFill>
-              <a:prstDash val="solid"/>
-              <a:miter/>
-            </a:ln>
-          </p:spPr>
-          <p:txBody>
-            <a:bodyPr rtlCol="0" anchor="ctr"/>
-            <a:lstStyle/>
-            <a:p>
-              <a:endParaRPr lang="en-US" dirty="0"/>
-            </a:p>
-          </p:txBody>
-        </p:sp>
-        <p:sp>
-          <p:nvSpPr>
-            <p:cNvPr id="21" name="Freeform: Shape 20">
-              <a:extLst>
-                <a:ext uri="{FF2B5EF4-FFF2-40B4-BE49-F238E27FC236}">
-                  <a16:creationId xmlns:a16="http://schemas.microsoft.com/office/drawing/2014/main" id="{DE6E37D0-F1F6-4779-A0DD-BE7107CC5ABD}"/>
-                </a:ext>
-                <a:ext uri="{C183D7F6-B498-43B3-948B-1728B52AA6E4}">
-                  <adec:decorative xmlns:adec="http://schemas.microsoft.com/office/drawing/2017/decorative" val="1"/>
-                </a:ext>
-              </a:extLst>
-            </p:cNvPr>
-            <p:cNvSpPr/>
-            <p:nvPr>
-              <p:extLst>
-                <p:ext uri="{386F3935-93C4-4BCD-93E2-E3B085C9AB24}">
-                  <p16:designElem xmlns:p16="http://schemas.microsoft.com/office/powerpoint/2015/main" val="1"/>
-                </p:ext>
-              </p:extLst>
-            </p:nvPr>
-          </p:nvSpPr>
-          <p:spPr>
-            <a:xfrm>
-              <a:off x="8508034" y="4793253"/>
-              <a:ext cx="3518852" cy="2064747"/>
-            </a:xfrm>
-            <a:custGeom>
-              <a:avLst/>
-              <a:gdLst>
-                <a:gd name="connsiteX0" fmla="*/ 1762010 w 3518852"/>
-                <a:gd name="connsiteY0" fmla="*/ 0 h 2212102"/>
-                <a:gd name="connsiteX1" fmla="*/ 3518852 w 3518852"/>
-                <a:gd name="connsiteY1" fmla="*/ 0 h 2212102"/>
-                <a:gd name="connsiteX2" fmla="*/ 3518852 w 3518852"/>
-                <a:gd name="connsiteY2" fmla="*/ 1747195 h 2212102"/>
-                <a:gd name="connsiteX3" fmla="*/ 3483055 w 3518852"/>
-                <a:gd name="connsiteY3" fmla="*/ 2100355 h 2212102"/>
-                <a:gd name="connsiteX4" fmla="*/ 3454163 w 3518852"/>
-                <a:gd name="connsiteY4" fmla="*/ 2212102 h 2212102"/>
-                <a:gd name="connsiteX5" fmla="*/ 0 w 3518852"/>
-                <a:gd name="connsiteY5" fmla="*/ 2212102 h 2212102"/>
-                <a:gd name="connsiteX6" fmla="*/ 0 w 3518852"/>
-                <a:gd name="connsiteY6" fmla="*/ 1752335 h 2212102"/>
-                <a:gd name="connsiteX7" fmla="*/ 1762010 w 3518852"/>
-                <a:gd name="connsiteY7" fmla="*/ 0 h 2212102"/>
-              </a:gdLst>
-              <a:ahLst/>
-              <a:cxnLst>
-                <a:cxn ang="0">
-                  <a:pos x="connsiteX0" y="connsiteY0"/>
-                </a:cxn>
-                <a:cxn ang="0">
-                  <a:pos x="connsiteX1" y="connsiteY1"/>
-                </a:cxn>
-                <a:cxn ang="0">
-                  <a:pos x="connsiteX2" y="connsiteY2"/>
-                </a:cxn>
-                <a:cxn ang="0">
-                  <a:pos x="connsiteX3" y="connsiteY3"/>
-                </a:cxn>
-                <a:cxn ang="0">
-                  <a:pos x="connsiteX4" y="connsiteY4"/>
-                </a:cxn>
-                <a:cxn ang="0">
-                  <a:pos x="connsiteX5" y="connsiteY5"/>
-                </a:cxn>
-                <a:cxn ang="0">
-                  <a:pos x="connsiteX6" y="connsiteY6"/>
-                </a:cxn>
-                <a:cxn ang="0">
-                  <a:pos x="connsiteX7" y="connsiteY7"/>
-                </a:cxn>
-              </a:cxnLst>
-              <a:rect l="l" t="t" r="r" b="b"/>
-              <a:pathLst>
-                <a:path w="3518852" h="2212102">
-                  <a:moveTo>
-                    <a:pt x="1762010" y="0"/>
-                  </a:moveTo>
-                  <a:lnTo>
-                    <a:pt x="3518852" y="0"/>
-                  </a:lnTo>
-                  <a:lnTo>
-                    <a:pt x="3518852" y="1747195"/>
-                  </a:lnTo>
-                  <a:cubicBezTo>
-                    <a:pt x="3518852" y="1868170"/>
-                    <a:pt x="3506526" y="1986282"/>
-                    <a:pt x="3483055" y="2100355"/>
-                  </a:cubicBezTo>
-                  <a:lnTo>
-                    <a:pt x="3454163" y="2212102"/>
-                  </a:lnTo>
-                  <a:lnTo>
-                    <a:pt x="0" y="2212102"/>
-                  </a:lnTo>
-                  <a:lnTo>
-                    <a:pt x="0" y="1752335"/>
-                  </a:lnTo>
-                  <a:cubicBezTo>
-                    <a:pt x="0" y="784537"/>
-                    <a:pt x="788868" y="0"/>
-                    <a:pt x="1762010" y="0"/>
-                  </a:cubicBezTo>
-                  <a:close/>
-                </a:path>
-              </a:pathLst>
-            </a:custGeom>
-            <a:solidFill>
-              <a:schemeClr val="accent4">
-                <a:lumMod val="40000"/>
-                <a:lumOff val="60000"/>
-                <a:alpha val="30000"/>
-              </a:schemeClr>
-            </a:solidFill>
-            <a:ln w="9525" cap="flat">
-              <a:noFill/>
-              <a:prstDash val="solid"/>
-              <a:miter/>
-            </a:ln>
-          </p:spPr>
-          <p:txBody>
-            <a:bodyPr wrap="square" rtlCol="0" anchor="ctr">
-              <a:noAutofit/>
-            </a:bodyPr>
-            <a:lstStyle/>
-            <a:p>
-              <a:endParaRPr lang="en-US" dirty="0"/>
-            </a:p>
-          </p:txBody>
-        </p:sp>
-        <p:sp>
-          <p:nvSpPr>
-            <p:cNvPr id="22" name="Freeform: Shape 21">
-              <a:extLst>
-                <a:ext uri="{FF2B5EF4-FFF2-40B4-BE49-F238E27FC236}">
-                  <a16:creationId xmlns:a16="http://schemas.microsoft.com/office/drawing/2014/main" id="{FDB3FC3E-AEEC-4250-B91C-26CA109ED2AB}"/>
-                </a:ext>
-                <a:ext uri="{C183D7F6-B498-43B3-948B-1728B52AA6E4}">
-                  <adec:decorative xmlns:adec="http://schemas.microsoft.com/office/drawing/2017/decorative" val="1"/>
-                </a:ext>
-              </a:extLst>
-            </p:cNvPr>
-            <p:cNvSpPr/>
-            <p:nvPr>
-              <p:extLst>
-                <p:ext uri="{386F3935-93C4-4BCD-93E2-E3B085C9AB24}">
-                  <p16:designElem xmlns:p16="http://schemas.microsoft.com/office/powerpoint/2015/main" val="1"/>
-                </p:ext>
-              </p:extLst>
-            </p:nvPr>
-          </p:nvSpPr>
-          <p:spPr>
-            <a:xfrm>
-              <a:off x="8508785" y="-1"/>
-              <a:ext cx="3316434" cy="976017"/>
-            </a:xfrm>
-            <a:custGeom>
-              <a:avLst/>
-              <a:gdLst>
-                <a:gd name="connsiteX0" fmla="*/ 0 w 2779229"/>
-                <a:gd name="connsiteY0" fmla="*/ 0 h 817919"/>
-                <a:gd name="connsiteX1" fmla="*/ 2779229 w 2779229"/>
-                <a:gd name="connsiteY1" fmla="*/ 0 h 817919"/>
-                <a:gd name="connsiteX2" fmla="*/ 2755430 w 2779229"/>
-                <a:gd name="connsiteY2" fmla="*/ 49404 h 817919"/>
-                <a:gd name="connsiteX3" fmla="*/ 1464180 w 2779229"/>
-                <a:gd name="connsiteY3" fmla="*/ 817919 h 817919"/>
-                <a:gd name="connsiteX4" fmla="*/ 0 w 2779229"/>
-                <a:gd name="connsiteY4" fmla="*/ 817919 h 817919"/>
-              </a:gdLst>
-              <a:ahLst/>
-              <a:cxnLst>
-                <a:cxn ang="0">
-                  <a:pos x="connsiteX0" y="connsiteY0"/>
-                </a:cxn>
-                <a:cxn ang="0">
-                  <a:pos x="connsiteX1" y="connsiteY1"/>
-                </a:cxn>
-                <a:cxn ang="0">
-                  <a:pos x="connsiteX2" y="connsiteY2"/>
-                </a:cxn>
-                <a:cxn ang="0">
-                  <a:pos x="connsiteX3" y="connsiteY3"/>
-                </a:cxn>
-                <a:cxn ang="0">
-                  <a:pos x="connsiteX4" y="connsiteY4"/>
-                </a:cxn>
-              </a:cxnLst>
-              <a:rect l="l" t="t" r="r" b="b"/>
-              <a:pathLst>
-                <a:path w="2779229" h="817919">
-                  <a:moveTo>
-                    <a:pt x="0" y="0"/>
-                  </a:moveTo>
-                  <a:lnTo>
-                    <a:pt x="2779229" y="0"/>
-                  </a:lnTo>
-                  <a:lnTo>
-                    <a:pt x="2755430" y="49404"/>
-                  </a:lnTo>
-                  <a:cubicBezTo>
-                    <a:pt x="2506760" y="507168"/>
-                    <a:pt x="2021765" y="817919"/>
-                    <a:pt x="1464180" y="817919"/>
-                  </a:cubicBezTo>
-                  <a:lnTo>
-                    <a:pt x="0" y="817919"/>
-                  </a:lnTo>
-                  <a:close/>
-                </a:path>
-              </a:pathLst>
-            </a:custGeom>
-            <a:solidFill>
-              <a:schemeClr val="accent1">
-                <a:lumMod val="75000"/>
-              </a:schemeClr>
-            </a:solidFill>
-            <a:ln w="9331" cap="flat">
-              <a:noFill/>
-              <a:prstDash val="solid"/>
-              <a:miter/>
-            </a:ln>
-          </p:spPr>
-          <p:txBody>
-            <a:bodyPr rtlCol="0" anchor="ctr"/>
-            <a:lstStyle/>
-            <a:p>
-              <a:endParaRPr lang="en-US"/>
-            </a:p>
-          </p:txBody>
-        </p:sp>
-      </p:grpSp>
-      <p:sp>
-        <p:nvSpPr>
-          <p:cNvPr id="24" name="Texture">
-            <a:extLst>
-              <a:ext uri="{FF2B5EF4-FFF2-40B4-BE49-F238E27FC236}">
-                <a16:creationId xmlns:a16="http://schemas.microsoft.com/office/drawing/2014/main" id="{2E922E9E-A29B-4164-A634-B718A43369CA}"/>
-              </a:ext>
-              <a:ext uri="{C183D7F6-B498-43B3-948B-1728B52AA6E4}">
-                <adec:decorative xmlns:adec="http://schemas.microsoft.com/office/drawing/2017/decorative" val="1"/>
-              </a:ext>
-            </a:extLst>
-          </p:cNvPr>
-          <p:cNvSpPr>
-            <a:spLocks noGrp="1" noRot="1" noChangeAspect="1" noMove="1" noResize="1" noEditPoints="1" noAdjustHandles="1" noChangeArrowheads="1" noChangeShapeType="1" noTextEdit="1"/>
-          </p:cNvSpPr>
-          <p:nvPr>
-            <p:extLst>
-              <p:ext uri="{386F3935-93C4-4BCD-93E2-E3B085C9AB24}">
-                <p16:designElem xmlns:p16="http://schemas.microsoft.com/office/powerpoint/2015/main" val="1"/>
-              </p:ext>
-            </p:extLst>
-          </p:nvPr>
-        </p:nvSpPr>
-        <p:spPr>
-          <a:xfrm>
-            <a:off x="3048" y="0"/>
-            <a:ext cx="12188952" cy="6858000"/>
-          </a:xfrm>
-          <a:prstGeom prst="rect">
-            <a:avLst/>
-          </a:prstGeom>
-          <a:blipFill dpi="0" rotWithShape="1">
-            <a:blip r:embed="rId2">
-              <a:alphaModFix amt="6000"/>
-            </a:blip>
-            <a:srcRect/>
-            <a:tile tx="0" ty="0" sx="100000" sy="100000" flip="none" algn="tl"/>
-          </a:blipFill>
-          <a:ln w="9525" cap="flat">
-            <a:noFill/>
-            <a:prstDash val="solid"/>
-            <a:miter/>
-          </a:ln>
-        </p:spPr>
-        <p:txBody>
-          <a:bodyPr rtlCol="0" anchor="ctr"/>
-          <a:lstStyle/>
-          <a:p>
-            <a:endParaRPr lang="en-US" dirty="0"/>
-          </a:p>
-        </p:txBody>
-      </p:sp>
-      <p:sp>
-        <p:nvSpPr>
-          <p:cNvPr id="2" name="Title 1">
-            <a:extLst>
-              <a:ext uri="{FF2B5EF4-FFF2-40B4-BE49-F238E27FC236}">
-                <a16:creationId xmlns:a16="http://schemas.microsoft.com/office/drawing/2014/main" id="{6E9A8FF1-89C5-4816-A5AA-A92FD91695B9}"/>
-              </a:ext>
-            </a:extLst>
-          </p:cNvPr>
-          <p:cNvSpPr>
-            <a:spLocks noGrp="1"/>
-          </p:cNvSpPr>
-          <p:nvPr>
-            <p:ph type="title"/>
-          </p:nvPr>
-        </p:nvSpPr>
-        <p:spPr>
-          <a:xfrm>
-            <a:off x="457200" y="758952"/>
-            <a:ext cx="6943725" cy="1325563"/>
-          </a:xfrm>
-        </p:spPr>
-        <p:txBody>
-          <a:bodyPr anchor="b">
-            <a:normAutofit/>
-          </a:bodyPr>
-          <a:lstStyle/>
-          <a:p>
-            <a:r>
-              <a:rPr lang="en-US" dirty="0"/>
-              <a:t>Struggles</a:t>
-            </a:r>
-          </a:p>
-        </p:txBody>
-      </p:sp>
-      <p:sp>
-        <p:nvSpPr>
-          <p:cNvPr id="3" name="Content Placeholder 2">
-            <a:extLst>
-              <a:ext uri="{FF2B5EF4-FFF2-40B4-BE49-F238E27FC236}">
-                <a16:creationId xmlns:a16="http://schemas.microsoft.com/office/drawing/2014/main" id="{B5B5FE5A-58DD-46FE-B641-060792E939AD}"/>
-              </a:ext>
-            </a:extLst>
-          </p:cNvPr>
-          <p:cNvSpPr>
-            <a:spLocks noGrp="1"/>
-          </p:cNvSpPr>
-          <p:nvPr>
-            <p:ph idx="1"/>
-          </p:nvPr>
-        </p:nvSpPr>
-        <p:spPr>
-          <a:xfrm>
-            <a:off x="457200" y="2286000"/>
-            <a:ext cx="6943725" cy="3872995"/>
-          </a:xfrm>
-        </p:spPr>
-        <p:txBody>
-          <a:bodyPr>
-            <a:normAutofit/>
-          </a:bodyPr>
-          <a:lstStyle/>
-          <a:p>
-            <a:r>
-              <a:rPr lang="en-US" dirty="0"/>
-              <a:t>Being able to integrate the bot with Lambda and using voice chat rather than text chat</a:t>
-            </a:r>
-          </a:p>
-          <a:p>
-            <a:r>
-              <a:rPr lang="en-US" dirty="0"/>
-              <a:t>Getting a large amount of data and then cleaning it for the user</a:t>
-            </a:r>
-          </a:p>
-          <a:p>
-            <a:r>
-              <a:rPr lang="en-US" dirty="0"/>
-              <a:t>Finding the machine learning that correctly fit with our goal at RoCry</a:t>
-            </a:r>
-          </a:p>
-        </p:txBody>
-      </p:sp>
-      <p:pic>
-        <p:nvPicPr>
-          <p:cNvPr id="6" name="Picture 5">
-            <a:extLst>
-              <a:ext uri="{FF2B5EF4-FFF2-40B4-BE49-F238E27FC236}">
-                <a16:creationId xmlns:a16="http://schemas.microsoft.com/office/drawing/2014/main" id="{97F5ED44-6668-401E-AD94-8D97CB6C559A}"/>
-              </a:ext>
-            </a:extLst>
-          </p:cNvPr>
-          <p:cNvPicPr>
-            <a:picLocks noChangeAspect="1"/>
-          </p:cNvPicPr>
-          <p:nvPr/>
-        </p:nvPicPr>
-        <p:blipFill>
-          <a:blip r:embed="rId3"/>
-          <a:stretch>
-            <a:fillRect/>
-          </a:stretch>
-        </p:blipFill>
-        <p:spPr>
-          <a:xfrm>
-            <a:off x="9538577" y="1614529"/>
-            <a:ext cx="1521486" cy="2442050"/>
-          </a:xfrm>
-          <a:prstGeom prst="rect">
-            <a:avLst/>
-          </a:prstGeom>
-        </p:spPr>
-      </p:pic>
-    </p:spTree>
-    <p:extLst>
-      <p:ext uri="{BB962C8B-B14F-4D97-AF65-F5344CB8AC3E}">
-        <p14:creationId xmlns:p14="http://schemas.microsoft.com/office/powerpoint/2010/main" val="701105779"/>
-      </p:ext>
-    </p:extLst>
-  </p:cSld>
-  <p:clrMapOvr>
-    <a:masterClrMapping/>
-  </p:clrMapOvr>
-</p:sld>
-</file>
-
-<file path=ppt/slides/slide7.xml><?xml version="1.0" encoding="utf-8"?>
+<file path=ppt/slides/slide9.xml><?xml version="1.0" encoding="utf-8"?>
 <p:sld xmlns:a="http://schemas.openxmlformats.org/drawingml/2006/main" xmlns:r="http://schemas.openxmlformats.org/officeDocument/2006/relationships" xmlns:p="http://schemas.openxmlformats.org/presentationml/2006/main">
   <p:cSld>
     <p:bg>

</xml_diff>

<commit_message>
added the last funds to watch json files for Tonia
</commit_message>
<xml_diff>
--- a/RoCry.pptx
+++ b/RoCry.pptx
@@ -8,10 +8,12 @@
     <p:sldId id="256" r:id="rId2"/>
     <p:sldId id="257" r:id="rId3"/>
     <p:sldId id="258" r:id="rId4"/>
-    <p:sldId id="259" r:id="rId5"/>
-    <p:sldId id="260" r:id="rId6"/>
-    <p:sldId id="261" r:id="rId7"/>
-    <p:sldId id="262" r:id="rId8"/>
+    <p:sldId id="263" r:id="rId5"/>
+    <p:sldId id="264" r:id="rId6"/>
+    <p:sldId id="259" r:id="rId7"/>
+    <p:sldId id="261" r:id="rId8"/>
+    <p:sldId id="260" r:id="rId9"/>
+    <p:sldId id="262" r:id="rId10"/>
   </p:sldIdLst>
   <p:sldSz cx="12192000" cy="6858000"/>
   <p:notesSz cx="6858000" cy="9144000"/>
@@ -110,6 +112,11 @@
       </a:defRPr>
     </a:lvl9pPr>
   </p:defaultTextStyle>
+  <p:extLst>
+    <p:ext uri="{EFAFB233-063F-42B5-8137-9DF3F51BA10A}">
+      <p15:sldGuideLst xmlns:p15="http://schemas.microsoft.com/office/powerpoint/2012/main"/>
+    </p:ext>
+  </p:extLst>
 </p:presentation>
 </file>
 
@@ -264,7 +271,7 @@
           <a:p>
             <a:fld id="{D208048B-57AF-4F53-BC84-8E0A1033FBEC}" type="datetimeFigureOut">
               <a:rPr lang="en-US" smtClean="0"/>
-              <a:t>10/14/2021</a:t>
+              <a:t>10/15/2021</a:t>
             </a:fld>
             <a:endParaRPr lang="en-US"/>
           </a:p>
@@ -462,7 +469,7 @@
           <a:p>
             <a:fld id="{D208048B-57AF-4F53-BC84-8E0A1033FBEC}" type="datetimeFigureOut">
               <a:rPr lang="en-US" smtClean="0"/>
-              <a:t>10/14/2021</a:t>
+              <a:t>10/15/2021</a:t>
             </a:fld>
             <a:endParaRPr lang="en-US"/>
           </a:p>
@@ -1999,7 +2006,7 @@
           <a:p>
             <a:fld id="{D208048B-57AF-4F53-BC84-8E0A1033FBEC}" type="datetimeFigureOut">
               <a:rPr lang="en-US" smtClean="0"/>
-              <a:t>10/14/2021</a:t>
+              <a:t>10/15/2021</a:t>
             </a:fld>
             <a:endParaRPr lang="en-US"/>
           </a:p>
@@ -2199,7 +2206,7 @@
           <a:p>
             <a:fld id="{D208048B-57AF-4F53-BC84-8E0A1033FBEC}" type="datetimeFigureOut">
               <a:rPr lang="en-US" smtClean="0"/>
-              <a:t>10/14/2021</a:t>
+              <a:t>10/15/2021</a:t>
             </a:fld>
             <a:endParaRPr lang="en-US"/>
           </a:p>
@@ -2477,7 +2484,7 @@
           <a:p>
             <a:fld id="{D208048B-57AF-4F53-BC84-8E0A1033FBEC}" type="datetimeFigureOut">
               <a:rPr lang="en-US" smtClean="0"/>
-              <a:t>10/14/2021</a:t>
+              <a:t>10/15/2021</a:t>
             </a:fld>
             <a:endParaRPr lang="en-US"/>
           </a:p>
@@ -3455,7 +3462,7 @@
           <a:p>
             <a:fld id="{D208048B-57AF-4F53-BC84-8E0A1033FBEC}" type="datetimeFigureOut">
               <a:rPr lang="en-US" smtClean="0"/>
-              <a:t>10/14/2021</a:t>
+              <a:t>10/15/2021</a:t>
             </a:fld>
             <a:endParaRPr lang="en-US"/>
           </a:p>
@@ -4575,7 +4582,7 @@
           <a:p>
             <a:fld id="{D208048B-57AF-4F53-BC84-8E0A1033FBEC}" type="datetimeFigureOut">
               <a:rPr lang="en-US" smtClean="0"/>
-              <a:t>10/14/2021</a:t>
+              <a:t>10/15/2021</a:t>
             </a:fld>
             <a:endParaRPr lang="en-US"/>
           </a:p>
@@ -4722,7 +4729,7 @@
           <a:p>
             <a:fld id="{D208048B-57AF-4F53-BC84-8E0A1033FBEC}" type="datetimeFigureOut">
               <a:rPr lang="en-US" smtClean="0"/>
-              <a:t>10/14/2021</a:t>
+              <a:t>10/15/2021</a:t>
             </a:fld>
             <a:endParaRPr lang="en-US"/>
           </a:p>
@@ -4835,7 +4842,7 @@
           <a:p>
             <a:fld id="{D208048B-57AF-4F53-BC84-8E0A1033FBEC}" type="datetimeFigureOut">
               <a:rPr lang="en-US" smtClean="0"/>
-              <a:t>10/14/2021</a:t>
+              <a:t>10/15/2021</a:t>
             </a:fld>
             <a:endParaRPr lang="en-US"/>
           </a:p>
@@ -6481,7 +6488,7 @@
           <a:p>
             <a:fld id="{D208048B-57AF-4F53-BC84-8E0A1033FBEC}" type="datetimeFigureOut">
               <a:rPr lang="en-US" smtClean="0"/>
-              <a:t>10/14/2021</a:t>
+              <a:t>10/15/2021</a:t>
             </a:fld>
             <a:endParaRPr lang="en-US"/>
           </a:p>
@@ -8119,7 +8126,7 @@
           <a:p>
             <a:fld id="{D208048B-57AF-4F53-BC84-8E0A1033FBEC}" type="datetimeFigureOut">
               <a:rPr lang="en-US" smtClean="0"/>
-              <a:t>10/14/2021</a:t>
+              <a:t>10/15/2021</a:t>
             </a:fld>
             <a:endParaRPr lang="en-US"/>
           </a:p>
@@ -9042,7 +9049,7 @@
             <a:fld id="{D208048B-57AF-4F53-BC84-8E0A1033FBEC}" type="datetimeFigureOut">
               <a:rPr lang="en-US" smtClean="0"/>
               <a:pPr/>
-              <a:t>10/14/2021</a:t>
+              <a:t>10/15/2021</a:t>
             </a:fld>
             <a:endParaRPr lang="en-US" dirty="0"/>
           </a:p>
@@ -12840,7 +12847,19 @@
           <a:p>
             <a:r>
               <a:rPr lang="en-US" dirty="0"/>
-              <a:t>Why Rf model?</a:t>
+              <a:t>Why </a:t>
+            </a:r>
+            <a:r>
+              <a:rPr lang="en-US" b="1" u="sng" dirty="0">
+                <a:solidFill>
+                  <a:srgbClr val="00B050"/>
+                </a:solidFill>
+              </a:rPr>
+              <a:t>Rf model</a:t>
+            </a:r>
+            <a:r>
+              <a:rPr lang="en-US" dirty="0"/>
+              <a:t>?</a:t>
             </a:r>
           </a:p>
           <a:p>
@@ -12853,7 +12872,19 @@
           <a:p>
             <a:r>
               <a:rPr lang="en-US" dirty="0"/>
-              <a:t>For our F-T-W we used a neural network which is looking at daily return trends on our weekly fund picks. </a:t>
+              <a:t>For our F-T-W we used a </a:t>
+            </a:r>
+            <a:r>
+              <a:rPr lang="en-US" dirty="0">
+                <a:solidFill>
+                  <a:srgbClr val="00B0F0"/>
+                </a:solidFill>
+              </a:rPr>
+              <a:t>neural network </a:t>
+            </a:r>
+            <a:r>
+              <a:rPr lang="en-US" dirty="0"/>
+              <a:t>which is looking at daily return trends on our weekly fund picks. </a:t>
             </a:r>
           </a:p>
           <a:p>
@@ -12912,6 +12943,1975 @@
 </file>
 
 <file path=ppt/slides/slide4.xml><?xml version="1.0" encoding="utf-8"?>
+<p:sld xmlns:a="http://schemas.openxmlformats.org/drawingml/2006/main" xmlns:r="http://schemas.openxmlformats.org/officeDocument/2006/relationships" xmlns:p="http://schemas.openxmlformats.org/presentationml/2006/main">
+  <p:cSld>
+    <p:bg>
+      <p:bgPr>
+        <a:solidFill>
+          <a:schemeClr val="bg2"/>
+        </a:solidFill>
+        <a:effectLst/>
+      </p:bgPr>
+    </p:bg>
+    <p:spTree>
+      <p:nvGrpSpPr>
+        <p:cNvPr id="1" name=""/>
+        <p:cNvGrpSpPr/>
+        <p:nvPr/>
+      </p:nvGrpSpPr>
+      <p:grpSpPr>
+        <a:xfrm>
+          <a:off x="0" y="0"/>
+          <a:ext cx="0" cy="0"/>
+          <a:chOff x="0" y="0"/>
+          <a:chExt cx="0" cy="0"/>
+        </a:xfrm>
+      </p:grpSpPr>
+      <p:sp useBgFill="1">
+        <p:nvSpPr>
+          <p:cNvPr id="9" name="Background Fill">
+            <a:extLst>
+              <a:ext uri="{FF2B5EF4-FFF2-40B4-BE49-F238E27FC236}">
+                <a16:creationId xmlns:a16="http://schemas.microsoft.com/office/drawing/2014/main" id="{FAFB3478-4AEC-431E-93B2-1593839C16DA}"/>
+              </a:ext>
+              <a:ext uri="{C183D7F6-B498-43B3-948B-1728B52AA6E4}">
+                <adec:decorative xmlns:adec="http://schemas.microsoft.com/office/drawing/2017/decorative" val="1"/>
+              </a:ext>
+            </a:extLst>
+          </p:cNvPr>
+          <p:cNvSpPr>
+            <a:spLocks noGrp="1" noRot="1" noChangeAspect="1" noMove="1" noResize="1" noEditPoints="1" noAdjustHandles="1" noChangeArrowheads="1" noChangeShapeType="1" noTextEdit="1"/>
+          </p:cNvSpPr>
+          <p:nvPr>
+            <p:extLst>
+              <p:ext uri="{386F3935-93C4-4BCD-93E2-E3B085C9AB24}">
+                <p16:designElem xmlns:p16="http://schemas.microsoft.com/office/powerpoint/2015/main" val="1"/>
+              </p:ext>
+            </p:extLst>
+          </p:nvPr>
+        </p:nvSpPr>
+        <p:spPr>
+          <a:xfrm>
+            <a:off x="0" y="0"/>
+            <a:ext cx="12192000" cy="6858000"/>
+          </a:xfrm>
+          <a:prstGeom prst="rect">
+            <a:avLst/>
+          </a:prstGeom>
+          <a:ln w="9525" cap="flat">
+            <a:noFill/>
+            <a:prstDash val="solid"/>
+            <a:miter/>
+          </a:ln>
+        </p:spPr>
+        <p:txBody>
+          <a:bodyPr rtlCol="0" anchor="ctr"/>
+          <a:lstStyle/>
+          <a:p>
+            <a:endParaRPr lang="en-US">
+              <a:solidFill>
+                <a:schemeClr val="tx1"/>
+              </a:solidFill>
+            </a:endParaRPr>
+          </a:p>
+        </p:txBody>
+      </p:sp>
+      <p:sp>
+        <p:nvSpPr>
+          <p:cNvPr id="11" name="Color Fill">
+            <a:extLst>
+              <a:ext uri="{FF2B5EF4-FFF2-40B4-BE49-F238E27FC236}">
+                <a16:creationId xmlns:a16="http://schemas.microsoft.com/office/drawing/2014/main" id="{E0F166C3-D45F-4A92-A291-15B874AD1A56}"/>
+              </a:ext>
+              <a:ext uri="{C183D7F6-B498-43B3-948B-1728B52AA6E4}">
+                <adec:decorative xmlns:adec="http://schemas.microsoft.com/office/drawing/2017/decorative" val="1"/>
+              </a:ext>
+            </a:extLst>
+          </p:cNvPr>
+          <p:cNvSpPr>
+            <a:spLocks noGrp="1" noRot="1" noChangeAspect="1" noMove="1" noResize="1" noEditPoints="1" noAdjustHandles="1" noChangeArrowheads="1" noChangeShapeType="1" noTextEdit="1"/>
+          </p:cNvSpPr>
+          <p:nvPr>
+            <p:extLst>
+              <p:ext uri="{386F3935-93C4-4BCD-93E2-E3B085C9AB24}">
+                <p16:designElem xmlns:p16="http://schemas.microsoft.com/office/powerpoint/2015/main" val="1"/>
+              </p:ext>
+            </p:extLst>
+          </p:nvPr>
+        </p:nvSpPr>
+        <p:spPr>
+          <a:xfrm>
+            <a:off x="0" y="0"/>
+            <a:ext cx="12188952" cy="6858000"/>
+          </a:xfrm>
+          <a:prstGeom prst="rect">
+            <a:avLst/>
+          </a:prstGeom>
+          <a:solidFill>
+            <a:schemeClr val="bg2">
+              <a:lumMod val="75000"/>
+              <a:lumOff val="25000"/>
+              <a:alpha val="40000"/>
+            </a:schemeClr>
+          </a:solidFill>
+          <a:ln w="9525" cap="flat">
+            <a:noFill/>
+            <a:prstDash val="solid"/>
+            <a:miter/>
+          </a:ln>
+        </p:spPr>
+        <p:txBody>
+          <a:bodyPr rtlCol="0" anchor="ctr"/>
+          <a:lstStyle/>
+          <a:p>
+            <a:endParaRPr lang="en-US" dirty="0">
+              <a:solidFill>
+                <a:schemeClr val="bg2">
+                  <a:lumMod val="75000"/>
+                  <a:lumOff val="25000"/>
+                </a:schemeClr>
+              </a:solidFill>
+            </a:endParaRPr>
+          </a:p>
+        </p:txBody>
+      </p:sp>
+      <p:grpSp>
+        <p:nvGrpSpPr>
+          <p:cNvPr id="13" name="Group 12">
+            <a:extLst>
+              <a:ext uri="{FF2B5EF4-FFF2-40B4-BE49-F238E27FC236}">
+                <a16:creationId xmlns:a16="http://schemas.microsoft.com/office/drawing/2014/main" id="{D46CEC91-770B-42C4-A145-1B46A53147AF}"/>
+              </a:ext>
+              <a:ext uri="{C183D7F6-B498-43B3-948B-1728B52AA6E4}">
+                <adec:decorative xmlns:adec="http://schemas.microsoft.com/office/drawing/2017/decorative" val="1"/>
+              </a:ext>
+            </a:extLst>
+          </p:cNvPr>
+          <p:cNvGrpSpPr>
+            <a:grpSpLocks noGrp="1" noUngrp="1" noRot="1" noChangeAspect="1" noMove="1" noResize="1"/>
+          </p:cNvGrpSpPr>
+          <p:nvPr>
+            <p:extLst>
+              <p:ext uri="{386F3935-93C4-4BCD-93E2-E3B085C9AB24}">
+                <p16:designElem xmlns:p16="http://schemas.microsoft.com/office/powerpoint/2015/main" val="1"/>
+              </p:ext>
+            </p:extLst>
+          </p:nvPr>
+        </p:nvGrpSpPr>
+        <p:grpSpPr>
+          <a:xfrm>
+            <a:off x="7739089" y="-3532"/>
+            <a:ext cx="4449863" cy="6861532"/>
+            <a:chOff x="7739089" y="-3532"/>
+            <a:chExt cx="4449863" cy="6861532"/>
+          </a:xfrm>
+        </p:grpSpPr>
+        <p:sp>
+          <p:nvSpPr>
+            <p:cNvPr id="14" name="Oval 13">
+              <a:extLst>
+                <a:ext uri="{FF2B5EF4-FFF2-40B4-BE49-F238E27FC236}">
+                  <a16:creationId xmlns:a16="http://schemas.microsoft.com/office/drawing/2014/main" id="{1DD4806A-AF58-4453-B072-6A4A4F038B2D}"/>
+                </a:ext>
+                <a:ext uri="{C183D7F6-B498-43B3-948B-1728B52AA6E4}">
+                  <adec:decorative xmlns:adec="http://schemas.microsoft.com/office/drawing/2017/decorative" val="1"/>
+                </a:ext>
+              </a:extLst>
+            </p:cNvPr>
+            <p:cNvSpPr/>
+            <p:nvPr>
+              <p:extLst>
+                <p:ext uri="{386F3935-93C4-4BCD-93E2-E3B085C9AB24}">
+                  <p16:designElem xmlns:p16="http://schemas.microsoft.com/office/powerpoint/2015/main" val="1"/>
+                </p:ext>
+              </p:extLst>
+            </p:nvPr>
+          </p:nvSpPr>
+          <p:spPr>
+            <a:xfrm>
+              <a:off x="8907984" y="4121414"/>
+              <a:ext cx="514757" cy="516940"/>
+            </a:xfrm>
+            <a:prstGeom prst="ellipse">
+              <a:avLst/>
+            </a:prstGeom>
+            <a:solidFill>
+              <a:schemeClr val="accent3">
+                <a:lumMod val="60000"/>
+                <a:lumOff val="40000"/>
+              </a:schemeClr>
+            </a:solidFill>
+            <a:ln>
+              <a:noFill/>
+            </a:ln>
+          </p:spPr>
+          <p:style>
+            <a:lnRef idx="2">
+              <a:schemeClr val="accent1">
+                <a:shade val="50000"/>
+              </a:schemeClr>
+            </a:lnRef>
+            <a:fillRef idx="1">
+              <a:schemeClr val="accent1"/>
+            </a:fillRef>
+            <a:effectRef idx="0">
+              <a:schemeClr val="accent1"/>
+            </a:effectRef>
+            <a:fontRef idx="minor">
+              <a:schemeClr val="lt1"/>
+            </a:fontRef>
+          </p:style>
+          <p:txBody>
+            <a:bodyPr rtlCol="0" anchor="ctr"/>
+            <a:lstStyle/>
+            <a:p>
+              <a:pPr lvl="0" algn="ctr"/>
+              <a:endParaRPr lang="en-US" dirty="0"/>
+            </a:p>
+          </p:txBody>
+        </p:sp>
+        <p:sp>
+          <p:nvSpPr>
+            <p:cNvPr id="15" name="Freeform: Shape 14">
+              <a:extLst>
+                <a:ext uri="{FF2B5EF4-FFF2-40B4-BE49-F238E27FC236}">
+                  <a16:creationId xmlns:a16="http://schemas.microsoft.com/office/drawing/2014/main" id="{BA9DFD6B-459F-49A7-AC49-D1DFA73397FA}"/>
+                </a:ext>
+                <a:ext uri="{C183D7F6-B498-43B3-948B-1728B52AA6E4}">
+                  <adec:decorative xmlns:adec="http://schemas.microsoft.com/office/drawing/2017/decorative" val="1"/>
+                </a:ext>
+              </a:extLst>
+            </p:cNvPr>
+            <p:cNvSpPr/>
+            <p:nvPr>
+              <p:extLst>
+                <p:ext uri="{386F3935-93C4-4BCD-93E2-E3B085C9AB24}">
+                  <p16:designElem xmlns:p16="http://schemas.microsoft.com/office/powerpoint/2015/main" val="1"/>
+                </p:ext>
+              </p:extLst>
+            </p:nvPr>
+          </p:nvSpPr>
+          <p:spPr>
+            <a:xfrm>
+              <a:off x="8348375" y="4121414"/>
+              <a:ext cx="3266317" cy="2736586"/>
+            </a:xfrm>
+            <a:custGeom>
+              <a:avLst/>
+              <a:gdLst>
+                <a:gd name="connsiteX0" fmla="*/ 1635557 w 3266317"/>
+                <a:gd name="connsiteY0" fmla="*/ 0 h 2736586"/>
+                <a:gd name="connsiteX1" fmla="*/ 3266317 w 3266317"/>
+                <a:gd name="connsiteY1" fmla="*/ 0 h 2736586"/>
+                <a:gd name="connsiteX2" fmla="*/ 3266317 w 3266317"/>
+                <a:gd name="connsiteY2" fmla="*/ 1630760 h 2736586"/>
+                <a:gd name="connsiteX3" fmla="*/ 2892838 w 3266317"/>
+                <a:gd name="connsiteY3" fmla="*/ 2671131 h 2736586"/>
+                <a:gd name="connsiteX4" fmla="*/ 2833348 w 3266317"/>
+                <a:gd name="connsiteY4" fmla="*/ 2736586 h 2736586"/>
+                <a:gd name="connsiteX5" fmla="*/ 0 w 3266317"/>
+                <a:gd name="connsiteY5" fmla="*/ 2736586 h 2736586"/>
+                <a:gd name="connsiteX6" fmla="*/ 0 w 3266317"/>
+                <a:gd name="connsiteY6" fmla="*/ 1635558 h 2736586"/>
+                <a:gd name="connsiteX7" fmla="*/ 1635557 w 3266317"/>
+                <a:gd name="connsiteY7" fmla="*/ 0 h 2736586"/>
+              </a:gdLst>
+              <a:ahLst/>
+              <a:cxnLst>
+                <a:cxn ang="0">
+                  <a:pos x="connsiteX0" y="connsiteY0"/>
+                </a:cxn>
+                <a:cxn ang="0">
+                  <a:pos x="connsiteX1" y="connsiteY1"/>
+                </a:cxn>
+                <a:cxn ang="0">
+                  <a:pos x="connsiteX2" y="connsiteY2"/>
+                </a:cxn>
+                <a:cxn ang="0">
+                  <a:pos x="connsiteX3" y="connsiteY3"/>
+                </a:cxn>
+                <a:cxn ang="0">
+                  <a:pos x="connsiteX4" y="connsiteY4"/>
+                </a:cxn>
+                <a:cxn ang="0">
+                  <a:pos x="connsiteX5" y="connsiteY5"/>
+                </a:cxn>
+                <a:cxn ang="0">
+                  <a:pos x="connsiteX6" y="connsiteY6"/>
+                </a:cxn>
+                <a:cxn ang="0">
+                  <a:pos x="connsiteX7" y="connsiteY7"/>
+                </a:cxn>
+              </a:cxnLst>
+              <a:rect l="l" t="t" r="r" b="b"/>
+              <a:pathLst>
+                <a:path w="3266317" h="2736586">
+                  <a:moveTo>
+                    <a:pt x="1635557" y="0"/>
+                  </a:moveTo>
+                  <a:lnTo>
+                    <a:pt x="3266317" y="0"/>
+                  </a:lnTo>
+                  <a:lnTo>
+                    <a:pt x="3266317" y="1630760"/>
+                  </a:lnTo>
+                  <a:cubicBezTo>
+                    <a:pt x="3266317" y="2025955"/>
+                    <a:pt x="3126159" y="2388411"/>
+                    <a:pt x="2892838" y="2671131"/>
+                  </a:cubicBezTo>
+                  <a:lnTo>
+                    <a:pt x="2833348" y="2736586"/>
+                  </a:lnTo>
+                  <a:lnTo>
+                    <a:pt x="0" y="2736586"/>
+                  </a:lnTo>
+                  <a:lnTo>
+                    <a:pt x="0" y="1635558"/>
+                  </a:lnTo>
+                  <a:cubicBezTo>
+                    <a:pt x="0" y="732255"/>
+                    <a:pt x="732254" y="0"/>
+                    <a:pt x="1635557" y="0"/>
+                  </a:cubicBezTo>
+                  <a:close/>
+                </a:path>
+              </a:pathLst>
+            </a:custGeom>
+            <a:solidFill>
+              <a:schemeClr val="accent1">
+                <a:lumMod val="60000"/>
+                <a:lumOff val="40000"/>
+                <a:alpha val="60000"/>
+              </a:schemeClr>
+            </a:solidFill>
+            <a:ln w="9331" cap="flat">
+              <a:noFill/>
+              <a:prstDash val="solid"/>
+              <a:miter/>
+            </a:ln>
+          </p:spPr>
+          <p:txBody>
+            <a:bodyPr rtlCol="0" anchor="ctr"/>
+            <a:lstStyle/>
+            <a:p>
+              <a:pPr lvl="0"/>
+              <a:endParaRPr lang="en-US"/>
+            </a:p>
+          </p:txBody>
+        </p:sp>
+        <p:sp>
+          <p:nvSpPr>
+            <p:cNvPr id="16" name="Freeform: Shape 15">
+              <a:extLst>
+                <a:ext uri="{FF2B5EF4-FFF2-40B4-BE49-F238E27FC236}">
+                  <a16:creationId xmlns:a16="http://schemas.microsoft.com/office/drawing/2014/main" id="{4E8CB084-44E1-4B4B-91FF-4A20D55DFD3A}"/>
+                </a:ext>
+                <a:ext uri="{C183D7F6-B498-43B3-948B-1728B52AA6E4}">
+                  <adec:decorative xmlns:adec="http://schemas.microsoft.com/office/drawing/2017/decorative" val="1"/>
+                </a:ext>
+              </a:extLst>
+            </p:cNvPr>
+            <p:cNvSpPr/>
+            <p:nvPr>
+              <p:extLst>
+                <p:ext uri="{386F3935-93C4-4BCD-93E2-E3B085C9AB24}">
+                  <p16:designElem xmlns:p16="http://schemas.microsoft.com/office/powerpoint/2015/main" val="1"/>
+                </p:ext>
+              </p:extLst>
+            </p:nvPr>
+          </p:nvSpPr>
+          <p:spPr>
+            <a:xfrm>
+              <a:off x="11752627" y="3404614"/>
+              <a:ext cx="436325" cy="1309674"/>
+            </a:xfrm>
+            <a:custGeom>
+              <a:avLst/>
+              <a:gdLst>
+                <a:gd name="connsiteX0" fmla="*/ 470325 w 477612"/>
+                <a:gd name="connsiteY0" fmla="*/ 0 h 1433600"/>
+                <a:gd name="connsiteX1" fmla="*/ 475607 w 477612"/>
+                <a:gd name="connsiteY1" fmla="*/ 3701 h 1433600"/>
+                <a:gd name="connsiteX2" fmla="*/ 477612 w 477612"/>
+                <a:gd name="connsiteY2" fmla="*/ 5160 h 1433600"/>
+                <a:gd name="connsiteX3" fmla="*/ 477612 w 477612"/>
+                <a:gd name="connsiteY3" fmla="*/ 1428441 h 1433600"/>
+                <a:gd name="connsiteX4" fmla="*/ 475607 w 477612"/>
+                <a:gd name="connsiteY4" fmla="*/ 1429900 h 1433600"/>
+                <a:gd name="connsiteX5" fmla="*/ 470325 w 477612"/>
+                <a:gd name="connsiteY5" fmla="*/ 1433600 h 1433600"/>
+                <a:gd name="connsiteX6" fmla="*/ 0 w 477612"/>
+                <a:gd name="connsiteY6" fmla="*/ 716800 h 1433600"/>
+                <a:gd name="connsiteX7" fmla="*/ 470325 w 477612"/>
+                <a:gd name="connsiteY7" fmla="*/ 0 h 1433600"/>
+              </a:gdLst>
+              <a:ahLst/>
+              <a:cxnLst>
+                <a:cxn ang="0">
+                  <a:pos x="connsiteX0" y="connsiteY0"/>
+                </a:cxn>
+                <a:cxn ang="0">
+                  <a:pos x="connsiteX1" y="connsiteY1"/>
+                </a:cxn>
+                <a:cxn ang="0">
+                  <a:pos x="connsiteX2" y="connsiteY2"/>
+                </a:cxn>
+                <a:cxn ang="0">
+                  <a:pos x="connsiteX3" y="connsiteY3"/>
+                </a:cxn>
+                <a:cxn ang="0">
+                  <a:pos x="connsiteX4" y="connsiteY4"/>
+                </a:cxn>
+                <a:cxn ang="0">
+                  <a:pos x="connsiteX5" y="connsiteY5"/>
+                </a:cxn>
+                <a:cxn ang="0">
+                  <a:pos x="connsiteX6" y="connsiteY6"/>
+                </a:cxn>
+                <a:cxn ang="0">
+                  <a:pos x="connsiteX7" y="connsiteY7"/>
+                </a:cxn>
+              </a:cxnLst>
+              <a:rect l="l" t="t" r="r" b="b"/>
+              <a:pathLst>
+                <a:path w="477612" h="1433600">
+                  <a:moveTo>
+                    <a:pt x="470325" y="0"/>
+                  </a:moveTo>
+                  <a:cubicBezTo>
+                    <a:pt x="470325" y="0"/>
+                    <a:pt x="472162" y="1254"/>
+                    <a:pt x="475607" y="3701"/>
+                  </a:cubicBezTo>
+                  <a:lnTo>
+                    <a:pt x="477612" y="5160"/>
+                  </a:lnTo>
+                  <a:lnTo>
+                    <a:pt x="477612" y="1428441"/>
+                  </a:lnTo>
+                  <a:lnTo>
+                    <a:pt x="475607" y="1429900"/>
+                  </a:lnTo>
+                  <a:cubicBezTo>
+                    <a:pt x="472162" y="1432347"/>
+                    <a:pt x="470325" y="1433600"/>
+                    <a:pt x="470325" y="1433600"/>
+                  </a:cubicBezTo>
+                  <a:cubicBezTo>
+                    <a:pt x="470325" y="1433600"/>
+                    <a:pt x="0" y="1112672"/>
+                    <a:pt x="0" y="716800"/>
+                  </a:cubicBezTo>
+                  <a:cubicBezTo>
+                    <a:pt x="0" y="320929"/>
+                    <a:pt x="470325" y="0"/>
+                    <a:pt x="470325" y="0"/>
+                  </a:cubicBezTo>
+                  <a:close/>
+                </a:path>
+              </a:pathLst>
+            </a:custGeom>
+            <a:pattFill prst="pct5">
+              <a:fgClr>
+                <a:schemeClr val="tx2">
+                  <a:lumMod val="75000"/>
+                  <a:lumOff val="25000"/>
+                </a:schemeClr>
+              </a:fgClr>
+              <a:bgClr>
+                <a:schemeClr val="accent1">
+                  <a:lumMod val="60000"/>
+                  <a:lumOff val="40000"/>
+                </a:schemeClr>
+              </a:bgClr>
+            </a:pattFill>
+            <a:ln w="9525" cap="flat">
+              <a:noFill/>
+              <a:prstDash val="solid"/>
+              <a:miter/>
+            </a:ln>
+          </p:spPr>
+          <p:txBody>
+            <a:bodyPr wrap="square" rtlCol="0" anchor="ctr">
+              <a:noAutofit/>
+            </a:bodyPr>
+            <a:lstStyle/>
+            <a:p>
+              <a:pPr lvl="0"/>
+              <a:endParaRPr lang="en-US" dirty="0"/>
+            </a:p>
+          </p:txBody>
+        </p:sp>
+        <p:sp>
+          <p:nvSpPr>
+            <p:cNvPr id="17" name="Graphic 9">
+              <a:extLst>
+                <a:ext uri="{FF2B5EF4-FFF2-40B4-BE49-F238E27FC236}">
+                  <a16:creationId xmlns:a16="http://schemas.microsoft.com/office/drawing/2014/main" id="{6C295B8D-0725-41E2-9095-AF10CED978EE}"/>
+                </a:ext>
+                <a:ext uri="{C183D7F6-B498-43B3-948B-1728B52AA6E4}">
+                  <adec:decorative xmlns:adec="http://schemas.microsoft.com/office/drawing/2017/decorative" val="1"/>
+                </a:ext>
+              </a:extLst>
+            </p:cNvPr>
+            <p:cNvSpPr/>
+            <p:nvPr>
+              <p:extLst>
+                <p:ext uri="{386F3935-93C4-4BCD-93E2-E3B085C9AB24}">
+                  <p16:designElem xmlns:p16="http://schemas.microsoft.com/office/powerpoint/2015/main" val="1"/>
+                </p:ext>
+              </p:extLst>
+            </p:nvPr>
+          </p:nvSpPr>
+          <p:spPr>
+            <a:xfrm>
+              <a:off x="7739089" y="-3532"/>
+              <a:ext cx="3875603" cy="3875603"/>
+            </a:xfrm>
+            <a:custGeom>
+              <a:avLst/>
+              <a:gdLst>
+                <a:gd name="connsiteX0" fmla="*/ 6861546 w 6861545"/>
+                <a:gd name="connsiteY0" fmla="*/ 6861546 h 6861545"/>
+                <a:gd name="connsiteX1" fmla="*/ 3435812 w 6861545"/>
+                <a:gd name="connsiteY1" fmla="*/ 6861546 h 6861545"/>
+                <a:gd name="connsiteX2" fmla="*/ 0 w 6861545"/>
+                <a:gd name="connsiteY2" fmla="*/ 3425734 h 6861545"/>
+                <a:gd name="connsiteX3" fmla="*/ 0 w 6861545"/>
+                <a:gd name="connsiteY3" fmla="*/ 0 h 6861545"/>
+                <a:gd name="connsiteX4" fmla="*/ 3425734 w 6861545"/>
+                <a:gd name="connsiteY4" fmla="*/ 0 h 6861545"/>
+                <a:gd name="connsiteX5" fmla="*/ 6861546 w 6861545"/>
+                <a:gd name="connsiteY5" fmla="*/ 3435812 h 6861545"/>
+                <a:gd name="connsiteX6" fmla="*/ 6861546 w 6861545"/>
+                <a:gd name="connsiteY6" fmla="*/ 6861546 h 6861545"/>
+              </a:gdLst>
+              <a:ahLst/>
+              <a:cxnLst>
+                <a:cxn ang="0">
+                  <a:pos x="connsiteX0" y="connsiteY0"/>
+                </a:cxn>
+                <a:cxn ang="0">
+                  <a:pos x="connsiteX1" y="connsiteY1"/>
+                </a:cxn>
+                <a:cxn ang="0">
+                  <a:pos x="connsiteX2" y="connsiteY2"/>
+                </a:cxn>
+                <a:cxn ang="0">
+                  <a:pos x="connsiteX3" y="connsiteY3"/>
+                </a:cxn>
+                <a:cxn ang="0">
+                  <a:pos x="connsiteX4" y="connsiteY4"/>
+                </a:cxn>
+                <a:cxn ang="0">
+                  <a:pos x="connsiteX5" y="connsiteY5"/>
+                </a:cxn>
+                <a:cxn ang="0">
+                  <a:pos x="connsiteX6" y="connsiteY6"/>
+                </a:cxn>
+              </a:cxnLst>
+              <a:rect l="l" t="t" r="r" b="b"/>
+              <a:pathLst>
+                <a:path w="6861545" h="6861545">
+                  <a:moveTo>
+                    <a:pt x="6861546" y="6861546"/>
+                  </a:moveTo>
+                  <a:lnTo>
+                    <a:pt x="3435812" y="6861546"/>
+                  </a:lnTo>
+                  <a:cubicBezTo>
+                    <a:pt x="1538245" y="6861546"/>
+                    <a:pt x="0" y="5323301"/>
+                    <a:pt x="0" y="3425734"/>
+                  </a:cubicBezTo>
+                  <a:lnTo>
+                    <a:pt x="0" y="0"/>
+                  </a:lnTo>
+                  <a:lnTo>
+                    <a:pt x="3425734" y="0"/>
+                  </a:lnTo>
+                  <a:cubicBezTo>
+                    <a:pt x="5323301" y="0"/>
+                    <a:pt x="6861546" y="1538245"/>
+                    <a:pt x="6861546" y="3435812"/>
+                  </a:cubicBezTo>
+                  <a:lnTo>
+                    <a:pt x="6861546" y="6861546"/>
+                  </a:lnTo>
+                  <a:close/>
+                </a:path>
+              </a:pathLst>
+            </a:custGeom>
+            <a:solidFill>
+              <a:schemeClr val="tx2">
+                <a:lumMod val="25000"/>
+                <a:lumOff val="75000"/>
+                <a:alpha val="20000"/>
+              </a:schemeClr>
+            </a:solidFill>
+            <a:ln w="209550" cap="flat">
+              <a:noFill/>
+              <a:prstDash val="solid"/>
+              <a:miter/>
+            </a:ln>
+          </p:spPr>
+          <p:txBody>
+            <a:bodyPr rtlCol="0" anchor="ctr"/>
+            <a:lstStyle/>
+            <a:p>
+              <a:pPr lvl="0"/>
+              <a:endParaRPr lang="en-US"/>
+            </a:p>
+          </p:txBody>
+        </p:sp>
+        <p:sp>
+          <p:nvSpPr>
+            <p:cNvPr id="18" name="Graphic 9">
+              <a:extLst>
+                <a:ext uri="{FF2B5EF4-FFF2-40B4-BE49-F238E27FC236}">
+                  <a16:creationId xmlns:a16="http://schemas.microsoft.com/office/drawing/2014/main" id="{BB0B65EA-ACB0-4F3D-96BE-DC8EB96A759C}"/>
+                </a:ext>
+                <a:ext uri="{C183D7F6-B498-43B3-948B-1728B52AA6E4}">
+                  <adec:decorative xmlns:adec="http://schemas.microsoft.com/office/drawing/2017/decorative" val="1"/>
+                </a:ext>
+              </a:extLst>
+            </p:cNvPr>
+            <p:cNvSpPr/>
+            <p:nvPr>
+              <p:extLst>
+                <p:ext uri="{386F3935-93C4-4BCD-93E2-E3B085C9AB24}">
+                  <p16:designElem xmlns:p16="http://schemas.microsoft.com/office/powerpoint/2015/main" val="1"/>
+                </p:ext>
+              </p:extLst>
+            </p:nvPr>
+          </p:nvSpPr>
+          <p:spPr>
+            <a:xfrm>
+              <a:off x="8355862" y="556562"/>
+              <a:ext cx="2681635" cy="2681635"/>
+            </a:xfrm>
+            <a:custGeom>
+              <a:avLst/>
+              <a:gdLst>
+                <a:gd name="connsiteX0" fmla="*/ 6861546 w 6861545"/>
+                <a:gd name="connsiteY0" fmla="*/ 6861546 h 6861545"/>
+                <a:gd name="connsiteX1" fmla="*/ 3435812 w 6861545"/>
+                <a:gd name="connsiteY1" fmla="*/ 6861546 h 6861545"/>
+                <a:gd name="connsiteX2" fmla="*/ 0 w 6861545"/>
+                <a:gd name="connsiteY2" fmla="*/ 3425734 h 6861545"/>
+                <a:gd name="connsiteX3" fmla="*/ 0 w 6861545"/>
+                <a:gd name="connsiteY3" fmla="*/ 0 h 6861545"/>
+                <a:gd name="connsiteX4" fmla="*/ 3425734 w 6861545"/>
+                <a:gd name="connsiteY4" fmla="*/ 0 h 6861545"/>
+                <a:gd name="connsiteX5" fmla="*/ 6861546 w 6861545"/>
+                <a:gd name="connsiteY5" fmla="*/ 3435812 h 6861545"/>
+                <a:gd name="connsiteX6" fmla="*/ 6861546 w 6861545"/>
+                <a:gd name="connsiteY6" fmla="*/ 6861546 h 6861545"/>
+              </a:gdLst>
+              <a:ahLst/>
+              <a:cxnLst>
+                <a:cxn ang="0">
+                  <a:pos x="connsiteX0" y="connsiteY0"/>
+                </a:cxn>
+                <a:cxn ang="0">
+                  <a:pos x="connsiteX1" y="connsiteY1"/>
+                </a:cxn>
+                <a:cxn ang="0">
+                  <a:pos x="connsiteX2" y="connsiteY2"/>
+                </a:cxn>
+                <a:cxn ang="0">
+                  <a:pos x="connsiteX3" y="connsiteY3"/>
+                </a:cxn>
+                <a:cxn ang="0">
+                  <a:pos x="connsiteX4" y="connsiteY4"/>
+                </a:cxn>
+                <a:cxn ang="0">
+                  <a:pos x="connsiteX5" y="connsiteY5"/>
+                </a:cxn>
+                <a:cxn ang="0">
+                  <a:pos x="connsiteX6" y="connsiteY6"/>
+                </a:cxn>
+              </a:cxnLst>
+              <a:rect l="l" t="t" r="r" b="b"/>
+              <a:pathLst>
+                <a:path w="6861545" h="6861545">
+                  <a:moveTo>
+                    <a:pt x="6861546" y="6861546"/>
+                  </a:moveTo>
+                  <a:lnTo>
+                    <a:pt x="3435812" y="6861546"/>
+                  </a:lnTo>
+                  <a:cubicBezTo>
+                    <a:pt x="1538245" y="6861546"/>
+                    <a:pt x="0" y="5323301"/>
+                    <a:pt x="0" y="3425734"/>
+                  </a:cubicBezTo>
+                  <a:lnTo>
+                    <a:pt x="0" y="0"/>
+                  </a:lnTo>
+                  <a:lnTo>
+                    <a:pt x="3425734" y="0"/>
+                  </a:lnTo>
+                  <a:cubicBezTo>
+                    <a:pt x="5323301" y="0"/>
+                    <a:pt x="6861546" y="1538245"/>
+                    <a:pt x="6861546" y="3435812"/>
+                  </a:cubicBezTo>
+                  <a:lnTo>
+                    <a:pt x="6861546" y="6861546"/>
+                  </a:lnTo>
+                  <a:close/>
+                </a:path>
+              </a:pathLst>
+            </a:custGeom>
+            <a:pattFill prst="pct5">
+              <a:fgClr>
+                <a:schemeClr val="accent4">
+                  <a:lumMod val="60000"/>
+                  <a:lumOff val="40000"/>
+                </a:schemeClr>
+              </a:fgClr>
+              <a:bgClr>
+                <a:schemeClr val="accent1">
+                  <a:lumMod val="75000"/>
+                </a:schemeClr>
+              </a:bgClr>
+            </a:pattFill>
+            <a:ln w="9525" cap="flat">
+              <a:noFill/>
+              <a:prstDash val="solid"/>
+              <a:miter/>
+            </a:ln>
+          </p:spPr>
+          <p:txBody>
+            <a:bodyPr rtlCol="0" anchor="ctr"/>
+            <a:lstStyle/>
+            <a:p>
+              <a:endParaRPr lang="en-US" dirty="0"/>
+            </a:p>
+          </p:txBody>
+        </p:sp>
+        <p:sp>
+          <p:nvSpPr>
+            <p:cNvPr id="19" name="Graphic 9">
+              <a:extLst>
+                <a:ext uri="{FF2B5EF4-FFF2-40B4-BE49-F238E27FC236}">
+                  <a16:creationId xmlns:a16="http://schemas.microsoft.com/office/drawing/2014/main" id="{8D1B1F2F-C82A-4502-A778-98238C1B0C0E}"/>
+                </a:ext>
+                <a:ext uri="{C183D7F6-B498-43B3-948B-1728B52AA6E4}">
+                  <adec:decorative xmlns:adec="http://schemas.microsoft.com/office/drawing/2017/decorative" val="1"/>
+                </a:ext>
+              </a:extLst>
+            </p:cNvPr>
+            <p:cNvSpPr/>
+            <p:nvPr>
+              <p:extLst>
+                <p:ext uri="{386F3935-93C4-4BCD-93E2-E3B085C9AB24}">
+                  <p16:designElem xmlns:p16="http://schemas.microsoft.com/office/powerpoint/2015/main" val="1"/>
+                </p:ext>
+              </p:extLst>
+            </p:nvPr>
+          </p:nvSpPr>
+          <p:spPr>
+            <a:xfrm>
+              <a:off x="7756735" y="12053"/>
+              <a:ext cx="3857958" cy="3875603"/>
+            </a:xfrm>
+            <a:custGeom>
+              <a:avLst/>
+              <a:gdLst>
+                <a:gd name="connsiteX0" fmla="*/ 6861546 w 6861545"/>
+                <a:gd name="connsiteY0" fmla="*/ 6861546 h 6861545"/>
+                <a:gd name="connsiteX1" fmla="*/ 3435812 w 6861545"/>
+                <a:gd name="connsiteY1" fmla="*/ 6861546 h 6861545"/>
+                <a:gd name="connsiteX2" fmla="*/ 0 w 6861545"/>
+                <a:gd name="connsiteY2" fmla="*/ 3425734 h 6861545"/>
+                <a:gd name="connsiteX3" fmla="*/ 0 w 6861545"/>
+                <a:gd name="connsiteY3" fmla="*/ 0 h 6861545"/>
+                <a:gd name="connsiteX4" fmla="*/ 3425734 w 6861545"/>
+                <a:gd name="connsiteY4" fmla="*/ 0 h 6861545"/>
+                <a:gd name="connsiteX5" fmla="*/ 6861546 w 6861545"/>
+                <a:gd name="connsiteY5" fmla="*/ 3435812 h 6861545"/>
+                <a:gd name="connsiteX6" fmla="*/ 6861546 w 6861545"/>
+                <a:gd name="connsiteY6" fmla="*/ 6861546 h 6861545"/>
+              </a:gdLst>
+              <a:ahLst/>
+              <a:cxnLst>
+                <a:cxn ang="0">
+                  <a:pos x="connsiteX0" y="connsiteY0"/>
+                </a:cxn>
+                <a:cxn ang="0">
+                  <a:pos x="connsiteX1" y="connsiteY1"/>
+                </a:cxn>
+                <a:cxn ang="0">
+                  <a:pos x="connsiteX2" y="connsiteY2"/>
+                </a:cxn>
+                <a:cxn ang="0">
+                  <a:pos x="connsiteX3" y="connsiteY3"/>
+                </a:cxn>
+                <a:cxn ang="0">
+                  <a:pos x="connsiteX4" y="connsiteY4"/>
+                </a:cxn>
+                <a:cxn ang="0">
+                  <a:pos x="connsiteX5" y="connsiteY5"/>
+                </a:cxn>
+                <a:cxn ang="0">
+                  <a:pos x="connsiteX6" y="connsiteY6"/>
+                </a:cxn>
+              </a:cxnLst>
+              <a:rect l="l" t="t" r="r" b="b"/>
+              <a:pathLst>
+                <a:path w="6861545" h="6861545">
+                  <a:moveTo>
+                    <a:pt x="6861546" y="6861546"/>
+                  </a:moveTo>
+                  <a:lnTo>
+                    <a:pt x="3435812" y="6861546"/>
+                  </a:lnTo>
+                  <a:cubicBezTo>
+                    <a:pt x="1538245" y="6861546"/>
+                    <a:pt x="0" y="5323301"/>
+                    <a:pt x="0" y="3425734"/>
+                  </a:cubicBezTo>
+                  <a:lnTo>
+                    <a:pt x="0" y="0"/>
+                  </a:lnTo>
+                  <a:lnTo>
+                    <a:pt x="3425734" y="0"/>
+                  </a:lnTo>
+                  <a:cubicBezTo>
+                    <a:pt x="5323301" y="0"/>
+                    <a:pt x="6861546" y="1538245"/>
+                    <a:pt x="6861546" y="3435812"/>
+                  </a:cubicBezTo>
+                  <a:lnTo>
+                    <a:pt x="6861546" y="6861546"/>
+                  </a:lnTo>
+                  <a:close/>
+                </a:path>
+              </a:pathLst>
+            </a:custGeom>
+            <a:solidFill>
+              <a:srgbClr val="FFFFFF"/>
+            </a:solidFill>
+            <a:ln w="38100" cap="flat">
+              <a:solidFill>
+                <a:srgbClr val="F7F7F7"/>
+              </a:solidFill>
+              <a:prstDash val="solid"/>
+              <a:miter/>
+            </a:ln>
+          </p:spPr>
+          <p:txBody>
+            <a:bodyPr rtlCol="0" anchor="ctr"/>
+            <a:lstStyle/>
+            <a:p>
+              <a:endParaRPr lang="en-US" dirty="0"/>
+            </a:p>
+          </p:txBody>
+        </p:sp>
+      </p:grpSp>
+      <p:sp>
+        <p:nvSpPr>
+          <p:cNvPr id="21" name="Texture">
+            <a:extLst>
+              <a:ext uri="{FF2B5EF4-FFF2-40B4-BE49-F238E27FC236}">
+                <a16:creationId xmlns:a16="http://schemas.microsoft.com/office/drawing/2014/main" id="{1A4066CF-83FA-4BF2-8618-AD3CF2DCEE2D}"/>
+              </a:ext>
+              <a:ext uri="{C183D7F6-B498-43B3-948B-1728B52AA6E4}">
+                <adec:decorative xmlns:adec="http://schemas.microsoft.com/office/drawing/2017/decorative" val="1"/>
+              </a:ext>
+            </a:extLst>
+          </p:cNvPr>
+          <p:cNvSpPr>
+            <a:spLocks noGrp="1" noRot="1" noChangeAspect="1" noMove="1" noResize="1" noEditPoints="1" noAdjustHandles="1" noChangeArrowheads="1" noChangeShapeType="1" noTextEdit="1"/>
+          </p:cNvSpPr>
+          <p:nvPr>
+            <p:extLst>
+              <p:ext uri="{386F3935-93C4-4BCD-93E2-E3B085C9AB24}">
+                <p16:designElem xmlns:p16="http://schemas.microsoft.com/office/powerpoint/2015/main" val="1"/>
+              </p:ext>
+            </p:extLst>
+          </p:nvPr>
+        </p:nvSpPr>
+        <p:spPr>
+          <a:xfrm>
+            <a:off x="-3048" y="0"/>
+            <a:ext cx="12188952" cy="6858000"/>
+          </a:xfrm>
+          <a:prstGeom prst="rect">
+            <a:avLst/>
+          </a:prstGeom>
+          <a:blipFill dpi="0" rotWithShape="1">
+            <a:blip r:embed="rId2">
+              <a:alphaModFix amt="6000"/>
+            </a:blip>
+            <a:srcRect/>
+            <a:tile tx="0" ty="0" sx="100000" sy="100000" flip="none" algn="tl"/>
+          </a:blipFill>
+          <a:ln w="9525" cap="flat">
+            <a:noFill/>
+            <a:prstDash val="solid"/>
+            <a:miter/>
+          </a:ln>
+        </p:spPr>
+        <p:txBody>
+          <a:bodyPr rtlCol="0" anchor="ctr"/>
+          <a:lstStyle/>
+          <a:p>
+            <a:endParaRPr lang="en-US" dirty="0"/>
+          </a:p>
+        </p:txBody>
+      </p:sp>
+      <p:sp>
+        <p:nvSpPr>
+          <p:cNvPr id="2" name="Title 1">
+            <a:extLst>
+              <a:ext uri="{FF2B5EF4-FFF2-40B4-BE49-F238E27FC236}">
+                <a16:creationId xmlns:a16="http://schemas.microsoft.com/office/drawing/2014/main" id="{52C75A07-70F2-42F6-9632-0873C4C47A49}"/>
+              </a:ext>
+            </a:extLst>
+          </p:cNvPr>
+          <p:cNvSpPr>
+            <a:spLocks noGrp="1"/>
+          </p:cNvSpPr>
+          <p:nvPr>
+            <p:ph type="title"/>
+          </p:nvPr>
+        </p:nvSpPr>
+        <p:spPr>
+          <a:xfrm>
+            <a:off x="457200" y="758952"/>
+            <a:ext cx="6943725" cy="1325563"/>
+          </a:xfrm>
+        </p:spPr>
+        <p:txBody>
+          <a:bodyPr anchor="b">
+            <a:normAutofit/>
+          </a:bodyPr>
+          <a:lstStyle/>
+          <a:p>
+            <a:r>
+              <a:rPr lang="en-US" dirty="0"/>
+              <a:t>Portfolios	</a:t>
+            </a:r>
+          </a:p>
+        </p:txBody>
+      </p:sp>
+      <p:sp>
+        <p:nvSpPr>
+          <p:cNvPr id="3" name="Content Placeholder 2">
+            <a:extLst>
+              <a:ext uri="{FF2B5EF4-FFF2-40B4-BE49-F238E27FC236}">
+                <a16:creationId xmlns:a16="http://schemas.microsoft.com/office/drawing/2014/main" id="{FD3E45F1-1854-4650-83DA-6F57B8EEF2D3}"/>
+              </a:ext>
+            </a:extLst>
+          </p:cNvPr>
+          <p:cNvSpPr>
+            <a:spLocks noGrp="1"/>
+          </p:cNvSpPr>
+          <p:nvPr>
+            <p:ph idx="1"/>
+          </p:nvPr>
+        </p:nvSpPr>
+        <p:spPr>
+          <a:xfrm>
+            <a:off x="457200" y="2286000"/>
+            <a:ext cx="6943725" cy="3875603"/>
+          </a:xfrm>
+        </p:spPr>
+        <p:txBody>
+          <a:bodyPr>
+            <a:normAutofit/>
+          </a:bodyPr>
+          <a:lstStyle/>
+          <a:p>
+            <a:r>
+              <a:rPr lang="en-US" dirty="0"/>
+              <a:t>Hand picked by the team.</a:t>
+            </a:r>
+          </a:p>
+          <a:p>
+            <a:r>
+              <a:rPr lang="en-US" dirty="0"/>
+              <a:t>The goal is to create a well-rounded portfolio for the user</a:t>
+            </a:r>
+          </a:p>
+          <a:p>
+            <a:r>
+              <a:rPr lang="en-US" dirty="0"/>
+              <a:t>An easy way to get integrated with Crypto</a:t>
+            </a:r>
+          </a:p>
+          <a:p>
+            <a:r>
+              <a:rPr lang="en-US" dirty="0"/>
+              <a:t>The portfolios are based off of risk tolerance of the user. </a:t>
+            </a:r>
+          </a:p>
+          <a:p>
+            <a:r>
+              <a:rPr lang="en-US" dirty="0"/>
+              <a:t>Starting from a no risk, pure bond, to a high-risk using stocks and crypto currencies</a:t>
+            </a:r>
+          </a:p>
+        </p:txBody>
+      </p:sp>
+      <p:pic>
+        <p:nvPicPr>
+          <p:cNvPr id="4" name="Picture 3">
+            <a:extLst>
+              <a:ext uri="{FF2B5EF4-FFF2-40B4-BE49-F238E27FC236}">
+                <a16:creationId xmlns:a16="http://schemas.microsoft.com/office/drawing/2014/main" id="{146B1B05-65DC-4FB0-8335-79C989AEDAA3}"/>
+              </a:ext>
+            </a:extLst>
+          </p:cNvPr>
+          <p:cNvPicPr>
+            <a:picLocks noChangeAspect="1"/>
+          </p:cNvPicPr>
+          <p:nvPr/>
+        </p:nvPicPr>
+        <p:blipFill>
+          <a:blip r:embed="rId3"/>
+          <a:stretch>
+            <a:fillRect/>
+          </a:stretch>
+        </p:blipFill>
+        <p:spPr>
+          <a:xfrm>
+            <a:off x="8980190" y="725850"/>
+            <a:ext cx="1633866" cy="2625125"/>
+          </a:xfrm>
+          <a:prstGeom prst="rect">
+            <a:avLst/>
+          </a:prstGeom>
+        </p:spPr>
+      </p:pic>
+    </p:spTree>
+    <p:extLst>
+      <p:ext uri="{BB962C8B-B14F-4D97-AF65-F5344CB8AC3E}">
+        <p14:creationId xmlns:p14="http://schemas.microsoft.com/office/powerpoint/2010/main" val="3244771359"/>
+      </p:ext>
+    </p:extLst>
+  </p:cSld>
+  <p:clrMapOvr>
+    <a:masterClrMapping/>
+  </p:clrMapOvr>
+</p:sld>
+</file>
+
+<file path=ppt/slides/slide5.xml><?xml version="1.0" encoding="utf-8"?>
+<p:sld xmlns:a="http://schemas.openxmlformats.org/drawingml/2006/main" xmlns:r="http://schemas.openxmlformats.org/officeDocument/2006/relationships" xmlns:p="http://schemas.openxmlformats.org/presentationml/2006/main">
+  <p:cSld>
+    <p:bg>
+      <p:bgPr>
+        <a:solidFill>
+          <a:schemeClr val="bg2"/>
+        </a:solidFill>
+        <a:effectLst/>
+      </p:bgPr>
+    </p:bg>
+    <p:spTree>
+      <p:nvGrpSpPr>
+        <p:cNvPr id="1" name=""/>
+        <p:cNvGrpSpPr/>
+        <p:nvPr/>
+      </p:nvGrpSpPr>
+      <p:grpSpPr>
+        <a:xfrm>
+          <a:off x="0" y="0"/>
+          <a:ext cx="0" cy="0"/>
+          <a:chOff x="0" y="0"/>
+          <a:chExt cx="0" cy="0"/>
+        </a:xfrm>
+      </p:grpSpPr>
+      <p:sp useBgFill="1">
+        <p:nvSpPr>
+          <p:cNvPr id="9" name="Background Fill">
+            <a:extLst>
+              <a:ext uri="{FF2B5EF4-FFF2-40B4-BE49-F238E27FC236}">
+                <a16:creationId xmlns:a16="http://schemas.microsoft.com/office/drawing/2014/main" id="{FAFB3478-4AEC-431E-93B2-1593839C16DA}"/>
+              </a:ext>
+              <a:ext uri="{C183D7F6-B498-43B3-948B-1728B52AA6E4}">
+                <adec:decorative xmlns:adec="http://schemas.microsoft.com/office/drawing/2017/decorative" val="1"/>
+              </a:ext>
+            </a:extLst>
+          </p:cNvPr>
+          <p:cNvSpPr>
+            <a:spLocks noGrp="1" noRot="1" noChangeAspect="1" noMove="1" noResize="1" noEditPoints="1" noAdjustHandles="1" noChangeArrowheads="1" noChangeShapeType="1" noTextEdit="1"/>
+          </p:cNvSpPr>
+          <p:nvPr>
+            <p:extLst>
+              <p:ext uri="{386F3935-93C4-4BCD-93E2-E3B085C9AB24}">
+                <p16:designElem xmlns:p16="http://schemas.microsoft.com/office/powerpoint/2015/main" val="1"/>
+              </p:ext>
+            </p:extLst>
+          </p:nvPr>
+        </p:nvSpPr>
+        <p:spPr>
+          <a:xfrm>
+            <a:off x="0" y="0"/>
+            <a:ext cx="12192000" cy="6858000"/>
+          </a:xfrm>
+          <a:prstGeom prst="rect">
+            <a:avLst/>
+          </a:prstGeom>
+          <a:ln w="9525" cap="flat">
+            <a:noFill/>
+            <a:prstDash val="solid"/>
+            <a:miter/>
+          </a:ln>
+        </p:spPr>
+        <p:txBody>
+          <a:bodyPr rtlCol="0" anchor="ctr"/>
+          <a:lstStyle/>
+          <a:p>
+            <a:endParaRPr lang="en-US">
+              <a:solidFill>
+                <a:schemeClr val="tx1"/>
+              </a:solidFill>
+            </a:endParaRPr>
+          </a:p>
+        </p:txBody>
+      </p:sp>
+      <p:sp>
+        <p:nvSpPr>
+          <p:cNvPr id="11" name="Color Fill">
+            <a:extLst>
+              <a:ext uri="{FF2B5EF4-FFF2-40B4-BE49-F238E27FC236}">
+                <a16:creationId xmlns:a16="http://schemas.microsoft.com/office/drawing/2014/main" id="{A8A68745-355E-4D81-AA5F-942C71082A1E}"/>
+              </a:ext>
+              <a:ext uri="{C183D7F6-B498-43B3-948B-1728B52AA6E4}">
+                <adec:decorative xmlns:adec="http://schemas.microsoft.com/office/drawing/2017/decorative" val="1"/>
+              </a:ext>
+            </a:extLst>
+          </p:cNvPr>
+          <p:cNvSpPr>
+            <a:spLocks noGrp="1" noRot="1" noChangeAspect="1" noMove="1" noResize="1" noEditPoints="1" noAdjustHandles="1" noChangeArrowheads="1" noChangeShapeType="1" noTextEdit="1"/>
+          </p:cNvSpPr>
+          <p:nvPr>
+            <p:extLst>
+              <p:ext uri="{386F3935-93C4-4BCD-93E2-E3B085C9AB24}">
+                <p16:designElem xmlns:p16="http://schemas.microsoft.com/office/powerpoint/2015/main" val="1"/>
+              </p:ext>
+            </p:extLst>
+          </p:nvPr>
+        </p:nvSpPr>
+        <p:spPr>
+          <a:xfrm>
+            <a:off x="0" y="0"/>
+            <a:ext cx="12188952" cy="6858000"/>
+          </a:xfrm>
+          <a:prstGeom prst="rect">
+            <a:avLst/>
+          </a:prstGeom>
+          <a:solidFill>
+            <a:schemeClr val="bg2">
+              <a:lumMod val="75000"/>
+              <a:lumOff val="25000"/>
+              <a:alpha val="40000"/>
+            </a:schemeClr>
+          </a:solidFill>
+          <a:ln w="9525" cap="flat">
+            <a:noFill/>
+            <a:prstDash val="solid"/>
+            <a:miter/>
+          </a:ln>
+        </p:spPr>
+        <p:txBody>
+          <a:bodyPr rtlCol="0" anchor="ctr"/>
+          <a:lstStyle/>
+          <a:p>
+            <a:endParaRPr lang="en-US" dirty="0">
+              <a:solidFill>
+                <a:schemeClr val="bg2">
+                  <a:lumMod val="75000"/>
+                  <a:lumOff val="25000"/>
+                </a:schemeClr>
+              </a:solidFill>
+            </a:endParaRPr>
+          </a:p>
+        </p:txBody>
+      </p:sp>
+      <p:grpSp>
+        <p:nvGrpSpPr>
+          <p:cNvPr id="13" name="Group 12">
+            <a:extLst>
+              <a:ext uri="{FF2B5EF4-FFF2-40B4-BE49-F238E27FC236}">
+                <a16:creationId xmlns:a16="http://schemas.microsoft.com/office/drawing/2014/main" id="{ACFFE4B1-0C8D-42AF-8708-9452BBC0F4DE}"/>
+              </a:ext>
+              <a:ext uri="{C183D7F6-B498-43B3-948B-1728B52AA6E4}">
+                <adec:decorative xmlns:adec="http://schemas.microsoft.com/office/drawing/2017/decorative" val="1"/>
+              </a:ext>
+            </a:extLst>
+          </p:cNvPr>
+          <p:cNvGrpSpPr>
+            <a:grpSpLocks noGrp="1" noUngrp="1" noRot="1" noChangeAspect="1" noMove="1" noResize="1"/>
+          </p:cNvGrpSpPr>
+          <p:nvPr>
+            <p:extLst>
+              <p:ext uri="{386F3935-93C4-4BCD-93E2-E3B085C9AB24}">
+                <p16:designElem xmlns:p16="http://schemas.microsoft.com/office/powerpoint/2015/main" val="1"/>
+              </p:ext>
+            </p:extLst>
+          </p:nvPr>
+        </p:nvGrpSpPr>
+        <p:grpSpPr>
+          <a:xfrm>
+            <a:off x="6968058" y="0"/>
+            <a:ext cx="4842451" cy="6290051"/>
+            <a:chOff x="6968058" y="0"/>
+            <a:chExt cx="4842451" cy="6290051"/>
+          </a:xfrm>
+        </p:grpSpPr>
+        <p:sp>
+          <p:nvSpPr>
+            <p:cNvPr id="14" name="Oval 13">
+              <a:extLst>
+                <a:ext uri="{FF2B5EF4-FFF2-40B4-BE49-F238E27FC236}">
+                  <a16:creationId xmlns:a16="http://schemas.microsoft.com/office/drawing/2014/main" id="{F2640A5D-6AAA-4BD0-8F9E-947D32E86AF3}"/>
+                </a:ext>
+                <a:ext uri="{C183D7F6-B498-43B3-948B-1728B52AA6E4}">
+                  <adec:decorative xmlns:adec="http://schemas.microsoft.com/office/drawing/2017/decorative" val="1"/>
+                </a:ext>
+              </a:extLst>
+            </p:cNvPr>
+            <p:cNvSpPr/>
+            <p:nvPr>
+              <p:extLst>
+                <p:ext uri="{386F3935-93C4-4BCD-93E2-E3B085C9AB24}">
+                  <p16:designElem xmlns:p16="http://schemas.microsoft.com/office/powerpoint/2015/main" val="1"/>
+                </p:ext>
+              </p:extLst>
+            </p:nvPr>
+          </p:nvSpPr>
+          <p:spPr>
+            <a:xfrm>
+              <a:off x="11202463" y="453951"/>
+              <a:ext cx="608046" cy="608046"/>
+            </a:xfrm>
+            <a:prstGeom prst="ellipse">
+              <a:avLst/>
+            </a:prstGeom>
+            <a:solidFill>
+              <a:schemeClr val="accent1">
+                <a:lumMod val="60000"/>
+                <a:lumOff val="40000"/>
+                <a:alpha val="60000"/>
+              </a:schemeClr>
+            </a:solidFill>
+            <a:ln w="9331" cap="flat">
+              <a:noFill/>
+              <a:prstDash val="solid"/>
+              <a:miter/>
+            </a:ln>
+          </p:spPr>
+          <p:txBody>
+            <a:bodyPr rtlCol="0" anchor="ctr"/>
+            <a:lstStyle/>
+            <a:p>
+              <a:endParaRPr lang="en-US">
+                <a:solidFill>
+                  <a:schemeClr val="tx1"/>
+                </a:solidFill>
+              </a:endParaRPr>
+            </a:p>
+          </p:txBody>
+        </p:sp>
+        <p:sp>
+          <p:nvSpPr>
+            <p:cNvPr id="15" name="Graphic 18">
+              <a:extLst>
+                <a:ext uri="{FF2B5EF4-FFF2-40B4-BE49-F238E27FC236}">
+                  <a16:creationId xmlns:a16="http://schemas.microsoft.com/office/drawing/2014/main" id="{5004930C-818C-41BC-8346-DD8A8AA56ECA}"/>
+                </a:ext>
+                <a:ext uri="{C183D7F6-B498-43B3-948B-1728B52AA6E4}">
+                  <adec:decorative xmlns:adec="http://schemas.microsoft.com/office/drawing/2017/decorative" val="1"/>
+                </a:ext>
+              </a:extLst>
+            </p:cNvPr>
+            <p:cNvSpPr/>
+            <p:nvPr>
+              <p:extLst>
+                <p:ext uri="{386F3935-93C4-4BCD-93E2-E3B085C9AB24}">
+                  <p16:designElem xmlns:p16="http://schemas.microsoft.com/office/powerpoint/2015/main" val="1"/>
+                </p:ext>
+              </p:extLst>
+            </p:nvPr>
+          </p:nvSpPr>
+          <p:spPr>
+            <a:xfrm rot="3600000">
+              <a:off x="7192513" y="5208982"/>
+              <a:ext cx="856614" cy="1305524"/>
+            </a:xfrm>
+            <a:custGeom>
+              <a:avLst/>
+              <a:gdLst>
+                <a:gd name="connsiteX0" fmla="*/ 3413379 w 3413378"/>
+                <a:gd name="connsiteY0" fmla="*/ 3266028 h 6532054"/>
+                <a:gd name="connsiteX1" fmla="*/ 1706689 w 3413378"/>
+                <a:gd name="connsiteY1" fmla="*/ 6532055 h 6532054"/>
+                <a:gd name="connsiteX2" fmla="*/ 0 w 3413378"/>
+                <a:gd name="connsiteY2" fmla="*/ 3266028 h 6532054"/>
+                <a:gd name="connsiteX3" fmla="*/ 1706689 w 3413378"/>
+                <a:gd name="connsiteY3" fmla="*/ 0 h 6532054"/>
+                <a:gd name="connsiteX4" fmla="*/ 3413379 w 3413378"/>
+                <a:gd name="connsiteY4" fmla="*/ 3266028 h 6532054"/>
+              </a:gdLst>
+              <a:ahLst/>
+              <a:cxnLst>
+                <a:cxn ang="0">
+                  <a:pos x="connsiteX0" y="connsiteY0"/>
+                </a:cxn>
+                <a:cxn ang="0">
+                  <a:pos x="connsiteX1" y="connsiteY1"/>
+                </a:cxn>
+                <a:cxn ang="0">
+                  <a:pos x="connsiteX2" y="connsiteY2"/>
+                </a:cxn>
+                <a:cxn ang="0">
+                  <a:pos x="connsiteX3" y="connsiteY3"/>
+                </a:cxn>
+                <a:cxn ang="0">
+                  <a:pos x="connsiteX4" y="connsiteY4"/>
+                </a:cxn>
+              </a:cxnLst>
+              <a:rect l="l" t="t" r="r" b="b"/>
+              <a:pathLst>
+                <a:path w="3413378" h="6532054">
+                  <a:moveTo>
+                    <a:pt x="3413379" y="3266028"/>
+                  </a:moveTo>
+                  <a:cubicBezTo>
+                    <a:pt x="3413379" y="5069777"/>
+                    <a:pt x="1706689" y="6532055"/>
+                    <a:pt x="1706689" y="6532055"/>
+                  </a:cubicBezTo>
+                  <a:cubicBezTo>
+                    <a:pt x="1706689" y="6532055"/>
+                    <a:pt x="0" y="5069777"/>
+                    <a:pt x="0" y="3266028"/>
+                  </a:cubicBezTo>
+                  <a:cubicBezTo>
+                    <a:pt x="0" y="1462278"/>
+                    <a:pt x="1706689" y="0"/>
+                    <a:pt x="1706689" y="0"/>
+                  </a:cubicBezTo>
+                  <a:cubicBezTo>
+                    <a:pt x="1706689" y="0"/>
+                    <a:pt x="3413379" y="1462278"/>
+                    <a:pt x="3413379" y="3266028"/>
+                  </a:cubicBezTo>
+                  <a:close/>
+                </a:path>
+              </a:pathLst>
+            </a:custGeom>
+            <a:pattFill prst="pct5">
+              <a:fgClr>
+                <a:schemeClr val="accent4">
+                  <a:lumMod val="60000"/>
+                  <a:lumOff val="40000"/>
+                </a:schemeClr>
+              </a:fgClr>
+              <a:bgClr>
+                <a:schemeClr val="accent1">
+                  <a:lumMod val="75000"/>
+                </a:schemeClr>
+              </a:bgClr>
+            </a:pattFill>
+            <a:ln w="9525" cap="flat">
+              <a:noFill/>
+              <a:prstDash val="solid"/>
+              <a:miter/>
+            </a:ln>
+          </p:spPr>
+          <p:txBody>
+            <a:bodyPr rtlCol="0" anchor="ctr"/>
+            <a:lstStyle/>
+            <a:p>
+              <a:endParaRPr lang="en-US"/>
+            </a:p>
+          </p:txBody>
+        </p:sp>
+        <p:sp>
+          <p:nvSpPr>
+            <p:cNvPr id="16" name="Oval 15">
+              <a:extLst>
+                <a:ext uri="{FF2B5EF4-FFF2-40B4-BE49-F238E27FC236}">
+                  <a16:creationId xmlns:a16="http://schemas.microsoft.com/office/drawing/2014/main" id="{F2150E4F-A492-4FF2-A7B7-3275EAEDDADC}"/>
+                </a:ext>
+                <a:ext uri="{C183D7F6-B498-43B3-948B-1728B52AA6E4}">
+                  <adec:decorative xmlns:adec="http://schemas.microsoft.com/office/drawing/2017/decorative" val="1"/>
+                </a:ext>
+              </a:extLst>
+            </p:cNvPr>
+            <p:cNvSpPr/>
+            <p:nvPr>
+              <p:extLst>
+                <p:ext uri="{386F3935-93C4-4BCD-93E2-E3B085C9AB24}">
+                  <p16:designElem xmlns:p16="http://schemas.microsoft.com/office/powerpoint/2015/main" val="1"/>
+                </p:ext>
+              </p:extLst>
+            </p:nvPr>
+          </p:nvSpPr>
+          <p:spPr>
+            <a:xfrm>
+              <a:off x="7028124" y="4672162"/>
+              <a:ext cx="256132" cy="256132"/>
+            </a:xfrm>
+            <a:prstGeom prst="ellipse">
+              <a:avLst/>
+            </a:prstGeom>
+            <a:solidFill>
+              <a:schemeClr val="accent5"/>
+            </a:solidFill>
+            <a:ln>
+              <a:noFill/>
+            </a:ln>
+          </p:spPr>
+          <p:style>
+            <a:lnRef idx="2">
+              <a:schemeClr val="accent1">
+                <a:shade val="50000"/>
+              </a:schemeClr>
+            </a:lnRef>
+            <a:fillRef idx="1">
+              <a:schemeClr val="accent1"/>
+            </a:fillRef>
+            <a:effectRef idx="0">
+              <a:schemeClr val="accent1"/>
+            </a:effectRef>
+            <a:fontRef idx="minor">
+              <a:schemeClr val="lt1"/>
+            </a:fontRef>
+          </p:style>
+          <p:txBody>
+            <a:bodyPr rtlCol="0" anchor="ctr"/>
+            <a:lstStyle/>
+            <a:p>
+              <a:pPr algn="ctr"/>
+              <a:endParaRPr lang="en-US"/>
+            </a:p>
+          </p:txBody>
+        </p:sp>
+        <p:sp>
+          <p:nvSpPr>
+            <p:cNvPr id="17" name="Freeform: Shape 16">
+              <a:extLst>
+                <a:ext uri="{FF2B5EF4-FFF2-40B4-BE49-F238E27FC236}">
+                  <a16:creationId xmlns:a16="http://schemas.microsoft.com/office/drawing/2014/main" id="{178181CF-FD84-4C33-A523-4227DD0AB883}"/>
+                </a:ext>
+                <a:ext uri="{C183D7F6-B498-43B3-948B-1728B52AA6E4}">
+                  <adec:decorative xmlns:adec="http://schemas.microsoft.com/office/drawing/2017/decorative" val="1"/>
+                </a:ext>
+              </a:extLst>
+            </p:cNvPr>
+            <p:cNvSpPr/>
+            <p:nvPr>
+              <p:extLst>
+                <p:ext uri="{386F3935-93C4-4BCD-93E2-E3B085C9AB24}">
+                  <p16:designElem xmlns:p16="http://schemas.microsoft.com/office/powerpoint/2015/main" val="1"/>
+                </p:ext>
+              </p:extLst>
+            </p:nvPr>
+          </p:nvSpPr>
+          <p:spPr>
+            <a:xfrm>
+              <a:off x="7300707" y="0"/>
+              <a:ext cx="3721476" cy="1682047"/>
+            </a:xfrm>
+            <a:custGeom>
+              <a:avLst/>
+              <a:gdLst>
+                <a:gd name="connsiteX0" fmla="*/ 0 w 3721476"/>
+                <a:gd name="connsiteY0" fmla="*/ 0 h 1682047"/>
+                <a:gd name="connsiteX1" fmla="*/ 3721476 w 3721476"/>
+                <a:gd name="connsiteY1" fmla="*/ 0 h 1682047"/>
+                <a:gd name="connsiteX2" fmla="*/ 3721230 w 3721476"/>
+                <a:gd name="connsiteY2" fmla="*/ 4881 h 1682047"/>
+                <a:gd name="connsiteX3" fmla="*/ 1862697 w 3721476"/>
+                <a:gd name="connsiteY3" fmla="*/ 1682047 h 1682047"/>
+                <a:gd name="connsiteX4" fmla="*/ 0 w 3721476"/>
+                <a:gd name="connsiteY4" fmla="*/ 1682047 h 1682047"/>
+              </a:gdLst>
+              <a:ahLst/>
+              <a:cxnLst>
+                <a:cxn ang="0">
+                  <a:pos x="connsiteX0" y="connsiteY0"/>
+                </a:cxn>
+                <a:cxn ang="0">
+                  <a:pos x="connsiteX1" y="connsiteY1"/>
+                </a:cxn>
+                <a:cxn ang="0">
+                  <a:pos x="connsiteX2" y="connsiteY2"/>
+                </a:cxn>
+                <a:cxn ang="0">
+                  <a:pos x="connsiteX3" y="connsiteY3"/>
+                </a:cxn>
+                <a:cxn ang="0">
+                  <a:pos x="connsiteX4" y="connsiteY4"/>
+                </a:cxn>
+              </a:cxnLst>
+              <a:rect l="l" t="t" r="r" b="b"/>
+              <a:pathLst>
+                <a:path w="3721476" h="1682047">
+                  <a:moveTo>
+                    <a:pt x="0" y="0"/>
+                  </a:moveTo>
+                  <a:lnTo>
+                    <a:pt x="3721476" y="0"/>
+                  </a:lnTo>
+                  <a:lnTo>
+                    <a:pt x="3721230" y="4881"/>
+                  </a:lnTo>
+                  <a:cubicBezTo>
+                    <a:pt x="3625562" y="946929"/>
+                    <a:pt x="2829989" y="1682047"/>
+                    <a:pt x="1862697" y="1682047"/>
+                  </a:cubicBezTo>
+                  <a:lnTo>
+                    <a:pt x="0" y="1682047"/>
+                  </a:lnTo>
+                  <a:close/>
+                </a:path>
+              </a:pathLst>
+            </a:custGeom>
+            <a:solidFill>
+              <a:schemeClr val="accent1">
+                <a:alpha val="60000"/>
+              </a:schemeClr>
+            </a:solidFill>
+            <a:ln w="9331" cap="flat">
+              <a:noFill/>
+              <a:prstDash val="solid"/>
+              <a:miter/>
+            </a:ln>
+          </p:spPr>
+          <p:txBody>
+            <a:bodyPr rtlCol="0" anchor="ctr"/>
+            <a:lstStyle/>
+            <a:p>
+              <a:endParaRPr lang="en-US"/>
+            </a:p>
+          </p:txBody>
+        </p:sp>
+        <p:sp>
+          <p:nvSpPr>
+            <p:cNvPr id="18" name="Freeform: Shape 17">
+              <a:extLst>
+                <a:ext uri="{FF2B5EF4-FFF2-40B4-BE49-F238E27FC236}">
+                  <a16:creationId xmlns:a16="http://schemas.microsoft.com/office/drawing/2014/main" id="{A4291BA4-6012-4E62-9967-AAF860BC23C7}"/>
+                </a:ext>
+                <a:ext uri="{C183D7F6-B498-43B3-948B-1728B52AA6E4}">
+                  <adec:decorative xmlns:adec="http://schemas.microsoft.com/office/drawing/2017/decorative" val="1"/>
+                </a:ext>
+              </a:extLst>
+            </p:cNvPr>
+            <p:cNvSpPr/>
+            <p:nvPr>
+              <p:extLst>
+                <p:ext uri="{386F3935-93C4-4BCD-93E2-E3B085C9AB24}">
+                  <p16:designElem xmlns:p16="http://schemas.microsoft.com/office/powerpoint/2015/main" val="1"/>
+                </p:ext>
+              </p:extLst>
+            </p:nvPr>
+          </p:nvSpPr>
+          <p:spPr>
+            <a:xfrm>
+              <a:off x="7494494" y="0"/>
+              <a:ext cx="3281081" cy="1452282"/>
+            </a:xfrm>
+            <a:custGeom>
+              <a:avLst/>
+              <a:gdLst>
+                <a:gd name="connsiteX0" fmla="*/ 0 w 2872279"/>
+                <a:gd name="connsiteY0" fmla="*/ 0 h 1183937"/>
+                <a:gd name="connsiteX1" fmla="*/ 2872279 w 2872279"/>
+                <a:gd name="connsiteY1" fmla="*/ 0 h 1183937"/>
+                <a:gd name="connsiteX2" fmla="*/ 2868418 w 2872279"/>
+                <a:gd name="connsiteY2" fmla="*/ 25304 h 1183937"/>
+                <a:gd name="connsiteX3" fmla="*/ 1446821 w 2872279"/>
+                <a:gd name="connsiteY3" fmla="*/ 1183937 h 1183937"/>
+                <a:gd name="connsiteX4" fmla="*/ 0 w 2872279"/>
+                <a:gd name="connsiteY4" fmla="*/ 1183937 h 1183937"/>
+              </a:gdLst>
+              <a:ahLst/>
+              <a:cxnLst>
+                <a:cxn ang="0">
+                  <a:pos x="connsiteX0" y="connsiteY0"/>
+                </a:cxn>
+                <a:cxn ang="0">
+                  <a:pos x="connsiteX1" y="connsiteY1"/>
+                </a:cxn>
+                <a:cxn ang="0">
+                  <a:pos x="connsiteX2" y="connsiteY2"/>
+                </a:cxn>
+                <a:cxn ang="0">
+                  <a:pos x="connsiteX3" y="connsiteY3"/>
+                </a:cxn>
+                <a:cxn ang="0">
+                  <a:pos x="connsiteX4" y="connsiteY4"/>
+                </a:cxn>
+              </a:cxnLst>
+              <a:rect l="l" t="t" r="r" b="b"/>
+              <a:pathLst>
+                <a:path w="2872279" h="1183937">
+                  <a:moveTo>
+                    <a:pt x="0" y="0"/>
+                  </a:moveTo>
+                  <a:lnTo>
+                    <a:pt x="2872279" y="0"/>
+                  </a:lnTo>
+                  <a:lnTo>
+                    <a:pt x="2868418" y="25304"/>
+                  </a:lnTo>
+                  <a:cubicBezTo>
+                    <a:pt x="2733112" y="686540"/>
+                    <a:pt x="2148060" y="1183937"/>
+                    <a:pt x="1446821" y="1183937"/>
+                  </a:cubicBezTo>
+                  <a:lnTo>
+                    <a:pt x="0" y="1183937"/>
+                  </a:lnTo>
+                  <a:close/>
+                </a:path>
+              </a:pathLst>
+            </a:custGeom>
+            <a:pattFill prst="pct5">
+              <a:fgClr>
+                <a:schemeClr val="accent4">
+                  <a:lumMod val="60000"/>
+                  <a:lumOff val="40000"/>
+                </a:schemeClr>
+              </a:fgClr>
+              <a:bgClr>
+                <a:schemeClr val="bg2">
+                  <a:lumMod val="75000"/>
+                  <a:lumOff val="25000"/>
+                </a:schemeClr>
+              </a:bgClr>
+            </a:pattFill>
+            <a:ln w="9525" cap="flat">
+              <a:noFill/>
+              <a:prstDash val="solid"/>
+              <a:miter/>
+            </a:ln>
+          </p:spPr>
+          <p:txBody>
+            <a:bodyPr rtlCol="0" anchor="ctr"/>
+            <a:lstStyle/>
+            <a:p>
+              <a:endParaRPr lang="en-US"/>
+            </a:p>
+          </p:txBody>
+        </p:sp>
+        <p:sp>
+          <p:nvSpPr>
+            <p:cNvPr id="19" name="Graphic 9">
+              <a:extLst>
+                <a:ext uri="{FF2B5EF4-FFF2-40B4-BE49-F238E27FC236}">
+                  <a16:creationId xmlns:a16="http://schemas.microsoft.com/office/drawing/2014/main" id="{DB4C2B0A-BA86-462E-AECA-6706FA6C90C8}"/>
+                </a:ext>
+                <a:ext uri="{C183D7F6-B498-43B3-948B-1728B52AA6E4}">
+                  <adec:decorative xmlns:adec="http://schemas.microsoft.com/office/drawing/2017/decorative" val="1"/>
+                </a:ext>
+              </a:extLst>
+            </p:cNvPr>
+            <p:cNvSpPr/>
+            <p:nvPr>
+              <p:extLst>
+                <p:ext uri="{386F3935-93C4-4BCD-93E2-E3B085C9AB24}">
+                  <p16:designElem xmlns:p16="http://schemas.microsoft.com/office/powerpoint/2015/main" val="1"/>
+                </p:ext>
+              </p:extLst>
+            </p:nvPr>
+          </p:nvSpPr>
+          <p:spPr>
+            <a:xfrm>
+              <a:off x="7300707" y="1837752"/>
+              <a:ext cx="4389377" cy="4389374"/>
+            </a:xfrm>
+            <a:custGeom>
+              <a:avLst/>
+              <a:gdLst>
+                <a:gd name="connsiteX0" fmla="*/ 6861546 w 6861545"/>
+                <a:gd name="connsiteY0" fmla="*/ 6861546 h 6861545"/>
+                <a:gd name="connsiteX1" fmla="*/ 3435812 w 6861545"/>
+                <a:gd name="connsiteY1" fmla="*/ 6861546 h 6861545"/>
+                <a:gd name="connsiteX2" fmla="*/ 0 w 6861545"/>
+                <a:gd name="connsiteY2" fmla="*/ 3425734 h 6861545"/>
+                <a:gd name="connsiteX3" fmla="*/ 0 w 6861545"/>
+                <a:gd name="connsiteY3" fmla="*/ 0 h 6861545"/>
+                <a:gd name="connsiteX4" fmla="*/ 3425734 w 6861545"/>
+                <a:gd name="connsiteY4" fmla="*/ 0 h 6861545"/>
+                <a:gd name="connsiteX5" fmla="*/ 6861546 w 6861545"/>
+                <a:gd name="connsiteY5" fmla="*/ 3435812 h 6861545"/>
+                <a:gd name="connsiteX6" fmla="*/ 6861546 w 6861545"/>
+                <a:gd name="connsiteY6" fmla="*/ 6861546 h 6861545"/>
+              </a:gdLst>
+              <a:ahLst/>
+              <a:cxnLst>
+                <a:cxn ang="0">
+                  <a:pos x="connsiteX0" y="connsiteY0"/>
+                </a:cxn>
+                <a:cxn ang="0">
+                  <a:pos x="connsiteX1" y="connsiteY1"/>
+                </a:cxn>
+                <a:cxn ang="0">
+                  <a:pos x="connsiteX2" y="connsiteY2"/>
+                </a:cxn>
+                <a:cxn ang="0">
+                  <a:pos x="connsiteX3" y="connsiteY3"/>
+                </a:cxn>
+                <a:cxn ang="0">
+                  <a:pos x="connsiteX4" y="connsiteY4"/>
+                </a:cxn>
+                <a:cxn ang="0">
+                  <a:pos x="connsiteX5" y="connsiteY5"/>
+                </a:cxn>
+                <a:cxn ang="0">
+                  <a:pos x="connsiteX6" y="connsiteY6"/>
+                </a:cxn>
+              </a:cxnLst>
+              <a:rect l="l" t="t" r="r" b="b"/>
+              <a:pathLst>
+                <a:path w="6861545" h="6861545">
+                  <a:moveTo>
+                    <a:pt x="6861546" y="6861546"/>
+                  </a:moveTo>
+                  <a:lnTo>
+                    <a:pt x="3435812" y="6861546"/>
+                  </a:lnTo>
+                  <a:cubicBezTo>
+                    <a:pt x="1538245" y="6861546"/>
+                    <a:pt x="0" y="5323301"/>
+                    <a:pt x="0" y="3425734"/>
+                  </a:cubicBezTo>
+                  <a:lnTo>
+                    <a:pt x="0" y="0"/>
+                  </a:lnTo>
+                  <a:lnTo>
+                    <a:pt x="3425734" y="0"/>
+                  </a:lnTo>
+                  <a:cubicBezTo>
+                    <a:pt x="5323301" y="0"/>
+                    <a:pt x="6861546" y="1538245"/>
+                    <a:pt x="6861546" y="3435812"/>
+                  </a:cubicBezTo>
+                  <a:lnTo>
+                    <a:pt x="6861546" y="6861546"/>
+                  </a:lnTo>
+                  <a:close/>
+                </a:path>
+              </a:pathLst>
+            </a:custGeom>
+            <a:solidFill>
+              <a:srgbClr val="FFFFFF"/>
+            </a:solidFill>
+            <a:ln w="38100" cap="flat">
+              <a:solidFill>
+                <a:srgbClr val="F7F7F7"/>
+              </a:solidFill>
+              <a:prstDash val="solid"/>
+              <a:miter/>
+            </a:ln>
+          </p:spPr>
+          <p:txBody>
+            <a:bodyPr rtlCol="0" anchor="ctr"/>
+            <a:lstStyle/>
+            <a:p>
+              <a:endParaRPr lang="en-US" dirty="0"/>
+            </a:p>
+          </p:txBody>
+        </p:sp>
+      </p:grpSp>
+      <p:sp>
+        <p:nvSpPr>
+          <p:cNvPr id="21" name="Texture">
+            <a:extLst>
+              <a:ext uri="{FF2B5EF4-FFF2-40B4-BE49-F238E27FC236}">
+                <a16:creationId xmlns:a16="http://schemas.microsoft.com/office/drawing/2014/main" id="{2E922E9E-A29B-4164-A634-B718A43369CA}"/>
+              </a:ext>
+              <a:ext uri="{C183D7F6-B498-43B3-948B-1728B52AA6E4}">
+                <adec:decorative xmlns:adec="http://schemas.microsoft.com/office/drawing/2017/decorative" val="1"/>
+              </a:ext>
+            </a:extLst>
+          </p:cNvPr>
+          <p:cNvSpPr>
+            <a:spLocks noGrp="1" noRot="1" noChangeAspect="1" noMove="1" noResize="1" noEditPoints="1" noAdjustHandles="1" noChangeArrowheads="1" noChangeShapeType="1" noTextEdit="1"/>
+          </p:cNvSpPr>
+          <p:nvPr>
+            <p:extLst>
+              <p:ext uri="{386F3935-93C4-4BCD-93E2-E3B085C9AB24}">
+                <p16:designElem xmlns:p16="http://schemas.microsoft.com/office/powerpoint/2015/main" val="1"/>
+              </p:ext>
+            </p:extLst>
+          </p:nvPr>
+        </p:nvSpPr>
+        <p:spPr>
+          <a:xfrm>
+            <a:off x="3048" y="0"/>
+            <a:ext cx="12188952" cy="6858000"/>
+          </a:xfrm>
+          <a:prstGeom prst="rect">
+            <a:avLst/>
+          </a:prstGeom>
+          <a:blipFill dpi="0" rotWithShape="1">
+            <a:blip r:embed="rId2">
+              <a:alphaModFix amt="6000"/>
+            </a:blip>
+            <a:srcRect/>
+            <a:tile tx="0" ty="0" sx="100000" sy="100000" flip="none" algn="tl"/>
+          </a:blipFill>
+          <a:ln w="9525" cap="flat">
+            <a:noFill/>
+            <a:prstDash val="solid"/>
+            <a:miter/>
+          </a:ln>
+        </p:spPr>
+        <p:txBody>
+          <a:bodyPr rtlCol="0" anchor="ctr"/>
+          <a:lstStyle/>
+          <a:p>
+            <a:endParaRPr lang="en-US" dirty="0"/>
+          </a:p>
+        </p:txBody>
+      </p:sp>
+      <p:sp>
+        <p:nvSpPr>
+          <p:cNvPr id="2" name="Title 1">
+            <a:extLst>
+              <a:ext uri="{FF2B5EF4-FFF2-40B4-BE49-F238E27FC236}">
+                <a16:creationId xmlns:a16="http://schemas.microsoft.com/office/drawing/2014/main" id="{6D0F2D0A-03EA-4F89-B7AC-387AA3AE9759}"/>
+              </a:ext>
+            </a:extLst>
+          </p:cNvPr>
+          <p:cNvSpPr>
+            <a:spLocks noGrp="1"/>
+          </p:cNvSpPr>
+          <p:nvPr>
+            <p:ph type="title"/>
+          </p:nvPr>
+        </p:nvSpPr>
+        <p:spPr>
+          <a:xfrm>
+            <a:off x="457200" y="758952"/>
+            <a:ext cx="6158753" cy="1325563"/>
+          </a:xfrm>
+        </p:spPr>
+        <p:txBody>
+          <a:bodyPr anchor="b">
+            <a:normAutofit/>
+          </a:bodyPr>
+          <a:lstStyle/>
+          <a:p>
+            <a:r>
+              <a:rPr lang="en-US" dirty="0"/>
+              <a:t>RoCry Bot	</a:t>
+            </a:r>
+          </a:p>
+        </p:txBody>
+      </p:sp>
+      <p:sp>
+        <p:nvSpPr>
+          <p:cNvPr id="3" name="Content Placeholder 2">
+            <a:extLst>
+              <a:ext uri="{FF2B5EF4-FFF2-40B4-BE49-F238E27FC236}">
+                <a16:creationId xmlns:a16="http://schemas.microsoft.com/office/drawing/2014/main" id="{9D4BB55A-9182-44AB-AC4C-663F892BA7A6}"/>
+              </a:ext>
+            </a:extLst>
+          </p:cNvPr>
+          <p:cNvSpPr>
+            <a:spLocks noGrp="1"/>
+          </p:cNvSpPr>
+          <p:nvPr>
+            <p:ph idx="1"/>
+          </p:nvPr>
+        </p:nvSpPr>
+        <p:spPr>
+          <a:xfrm>
+            <a:off x="457200" y="2286000"/>
+            <a:ext cx="6158753" cy="3878707"/>
+          </a:xfrm>
+        </p:spPr>
+        <p:txBody>
+          <a:bodyPr>
+            <a:normAutofit/>
+          </a:bodyPr>
+          <a:lstStyle/>
+          <a:p>
+            <a:r>
+              <a:rPr lang="en-US" dirty="0"/>
+              <a:t>RoCry is our chat bot for the user to get acquainted with investing.</a:t>
+            </a:r>
+          </a:p>
+          <a:p>
+            <a:r>
+              <a:rPr lang="en-US" dirty="0"/>
+              <a:t>The goal is to create an interactive bot which will give recommendations for which portfolio we will provide</a:t>
+            </a:r>
+          </a:p>
+          <a:p>
+            <a:r>
+              <a:rPr lang="en-US" dirty="0"/>
+              <a:t>RoCry will be using Lambda for its functions and </a:t>
+            </a:r>
+            <a:r>
+              <a:rPr lang="en-US" dirty="0" err="1"/>
+              <a:t>Kommunicate</a:t>
+            </a:r>
+            <a:r>
+              <a:rPr lang="en-US" dirty="0"/>
+              <a:t> for its integration to the dash</a:t>
+            </a:r>
+          </a:p>
+        </p:txBody>
+      </p:sp>
+      <p:pic>
+        <p:nvPicPr>
+          <p:cNvPr id="4" name="Picture 3">
+            <a:extLst>
+              <a:ext uri="{FF2B5EF4-FFF2-40B4-BE49-F238E27FC236}">
+                <a16:creationId xmlns:a16="http://schemas.microsoft.com/office/drawing/2014/main" id="{E4CB734A-86CC-44A7-BD3D-6ACD5BF49808}"/>
+              </a:ext>
+            </a:extLst>
+          </p:cNvPr>
+          <p:cNvPicPr>
+            <a:picLocks noChangeAspect="1"/>
+          </p:cNvPicPr>
+          <p:nvPr/>
+        </p:nvPicPr>
+        <p:blipFill>
+          <a:blip r:embed="rId3"/>
+          <a:stretch>
+            <a:fillRect/>
+          </a:stretch>
+        </p:blipFill>
+        <p:spPr>
+          <a:xfrm>
+            <a:off x="8510255" y="2457802"/>
+            <a:ext cx="1905433" cy="3061451"/>
+          </a:xfrm>
+          <a:prstGeom prst="rect">
+            <a:avLst/>
+          </a:prstGeom>
+        </p:spPr>
+      </p:pic>
+    </p:spTree>
+    <p:extLst>
+      <p:ext uri="{BB962C8B-B14F-4D97-AF65-F5344CB8AC3E}">
+        <p14:creationId xmlns:p14="http://schemas.microsoft.com/office/powerpoint/2010/main" val="2549323149"/>
+      </p:ext>
+    </p:extLst>
+  </p:cSld>
+  <p:clrMapOvr>
+    <a:masterClrMapping/>
+  </p:clrMapOvr>
+</p:sld>
+</file>
+
+<file path=ppt/slides/slide6.xml><?xml version="1.0" encoding="utf-8"?>
 <p:sld xmlns:a="http://schemas.openxmlformats.org/drawingml/2006/main" xmlns:r="http://schemas.openxmlformats.org/officeDocument/2006/relationships" xmlns:p="http://schemas.openxmlformats.org/presentationml/2006/main">
   <p:cSld>
     <p:bg>
@@ -14785,8 +16785,8 @@
               <a:buNone/>
             </a:pPr>
             <a:r>
-              <a:rPr lang="en-US" sz="2400"/>
-              <a:t>Let's take a dive into our website and meet the team along with Cibi our chat bot!</a:t>
+              <a:rPr lang="en-US" sz="2400" dirty="0"/>
+              <a:t>Let's take a dive into our dash and meet the team along with RoCry our chat bot!</a:t>
             </a:r>
           </a:p>
         </p:txBody>
@@ -14834,7 +16834,1062 @@
 </p:sld>
 </file>
 
-<file path=ppt/slides/slide5.xml><?xml version="1.0" encoding="utf-8"?>
+<file path=ppt/slides/slide7.xml><?xml version="1.0" encoding="utf-8"?>
+<p:sld xmlns:a="http://schemas.openxmlformats.org/drawingml/2006/main" xmlns:r="http://schemas.openxmlformats.org/officeDocument/2006/relationships" xmlns:p="http://schemas.openxmlformats.org/presentationml/2006/main">
+  <p:cSld>
+    <p:bg>
+      <p:bgPr>
+        <a:solidFill>
+          <a:schemeClr val="bg2"/>
+        </a:solidFill>
+        <a:effectLst/>
+      </p:bgPr>
+    </p:bg>
+    <p:spTree>
+      <p:nvGrpSpPr>
+        <p:cNvPr id="1" name=""/>
+        <p:cNvGrpSpPr/>
+        <p:nvPr/>
+      </p:nvGrpSpPr>
+      <p:grpSpPr>
+        <a:xfrm>
+          <a:off x="0" y="0"/>
+          <a:ext cx="0" cy="0"/>
+          <a:chOff x="0" y="0"/>
+          <a:chExt cx="0" cy="0"/>
+        </a:xfrm>
+      </p:grpSpPr>
+      <p:sp useBgFill="1">
+        <p:nvSpPr>
+          <p:cNvPr id="11" name="Background Fill">
+            <a:extLst>
+              <a:ext uri="{FF2B5EF4-FFF2-40B4-BE49-F238E27FC236}">
+                <a16:creationId xmlns:a16="http://schemas.microsoft.com/office/drawing/2014/main" id="{FAFB3478-4AEC-431E-93B2-1593839C16DA}"/>
+              </a:ext>
+              <a:ext uri="{C183D7F6-B498-43B3-948B-1728B52AA6E4}">
+                <adec:decorative xmlns:adec="http://schemas.microsoft.com/office/drawing/2017/decorative" val="1"/>
+              </a:ext>
+            </a:extLst>
+          </p:cNvPr>
+          <p:cNvSpPr>
+            <a:spLocks noGrp="1" noRot="1" noChangeAspect="1" noMove="1" noResize="1" noEditPoints="1" noAdjustHandles="1" noChangeArrowheads="1" noChangeShapeType="1" noTextEdit="1"/>
+          </p:cNvSpPr>
+          <p:nvPr>
+            <p:extLst>
+              <p:ext uri="{386F3935-93C4-4BCD-93E2-E3B085C9AB24}">
+                <p16:designElem xmlns:p16="http://schemas.microsoft.com/office/powerpoint/2015/main" val="1"/>
+              </p:ext>
+            </p:extLst>
+          </p:nvPr>
+        </p:nvSpPr>
+        <p:spPr>
+          <a:xfrm>
+            <a:off x="0" y="0"/>
+            <a:ext cx="12192000" cy="6858000"/>
+          </a:xfrm>
+          <a:prstGeom prst="rect">
+            <a:avLst/>
+          </a:prstGeom>
+          <a:ln w="9525" cap="flat">
+            <a:noFill/>
+            <a:prstDash val="solid"/>
+            <a:miter/>
+          </a:ln>
+        </p:spPr>
+        <p:txBody>
+          <a:bodyPr rtlCol="0" anchor="ctr"/>
+          <a:lstStyle/>
+          <a:p>
+            <a:endParaRPr lang="en-US">
+              <a:solidFill>
+                <a:schemeClr val="tx1"/>
+              </a:solidFill>
+            </a:endParaRPr>
+          </a:p>
+        </p:txBody>
+      </p:sp>
+      <p:sp>
+        <p:nvSpPr>
+          <p:cNvPr id="13" name="Color Fill">
+            <a:extLst>
+              <a:ext uri="{FF2B5EF4-FFF2-40B4-BE49-F238E27FC236}">
+                <a16:creationId xmlns:a16="http://schemas.microsoft.com/office/drawing/2014/main" id="{5AABFA05-E806-48B0-BA38-42F01BD6324C}"/>
+              </a:ext>
+              <a:ext uri="{C183D7F6-B498-43B3-948B-1728B52AA6E4}">
+                <adec:decorative xmlns:adec="http://schemas.microsoft.com/office/drawing/2017/decorative" val="1"/>
+              </a:ext>
+            </a:extLst>
+          </p:cNvPr>
+          <p:cNvSpPr>
+            <a:spLocks noGrp="1" noRot="1" noChangeAspect="1" noMove="1" noResize="1" noEditPoints="1" noAdjustHandles="1" noChangeArrowheads="1" noChangeShapeType="1" noTextEdit="1"/>
+          </p:cNvSpPr>
+          <p:nvPr>
+            <p:extLst>
+              <p:ext uri="{386F3935-93C4-4BCD-93E2-E3B085C9AB24}">
+                <p16:designElem xmlns:p16="http://schemas.microsoft.com/office/powerpoint/2015/main" val="1"/>
+              </p:ext>
+            </p:extLst>
+          </p:nvPr>
+        </p:nvSpPr>
+        <p:spPr>
+          <a:xfrm>
+            <a:off x="0" y="0"/>
+            <a:ext cx="12188952" cy="6858000"/>
+          </a:xfrm>
+          <a:prstGeom prst="rect">
+            <a:avLst/>
+          </a:prstGeom>
+          <a:solidFill>
+            <a:schemeClr val="bg2">
+              <a:lumMod val="75000"/>
+              <a:lumOff val="25000"/>
+              <a:alpha val="40000"/>
+            </a:schemeClr>
+          </a:solidFill>
+          <a:ln w="9525" cap="flat">
+            <a:noFill/>
+            <a:prstDash val="solid"/>
+            <a:miter/>
+          </a:ln>
+        </p:spPr>
+        <p:txBody>
+          <a:bodyPr rtlCol="0" anchor="ctr"/>
+          <a:lstStyle/>
+          <a:p>
+            <a:endParaRPr lang="en-US" dirty="0">
+              <a:solidFill>
+                <a:schemeClr val="bg2">
+                  <a:lumMod val="75000"/>
+                  <a:lumOff val="25000"/>
+                </a:schemeClr>
+              </a:solidFill>
+            </a:endParaRPr>
+          </a:p>
+        </p:txBody>
+      </p:sp>
+      <p:grpSp>
+        <p:nvGrpSpPr>
+          <p:cNvPr id="15" name="Group 14">
+            <a:extLst>
+              <a:ext uri="{FF2B5EF4-FFF2-40B4-BE49-F238E27FC236}">
+                <a16:creationId xmlns:a16="http://schemas.microsoft.com/office/drawing/2014/main" id="{42DDC377-BE64-4F1B-80B7-057C9566551E}"/>
+              </a:ext>
+              <a:ext uri="{C183D7F6-B498-43B3-948B-1728B52AA6E4}">
+                <adec:decorative xmlns:adec="http://schemas.microsoft.com/office/drawing/2017/decorative" val="1"/>
+              </a:ext>
+            </a:extLst>
+          </p:cNvPr>
+          <p:cNvGrpSpPr>
+            <a:grpSpLocks noGrp="1" noUngrp="1" noRot="1" noChangeAspect="1" noMove="1" noResize="1"/>
+          </p:cNvGrpSpPr>
+          <p:nvPr>
+            <p:extLst>
+              <p:ext uri="{386F3935-93C4-4BCD-93E2-E3B085C9AB24}">
+                <p16:designElem xmlns:p16="http://schemas.microsoft.com/office/powerpoint/2015/main" val="1"/>
+              </p:ext>
+            </p:extLst>
+          </p:nvPr>
+        </p:nvGrpSpPr>
+        <p:grpSpPr>
+          <a:xfrm>
+            <a:off x="7935972" y="-1"/>
+            <a:ext cx="4112311" cy="6858001"/>
+            <a:chOff x="7935972" y="-1"/>
+            <a:chExt cx="4112311" cy="6858001"/>
+          </a:xfrm>
+        </p:grpSpPr>
+        <p:sp>
+          <p:nvSpPr>
+            <p:cNvPr id="16" name="Oval 15">
+              <a:extLst>
+                <a:ext uri="{FF2B5EF4-FFF2-40B4-BE49-F238E27FC236}">
+                  <a16:creationId xmlns:a16="http://schemas.microsoft.com/office/drawing/2014/main" id="{704EC963-D536-4453-AA53-8431AB5EFFD1}"/>
+                </a:ext>
+                <a:ext uri="{C183D7F6-B498-43B3-948B-1728B52AA6E4}">
+                  <adec:decorative xmlns:adec="http://schemas.microsoft.com/office/drawing/2017/decorative" val="1"/>
+                </a:ext>
+              </a:extLst>
+            </p:cNvPr>
+            <p:cNvSpPr/>
+            <p:nvPr>
+              <p:extLst>
+                <p:ext uri="{386F3935-93C4-4BCD-93E2-E3B085C9AB24}">
+                  <p16:designElem xmlns:p16="http://schemas.microsoft.com/office/powerpoint/2015/main" val="1"/>
+                </p:ext>
+              </p:extLst>
+            </p:nvPr>
+          </p:nvSpPr>
+          <p:spPr>
+            <a:xfrm>
+              <a:off x="11450769" y="756967"/>
+              <a:ext cx="438100" cy="438100"/>
+            </a:xfrm>
+            <a:prstGeom prst="ellipse">
+              <a:avLst/>
+            </a:prstGeom>
+            <a:solidFill>
+              <a:schemeClr val="accent2"/>
+            </a:solidFill>
+            <a:ln>
+              <a:noFill/>
+            </a:ln>
+          </p:spPr>
+          <p:style>
+            <a:lnRef idx="2">
+              <a:schemeClr val="accent1">
+                <a:shade val="50000"/>
+              </a:schemeClr>
+            </a:lnRef>
+            <a:fillRef idx="1">
+              <a:schemeClr val="accent1"/>
+            </a:fillRef>
+            <a:effectRef idx="0">
+              <a:schemeClr val="accent1"/>
+            </a:effectRef>
+            <a:fontRef idx="minor">
+              <a:schemeClr val="lt1"/>
+            </a:fontRef>
+          </p:style>
+          <p:txBody>
+            <a:bodyPr rtlCol="0" anchor="ctr"/>
+            <a:lstStyle/>
+            <a:p>
+              <a:pPr algn="ctr"/>
+              <a:endParaRPr lang="en-US"/>
+            </a:p>
+          </p:txBody>
+        </p:sp>
+        <p:sp>
+          <p:nvSpPr>
+            <p:cNvPr id="17" name="Graphic 18">
+              <a:extLst>
+                <a:ext uri="{FF2B5EF4-FFF2-40B4-BE49-F238E27FC236}">
+                  <a16:creationId xmlns:a16="http://schemas.microsoft.com/office/drawing/2014/main" id="{9830F5A7-3C8A-4FDD-A9D3-679558CA64F9}"/>
+                </a:ext>
+                <a:ext uri="{C183D7F6-B498-43B3-948B-1728B52AA6E4}">
+                  <adec:decorative xmlns:adec="http://schemas.microsoft.com/office/drawing/2017/decorative" val="1"/>
+                </a:ext>
+              </a:extLst>
+            </p:cNvPr>
+            <p:cNvSpPr/>
+            <p:nvPr>
+              <p:extLst>
+                <p:ext uri="{386F3935-93C4-4BCD-93E2-E3B085C9AB24}">
+                  <p16:designElem xmlns:p16="http://schemas.microsoft.com/office/powerpoint/2015/main" val="1"/>
+                </p:ext>
+              </p:extLst>
+            </p:nvPr>
+          </p:nvSpPr>
+          <p:spPr>
+            <a:xfrm>
+              <a:off x="7935972" y="4013148"/>
+              <a:ext cx="813897" cy="1240422"/>
+            </a:xfrm>
+            <a:custGeom>
+              <a:avLst/>
+              <a:gdLst>
+                <a:gd name="connsiteX0" fmla="*/ 3413379 w 3413378"/>
+                <a:gd name="connsiteY0" fmla="*/ 3266028 h 6532054"/>
+                <a:gd name="connsiteX1" fmla="*/ 1706689 w 3413378"/>
+                <a:gd name="connsiteY1" fmla="*/ 6532055 h 6532054"/>
+                <a:gd name="connsiteX2" fmla="*/ 0 w 3413378"/>
+                <a:gd name="connsiteY2" fmla="*/ 3266028 h 6532054"/>
+                <a:gd name="connsiteX3" fmla="*/ 1706689 w 3413378"/>
+                <a:gd name="connsiteY3" fmla="*/ 0 h 6532054"/>
+                <a:gd name="connsiteX4" fmla="*/ 3413379 w 3413378"/>
+                <a:gd name="connsiteY4" fmla="*/ 3266028 h 6532054"/>
+              </a:gdLst>
+              <a:ahLst/>
+              <a:cxnLst>
+                <a:cxn ang="0">
+                  <a:pos x="connsiteX0" y="connsiteY0"/>
+                </a:cxn>
+                <a:cxn ang="0">
+                  <a:pos x="connsiteX1" y="connsiteY1"/>
+                </a:cxn>
+                <a:cxn ang="0">
+                  <a:pos x="connsiteX2" y="connsiteY2"/>
+                </a:cxn>
+                <a:cxn ang="0">
+                  <a:pos x="connsiteX3" y="connsiteY3"/>
+                </a:cxn>
+                <a:cxn ang="0">
+                  <a:pos x="connsiteX4" y="connsiteY4"/>
+                </a:cxn>
+              </a:cxnLst>
+              <a:rect l="l" t="t" r="r" b="b"/>
+              <a:pathLst>
+                <a:path w="3413378" h="6532054">
+                  <a:moveTo>
+                    <a:pt x="3413379" y="3266028"/>
+                  </a:moveTo>
+                  <a:cubicBezTo>
+                    <a:pt x="3413379" y="5069777"/>
+                    <a:pt x="1706689" y="6532055"/>
+                    <a:pt x="1706689" y="6532055"/>
+                  </a:cubicBezTo>
+                  <a:cubicBezTo>
+                    <a:pt x="1706689" y="6532055"/>
+                    <a:pt x="0" y="5069777"/>
+                    <a:pt x="0" y="3266028"/>
+                  </a:cubicBezTo>
+                  <a:cubicBezTo>
+                    <a:pt x="0" y="1462278"/>
+                    <a:pt x="1706689" y="0"/>
+                    <a:pt x="1706689" y="0"/>
+                  </a:cubicBezTo>
+                  <a:cubicBezTo>
+                    <a:pt x="1706689" y="0"/>
+                    <a:pt x="3413379" y="1462278"/>
+                    <a:pt x="3413379" y="3266028"/>
+                  </a:cubicBezTo>
+                  <a:close/>
+                </a:path>
+              </a:pathLst>
+            </a:custGeom>
+            <a:pattFill prst="pct5">
+              <a:fgClr>
+                <a:schemeClr val="accent4">
+                  <a:lumMod val="60000"/>
+                  <a:lumOff val="40000"/>
+                </a:schemeClr>
+              </a:fgClr>
+              <a:bgClr>
+                <a:schemeClr val="accent1">
+                  <a:lumMod val="75000"/>
+                </a:schemeClr>
+              </a:bgClr>
+            </a:pattFill>
+            <a:ln w="9525" cap="flat">
+              <a:noFill/>
+              <a:prstDash val="solid"/>
+              <a:miter/>
+            </a:ln>
+          </p:spPr>
+          <p:txBody>
+            <a:bodyPr rtlCol="0" anchor="ctr"/>
+            <a:lstStyle/>
+            <a:p>
+              <a:endParaRPr lang="en-US" dirty="0"/>
+            </a:p>
+          </p:txBody>
+        </p:sp>
+        <p:sp>
+          <p:nvSpPr>
+            <p:cNvPr id="18" name="Graphic 9">
+              <a:extLst>
+                <a:ext uri="{FF2B5EF4-FFF2-40B4-BE49-F238E27FC236}">
+                  <a16:creationId xmlns:a16="http://schemas.microsoft.com/office/drawing/2014/main" id="{279D6A93-291B-4380-BF71-74648EA48FA5}"/>
+                </a:ext>
+                <a:ext uri="{C183D7F6-B498-43B3-948B-1728B52AA6E4}">
+                  <adec:decorative xmlns:adec="http://schemas.microsoft.com/office/drawing/2017/decorative" val="1"/>
+                </a:ext>
+              </a:extLst>
+            </p:cNvPr>
+            <p:cNvSpPr/>
+            <p:nvPr>
+              <p:extLst>
+                <p:ext uri="{386F3935-93C4-4BCD-93E2-E3B085C9AB24}">
+                  <p16:designElem xmlns:p16="http://schemas.microsoft.com/office/powerpoint/2015/main" val="1"/>
+                </p:ext>
+              </p:extLst>
+            </p:nvPr>
+          </p:nvSpPr>
+          <p:spPr>
+            <a:xfrm>
+              <a:off x="8508034" y="1063796"/>
+              <a:ext cx="3518852" cy="3518851"/>
+            </a:xfrm>
+            <a:custGeom>
+              <a:avLst/>
+              <a:gdLst>
+                <a:gd name="connsiteX0" fmla="*/ 6861546 w 6861545"/>
+                <a:gd name="connsiteY0" fmla="*/ 6861546 h 6861545"/>
+                <a:gd name="connsiteX1" fmla="*/ 3435812 w 6861545"/>
+                <a:gd name="connsiteY1" fmla="*/ 6861546 h 6861545"/>
+                <a:gd name="connsiteX2" fmla="*/ 0 w 6861545"/>
+                <a:gd name="connsiteY2" fmla="*/ 3425734 h 6861545"/>
+                <a:gd name="connsiteX3" fmla="*/ 0 w 6861545"/>
+                <a:gd name="connsiteY3" fmla="*/ 0 h 6861545"/>
+                <a:gd name="connsiteX4" fmla="*/ 3425734 w 6861545"/>
+                <a:gd name="connsiteY4" fmla="*/ 0 h 6861545"/>
+                <a:gd name="connsiteX5" fmla="*/ 6861546 w 6861545"/>
+                <a:gd name="connsiteY5" fmla="*/ 3435812 h 6861545"/>
+                <a:gd name="connsiteX6" fmla="*/ 6861546 w 6861545"/>
+                <a:gd name="connsiteY6" fmla="*/ 6861546 h 6861545"/>
+              </a:gdLst>
+              <a:ahLst/>
+              <a:cxnLst>
+                <a:cxn ang="0">
+                  <a:pos x="connsiteX0" y="connsiteY0"/>
+                </a:cxn>
+                <a:cxn ang="0">
+                  <a:pos x="connsiteX1" y="connsiteY1"/>
+                </a:cxn>
+                <a:cxn ang="0">
+                  <a:pos x="connsiteX2" y="connsiteY2"/>
+                </a:cxn>
+                <a:cxn ang="0">
+                  <a:pos x="connsiteX3" y="connsiteY3"/>
+                </a:cxn>
+                <a:cxn ang="0">
+                  <a:pos x="connsiteX4" y="connsiteY4"/>
+                </a:cxn>
+                <a:cxn ang="0">
+                  <a:pos x="connsiteX5" y="connsiteY5"/>
+                </a:cxn>
+                <a:cxn ang="0">
+                  <a:pos x="connsiteX6" y="connsiteY6"/>
+                </a:cxn>
+              </a:cxnLst>
+              <a:rect l="l" t="t" r="r" b="b"/>
+              <a:pathLst>
+                <a:path w="6861545" h="6861545">
+                  <a:moveTo>
+                    <a:pt x="6861546" y="6861546"/>
+                  </a:moveTo>
+                  <a:lnTo>
+                    <a:pt x="3435812" y="6861546"/>
+                  </a:lnTo>
+                  <a:cubicBezTo>
+                    <a:pt x="1538245" y="6861546"/>
+                    <a:pt x="0" y="5323301"/>
+                    <a:pt x="0" y="3425734"/>
+                  </a:cubicBezTo>
+                  <a:lnTo>
+                    <a:pt x="0" y="0"/>
+                  </a:lnTo>
+                  <a:lnTo>
+                    <a:pt x="3425734" y="0"/>
+                  </a:lnTo>
+                  <a:cubicBezTo>
+                    <a:pt x="5323301" y="0"/>
+                    <a:pt x="6861546" y="1538245"/>
+                    <a:pt x="6861546" y="3435812"/>
+                  </a:cubicBezTo>
+                  <a:lnTo>
+                    <a:pt x="6861546" y="6861546"/>
+                  </a:lnTo>
+                  <a:close/>
+                </a:path>
+              </a:pathLst>
+            </a:custGeom>
+            <a:pattFill prst="pct5">
+              <a:fgClr>
+                <a:schemeClr val="accent4">
+                  <a:lumMod val="75000"/>
+                </a:schemeClr>
+              </a:fgClr>
+              <a:bgClr>
+                <a:schemeClr val="accent4">
+                  <a:lumMod val="60000"/>
+                  <a:lumOff val="40000"/>
+                </a:schemeClr>
+              </a:bgClr>
+            </a:pattFill>
+            <a:ln w="9525" cap="flat">
+              <a:noFill/>
+              <a:prstDash val="solid"/>
+              <a:miter/>
+            </a:ln>
+          </p:spPr>
+          <p:txBody>
+            <a:bodyPr rtlCol="0" anchor="ctr"/>
+            <a:lstStyle/>
+            <a:p>
+              <a:endParaRPr lang="en-US" dirty="0"/>
+            </a:p>
+          </p:txBody>
+        </p:sp>
+        <p:sp>
+          <p:nvSpPr>
+            <p:cNvPr id="19" name="Oval 18">
+              <a:extLst>
+                <a:ext uri="{FF2B5EF4-FFF2-40B4-BE49-F238E27FC236}">
+                  <a16:creationId xmlns:a16="http://schemas.microsoft.com/office/drawing/2014/main" id="{67F4B6ED-6E4B-4600-BF49-D0B0A2F6EBAF}"/>
+                </a:ext>
+                <a:ext uri="{C183D7F6-B498-43B3-948B-1728B52AA6E4}">
+                  <adec:decorative xmlns:adec="http://schemas.microsoft.com/office/drawing/2017/decorative" val="1"/>
+                </a:ext>
+              </a:extLst>
+            </p:cNvPr>
+            <p:cNvSpPr/>
+            <p:nvPr>
+              <p:extLst>
+                <p:ext uri="{386F3935-93C4-4BCD-93E2-E3B085C9AB24}">
+                  <p16:designElem xmlns:p16="http://schemas.microsoft.com/office/powerpoint/2015/main" val="1"/>
+                </p:ext>
+              </p:extLst>
+            </p:nvPr>
+          </p:nvSpPr>
+          <p:spPr>
+            <a:xfrm>
+              <a:off x="9012156" y="4526823"/>
+              <a:ext cx="260714" cy="260714"/>
+            </a:xfrm>
+            <a:prstGeom prst="ellipse">
+              <a:avLst/>
+            </a:prstGeom>
+            <a:solidFill>
+              <a:schemeClr val="accent1">
+                <a:lumMod val="60000"/>
+                <a:lumOff val="40000"/>
+              </a:schemeClr>
+            </a:solidFill>
+            <a:ln w="9331" cap="flat">
+              <a:noFill/>
+              <a:prstDash val="solid"/>
+              <a:miter/>
+            </a:ln>
+          </p:spPr>
+          <p:txBody>
+            <a:bodyPr rtlCol="0" anchor="ctr"/>
+            <a:lstStyle/>
+            <a:p>
+              <a:endParaRPr lang="en-US">
+                <a:solidFill>
+                  <a:schemeClr val="tx1"/>
+                </a:solidFill>
+              </a:endParaRPr>
+            </a:p>
+          </p:txBody>
+        </p:sp>
+        <p:sp>
+          <p:nvSpPr>
+            <p:cNvPr id="20" name="Graphic 9">
+              <a:extLst>
+                <a:ext uri="{FF2B5EF4-FFF2-40B4-BE49-F238E27FC236}">
+                  <a16:creationId xmlns:a16="http://schemas.microsoft.com/office/drawing/2014/main" id="{C7015312-5A36-4C0D-8547-E8CCA22DCA3C}"/>
+                </a:ext>
+                <a:ext uri="{C183D7F6-B498-43B3-948B-1728B52AA6E4}">
+                  <adec:decorative xmlns:adec="http://schemas.microsoft.com/office/drawing/2017/decorative" val="1"/>
+                </a:ext>
+              </a:extLst>
+            </p:cNvPr>
+            <p:cNvSpPr/>
+            <p:nvPr>
+              <p:extLst>
+                <p:ext uri="{386F3935-93C4-4BCD-93E2-E3B085C9AB24}">
+                  <p16:designElem xmlns:p16="http://schemas.microsoft.com/office/powerpoint/2015/main" val="1"/>
+                </p:ext>
+              </p:extLst>
+            </p:nvPr>
+          </p:nvSpPr>
+          <p:spPr>
+            <a:xfrm>
+              <a:off x="8508034" y="1063157"/>
+              <a:ext cx="3540249" cy="3540247"/>
+            </a:xfrm>
+            <a:custGeom>
+              <a:avLst/>
+              <a:gdLst>
+                <a:gd name="connsiteX0" fmla="*/ 6861546 w 6861545"/>
+                <a:gd name="connsiteY0" fmla="*/ 6861546 h 6861545"/>
+                <a:gd name="connsiteX1" fmla="*/ 3435812 w 6861545"/>
+                <a:gd name="connsiteY1" fmla="*/ 6861546 h 6861545"/>
+                <a:gd name="connsiteX2" fmla="*/ 0 w 6861545"/>
+                <a:gd name="connsiteY2" fmla="*/ 3425734 h 6861545"/>
+                <a:gd name="connsiteX3" fmla="*/ 0 w 6861545"/>
+                <a:gd name="connsiteY3" fmla="*/ 0 h 6861545"/>
+                <a:gd name="connsiteX4" fmla="*/ 3425734 w 6861545"/>
+                <a:gd name="connsiteY4" fmla="*/ 0 h 6861545"/>
+                <a:gd name="connsiteX5" fmla="*/ 6861546 w 6861545"/>
+                <a:gd name="connsiteY5" fmla="*/ 3435812 h 6861545"/>
+                <a:gd name="connsiteX6" fmla="*/ 6861546 w 6861545"/>
+                <a:gd name="connsiteY6" fmla="*/ 6861546 h 6861545"/>
+              </a:gdLst>
+              <a:ahLst/>
+              <a:cxnLst>
+                <a:cxn ang="0">
+                  <a:pos x="connsiteX0" y="connsiteY0"/>
+                </a:cxn>
+                <a:cxn ang="0">
+                  <a:pos x="connsiteX1" y="connsiteY1"/>
+                </a:cxn>
+                <a:cxn ang="0">
+                  <a:pos x="connsiteX2" y="connsiteY2"/>
+                </a:cxn>
+                <a:cxn ang="0">
+                  <a:pos x="connsiteX3" y="connsiteY3"/>
+                </a:cxn>
+                <a:cxn ang="0">
+                  <a:pos x="connsiteX4" y="connsiteY4"/>
+                </a:cxn>
+                <a:cxn ang="0">
+                  <a:pos x="connsiteX5" y="connsiteY5"/>
+                </a:cxn>
+                <a:cxn ang="0">
+                  <a:pos x="connsiteX6" y="connsiteY6"/>
+                </a:cxn>
+              </a:cxnLst>
+              <a:rect l="l" t="t" r="r" b="b"/>
+              <a:pathLst>
+                <a:path w="6861545" h="6861545">
+                  <a:moveTo>
+                    <a:pt x="6861546" y="6861546"/>
+                  </a:moveTo>
+                  <a:lnTo>
+                    <a:pt x="3435812" y="6861546"/>
+                  </a:lnTo>
+                  <a:cubicBezTo>
+                    <a:pt x="1538245" y="6861546"/>
+                    <a:pt x="0" y="5323301"/>
+                    <a:pt x="0" y="3425734"/>
+                  </a:cubicBezTo>
+                  <a:lnTo>
+                    <a:pt x="0" y="0"/>
+                  </a:lnTo>
+                  <a:lnTo>
+                    <a:pt x="3425734" y="0"/>
+                  </a:lnTo>
+                  <a:cubicBezTo>
+                    <a:pt x="5323301" y="0"/>
+                    <a:pt x="6861546" y="1538245"/>
+                    <a:pt x="6861546" y="3435812"/>
+                  </a:cubicBezTo>
+                  <a:lnTo>
+                    <a:pt x="6861546" y="6861546"/>
+                  </a:lnTo>
+                  <a:close/>
+                </a:path>
+              </a:pathLst>
+            </a:custGeom>
+            <a:solidFill>
+              <a:srgbClr val="FFFFFF"/>
+            </a:solidFill>
+            <a:ln w="38100" cap="flat">
+              <a:solidFill>
+                <a:srgbClr val="F7F7F7"/>
+              </a:solidFill>
+              <a:prstDash val="solid"/>
+              <a:miter/>
+            </a:ln>
+          </p:spPr>
+          <p:txBody>
+            <a:bodyPr rtlCol="0" anchor="ctr"/>
+            <a:lstStyle/>
+            <a:p>
+              <a:endParaRPr lang="en-US" dirty="0"/>
+            </a:p>
+          </p:txBody>
+        </p:sp>
+        <p:sp>
+          <p:nvSpPr>
+            <p:cNvPr id="21" name="Freeform: Shape 20">
+              <a:extLst>
+                <a:ext uri="{FF2B5EF4-FFF2-40B4-BE49-F238E27FC236}">
+                  <a16:creationId xmlns:a16="http://schemas.microsoft.com/office/drawing/2014/main" id="{DE6E37D0-F1F6-4779-A0DD-BE7107CC5ABD}"/>
+                </a:ext>
+                <a:ext uri="{C183D7F6-B498-43B3-948B-1728B52AA6E4}">
+                  <adec:decorative xmlns:adec="http://schemas.microsoft.com/office/drawing/2017/decorative" val="1"/>
+                </a:ext>
+              </a:extLst>
+            </p:cNvPr>
+            <p:cNvSpPr/>
+            <p:nvPr>
+              <p:extLst>
+                <p:ext uri="{386F3935-93C4-4BCD-93E2-E3B085C9AB24}">
+                  <p16:designElem xmlns:p16="http://schemas.microsoft.com/office/powerpoint/2015/main" val="1"/>
+                </p:ext>
+              </p:extLst>
+            </p:nvPr>
+          </p:nvSpPr>
+          <p:spPr>
+            <a:xfrm>
+              <a:off x="8508034" y="4793253"/>
+              <a:ext cx="3518852" cy="2064747"/>
+            </a:xfrm>
+            <a:custGeom>
+              <a:avLst/>
+              <a:gdLst>
+                <a:gd name="connsiteX0" fmla="*/ 1762010 w 3518852"/>
+                <a:gd name="connsiteY0" fmla="*/ 0 h 2212102"/>
+                <a:gd name="connsiteX1" fmla="*/ 3518852 w 3518852"/>
+                <a:gd name="connsiteY1" fmla="*/ 0 h 2212102"/>
+                <a:gd name="connsiteX2" fmla="*/ 3518852 w 3518852"/>
+                <a:gd name="connsiteY2" fmla="*/ 1747195 h 2212102"/>
+                <a:gd name="connsiteX3" fmla="*/ 3483055 w 3518852"/>
+                <a:gd name="connsiteY3" fmla="*/ 2100355 h 2212102"/>
+                <a:gd name="connsiteX4" fmla="*/ 3454163 w 3518852"/>
+                <a:gd name="connsiteY4" fmla="*/ 2212102 h 2212102"/>
+                <a:gd name="connsiteX5" fmla="*/ 0 w 3518852"/>
+                <a:gd name="connsiteY5" fmla="*/ 2212102 h 2212102"/>
+                <a:gd name="connsiteX6" fmla="*/ 0 w 3518852"/>
+                <a:gd name="connsiteY6" fmla="*/ 1752335 h 2212102"/>
+                <a:gd name="connsiteX7" fmla="*/ 1762010 w 3518852"/>
+                <a:gd name="connsiteY7" fmla="*/ 0 h 2212102"/>
+              </a:gdLst>
+              <a:ahLst/>
+              <a:cxnLst>
+                <a:cxn ang="0">
+                  <a:pos x="connsiteX0" y="connsiteY0"/>
+                </a:cxn>
+                <a:cxn ang="0">
+                  <a:pos x="connsiteX1" y="connsiteY1"/>
+                </a:cxn>
+                <a:cxn ang="0">
+                  <a:pos x="connsiteX2" y="connsiteY2"/>
+                </a:cxn>
+                <a:cxn ang="0">
+                  <a:pos x="connsiteX3" y="connsiteY3"/>
+                </a:cxn>
+                <a:cxn ang="0">
+                  <a:pos x="connsiteX4" y="connsiteY4"/>
+                </a:cxn>
+                <a:cxn ang="0">
+                  <a:pos x="connsiteX5" y="connsiteY5"/>
+                </a:cxn>
+                <a:cxn ang="0">
+                  <a:pos x="connsiteX6" y="connsiteY6"/>
+                </a:cxn>
+                <a:cxn ang="0">
+                  <a:pos x="connsiteX7" y="connsiteY7"/>
+                </a:cxn>
+              </a:cxnLst>
+              <a:rect l="l" t="t" r="r" b="b"/>
+              <a:pathLst>
+                <a:path w="3518852" h="2212102">
+                  <a:moveTo>
+                    <a:pt x="1762010" y="0"/>
+                  </a:moveTo>
+                  <a:lnTo>
+                    <a:pt x="3518852" y="0"/>
+                  </a:lnTo>
+                  <a:lnTo>
+                    <a:pt x="3518852" y="1747195"/>
+                  </a:lnTo>
+                  <a:cubicBezTo>
+                    <a:pt x="3518852" y="1868170"/>
+                    <a:pt x="3506526" y="1986282"/>
+                    <a:pt x="3483055" y="2100355"/>
+                  </a:cubicBezTo>
+                  <a:lnTo>
+                    <a:pt x="3454163" y="2212102"/>
+                  </a:lnTo>
+                  <a:lnTo>
+                    <a:pt x="0" y="2212102"/>
+                  </a:lnTo>
+                  <a:lnTo>
+                    <a:pt x="0" y="1752335"/>
+                  </a:lnTo>
+                  <a:cubicBezTo>
+                    <a:pt x="0" y="784537"/>
+                    <a:pt x="788868" y="0"/>
+                    <a:pt x="1762010" y="0"/>
+                  </a:cubicBezTo>
+                  <a:close/>
+                </a:path>
+              </a:pathLst>
+            </a:custGeom>
+            <a:solidFill>
+              <a:schemeClr val="accent4">
+                <a:lumMod val="40000"/>
+                <a:lumOff val="60000"/>
+                <a:alpha val="30000"/>
+              </a:schemeClr>
+            </a:solidFill>
+            <a:ln w="9525" cap="flat">
+              <a:noFill/>
+              <a:prstDash val="solid"/>
+              <a:miter/>
+            </a:ln>
+          </p:spPr>
+          <p:txBody>
+            <a:bodyPr wrap="square" rtlCol="0" anchor="ctr">
+              <a:noAutofit/>
+            </a:bodyPr>
+            <a:lstStyle/>
+            <a:p>
+              <a:endParaRPr lang="en-US" dirty="0"/>
+            </a:p>
+          </p:txBody>
+        </p:sp>
+        <p:sp>
+          <p:nvSpPr>
+            <p:cNvPr id="22" name="Freeform: Shape 21">
+              <a:extLst>
+                <a:ext uri="{FF2B5EF4-FFF2-40B4-BE49-F238E27FC236}">
+                  <a16:creationId xmlns:a16="http://schemas.microsoft.com/office/drawing/2014/main" id="{FDB3FC3E-AEEC-4250-B91C-26CA109ED2AB}"/>
+                </a:ext>
+                <a:ext uri="{C183D7F6-B498-43B3-948B-1728B52AA6E4}">
+                  <adec:decorative xmlns:adec="http://schemas.microsoft.com/office/drawing/2017/decorative" val="1"/>
+                </a:ext>
+              </a:extLst>
+            </p:cNvPr>
+            <p:cNvSpPr/>
+            <p:nvPr>
+              <p:extLst>
+                <p:ext uri="{386F3935-93C4-4BCD-93E2-E3B085C9AB24}">
+                  <p16:designElem xmlns:p16="http://schemas.microsoft.com/office/powerpoint/2015/main" val="1"/>
+                </p:ext>
+              </p:extLst>
+            </p:nvPr>
+          </p:nvSpPr>
+          <p:spPr>
+            <a:xfrm>
+              <a:off x="8508785" y="-1"/>
+              <a:ext cx="3316434" cy="976017"/>
+            </a:xfrm>
+            <a:custGeom>
+              <a:avLst/>
+              <a:gdLst>
+                <a:gd name="connsiteX0" fmla="*/ 0 w 2779229"/>
+                <a:gd name="connsiteY0" fmla="*/ 0 h 817919"/>
+                <a:gd name="connsiteX1" fmla="*/ 2779229 w 2779229"/>
+                <a:gd name="connsiteY1" fmla="*/ 0 h 817919"/>
+                <a:gd name="connsiteX2" fmla="*/ 2755430 w 2779229"/>
+                <a:gd name="connsiteY2" fmla="*/ 49404 h 817919"/>
+                <a:gd name="connsiteX3" fmla="*/ 1464180 w 2779229"/>
+                <a:gd name="connsiteY3" fmla="*/ 817919 h 817919"/>
+                <a:gd name="connsiteX4" fmla="*/ 0 w 2779229"/>
+                <a:gd name="connsiteY4" fmla="*/ 817919 h 817919"/>
+              </a:gdLst>
+              <a:ahLst/>
+              <a:cxnLst>
+                <a:cxn ang="0">
+                  <a:pos x="connsiteX0" y="connsiteY0"/>
+                </a:cxn>
+                <a:cxn ang="0">
+                  <a:pos x="connsiteX1" y="connsiteY1"/>
+                </a:cxn>
+                <a:cxn ang="0">
+                  <a:pos x="connsiteX2" y="connsiteY2"/>
+                </a:cxn>
+                <a:cxn ang="0">
+                  <a:pos x="connsiteX3" y="connsiteY3"/>
+                </a:cxn>
+                <a:cxn ang="0">
+                  <a:pos x="connsiteX4" y="connsiteY4"/>
+                </a:cxn>
+              </a:cxnLst>
+              <a:rect l="l" t="t" r="r" b="b"/>
+              <a:pathLst>
+                <a:path w="2779229" h="817919">
+                  <a:moveTo>
+                    <a:pt x="0" y="0"/>
+                  </a:moveTo>
+                  <a:lnTo>
+                    <a:pt x="2779229" y="0"/>
+                  </a:lnTo>
+                  <a:lnTo>
+                    <a:pt x="2755430" y="49404"/>
+                  </a:lnTo>
+                  <a:cubicBezTo>
+                    <a:pt x="2506760" y="507168"/>
+                    <a:pt x="2021765" y="817919"/>
+                    <a:pt x="1464180" y="817919"/>
+                  </a:cubicBezTo>
+                  <a:lnTo>
+                    <a:pt x="0" y="817919"/>
+                  </a:lnTo>
+                  <a:close/>
+                </a:path>
+              </a:pathLst>
+            </a:custGeom>
+            <a:solidFill>
+              <a:schemeClr val="accent1">
+                <a:lumMod val="75000"/>
+              </a:schemeClr>
+            </a:solidFill>
+            <a:ln w="9331" cap="flat">
+              <a:noFill/>
+              <a:prstDash val="solid"/>
+              <a:miter/>
+            </a:ln>
+          </p:spPr>
+          <p:txBody>
+            <a:bodyPr rtlCol="0" anchor="ctr"/>
+            <a:lstStyle/>
+            <a:p>
+              <a:endParaRPr lang="en-US"/>
+            </a:p>
+          </p:txBody>
+        </p:sp>
+      </p:grpSp>
+      <p:sp>
+        <p:nvSpPr>
+          <p:cNvPr id="24" name="Texture">
+            <a:extLst>
+              <a:ext uri="{FF2B5EF4-FFF2-40B4-BE49-F238E27FC236}">
+                <a16:creationId xmlns:a16="http://schemas.microsoft.com/office/drawing/2014/main" id="{2E922E9E-A29B-4164-A634-B718A43369CA}"/>
+              </a:ext>
+              <a:ext uri="{C183D7F6-B498-43B3-948B-1728B52AA6E4}">
+                <adec:decorative xmlns:adec="http://schemas.microsoft.com/office/drawing/2017/decorative" val="1"/>
+              </a:ext>
+            </a:extLst>
+          </p:cNvPr>
+          <p:cNvSpPr>
+            <a:spLocks noGrp="1" noRot="1" noChangeAspect="1" noMove="1" noResize="1" noEditPoints="1" noAdjustHandles="1" noChangeArrowheads="1" noChangeShapeType="1" noTextEdit="1"/>
+          </p:cNvSpPr>
+          <p:nvPr>
+            <p:extLst>
+              <p:ext uri="{386F3935-93C4-4BCD-93E2-E3B085C9AB24}">
+                <p16:designElem xmlns:p16="http://schemas.microsoft.com/office/powerpoint/2015/main" val="1"/>
+              </p:ext>
+            </p:extLst>
+          </p:nvPr>
+        </p:nvSpPr>
+        <p:spPr>
+          <a:xfrm>
+            <a:off x="3048" y="0"/>
+            <a:ext cx="12188952" cy="6858000"/>
+          </a:xfrm>
+          <a:prstGeom prst="rect">
+            <a:avLst/>
+          </a:prstGeom>
+          <a:blipFill dpi="0" rotWithShape="1">
+            <a:blip r:embed="rId2">
+              <a:alphaModFix amt="6000"/>
+            </a:blip>
+            <a:srcRect/>
+            <a:tile tx="0" ty="0" sx="100000" sy="100000" flip="none" algn="tl"/>
+          </a:blipFill>
+          <a:ln w="9525" cap="flat">
+            <a:noFill/>
+            <a:prstDash val="solid"/>
+            <a:miter/>
+          </a:ln>
+        </p:spPr>
+        <p:txBody>
+          <a:bodyPr rtlCol="0" anchor="ctr"/>
+          <a:lstStyle/>
+          <a:p>
+            <a:endParaRPr lang="en-US" dirty="0"/>
+          </a:p>
+        </p:txBody>
+      </p:sp>
+      <p:sp>
+        <p:nvSpPr>
+          <p:cNvPr id="2" name="Title 1">
+            <a:extLst>
+              <a:ext uri="{FF2B5EF4-FFF2-40B4-BE49-F238E27FC236}">
+                <a16:creationId xmlns:a16="http://schemas.microsoft.com/office/drawing/2014/main" id="{6E9A8FF1-89C5-4816-A5AA-A92FD91695B9}"/>
+              </a:ext>
+            </a:extLst>
+          </p:cNvPr>
+          <p:cNvSpPr>
+            <a:spLocks noGrp="1"/>
+          </p:cNvSpPr>
+          <p:nvPr>
+            <p:ph type="title"/>
+          </p:nvPr>
+        </p:nvSpPr>
+        <p:spPr>
+          <a:xfrm>
+            <a:off x="457200" y="758952"/>
+            <a:ext cx="6943725" cy="1325563"/>
+          </a:xfrm>
+        </p:spPr>
+        <p:txBody>
+          <a:bodyPr anchor="b">
+            <a:normAutofit/>
+          </a:bodyPr>
+          <a:lstStyle/>
+          <a:p>
+            <a:r>
+              <a:rPr lang="en-US" dirty="0"/>
+              <a:t>Struggles</a:t>
+            </a:r>
+          </a:p>
+        </p:txBody>
+      </p:sp>
+      <p:sp>
+        <p:nvSpPr>
+          <p:cNvPr id="3" name="Content Placeholder 2">
+            <a:extLst>
+              <a:ext uri="{FF2B5EF4-FFF2-40B4-BE49-F238E27FC236}">
+                <a16:creationId xmlns:a16="http://schemas.microsoft.com/office/drawing/2014/main" id="{B5B5FE5A-58DD-46FE-B641-060792E939AD}"/>
+              </a:ext>
+            </a:extLst>
+          </p:cNvPr>
+          <p:cNvSpPr>
+            <a:spLocks noGrp="1"/>
+          </p:cNvSpPr>
+          <p:nvPr>
+            <p:ph idx="1"/>
+          </p:nvPr>
+        </p:nvSpPr>
+        <p:spPr>
+          <a:xfrm>
+            <a:off x="457200" y="2286000"/>
+            <a:ext cx="6943725" cy="3872995"/>
+          </a:xfrm>
+        </p:spPr>
+        <p:txBody>
+          <a:bodyPr>
+            <a:normAutofit/>
+          </a:bodyPr>
+          <a:lstStyle/>
+          <a:p>
+            <a:r>
+              <a:rPr lang="en-US" dirty="0"/>
+              <a:t>Being able to integrate the bot with Lambda and using voice chat rather than text chat</a:t>
+            </a:r>
+          </a:p>
+          <a:p>
+            <a:r>
+              <a:rPr lang="en-US" dirty="0"/>
+              <a:t>Getting a large amount of data and then cleaning it for the user</a:t>
+            </a:r>
+          </a:p>
+          <a:p>
+            <a:r>
+              <a:rPr lang="en-US" dirty="0"/>
+              <a:t>Finding the machine learning that correctly fit with our goal at RoCry</a:t>
+            </a:r>
+          </a:p>
+          <a:p>
+            <a:r>
+              <a:rPr lang="en-US" dirty="0"/>
+              <a:t>Speech bot only works with Google and not Lex</a:t>
+            </a:r>
+          </a:p>
+        </p:txBody>
+      </p:sp>
+      <p:pic>
+        <p:nvPicPr>
+          <p:cNvPr id="6" name="Picture 5">
+            <a:extLst>
+              <a:ext uri="{FF2B5EF4-FFF2-40B4-BE49-F238E27FC236}">
+                <a16:creationId xmlns:a16="http://schemas.microsoft.com/office/drawing/2014/main" id="{97F5ED44-6668-401E-AD94-8D97CB6C559A}"/>
+              </a:ext>
+            </a:extLst>
+          </p:cNvPr>
+          <p:cNvPicPr>
+            <a:picLocks noChangeAspect="1"/>
+          </p:cNvPicPr>
+          <p:nvPr/>
+        </p:nvPicPr>
+        <p:blipFill>
+          <a:blip r:embed="rId3"/>
+          <a:stretch>
+            <a:fillRect/>
+          </a:stretch>
+        </p:blipFill>
+        <p:spPr>
+          <a:xfrm>
+            <a:off x="9538577" y="1614529"/>
+            <a:ext cx="1521486" cy="2442050"/>
+          </a:xfrm>
+          <a:prstGeom prst="rect">
+            <a:avLst/>
+          </a:prstGeom>
+        </p:spPr>
+      </p:pic>
+    </p:spTree>
+    <p:extLst>
+      <p:ext uri="{BB962C8B-B14F-4D97-AF65-F5344CB8AC3E}">
+        <p14:creationId xmlns:p14="http://schemas.microsoft.com/office/powerpoint/2010/main" val="701105779"/>
+      </p:ext>
+    </p:extLst>
+  </p:cSld>
+  <p:clrMapOvr>
+    <a:masterClrMapping/>
+  </p:clrMapOvr>
+</p:sld>
+</file>
+
+<file path=ppt/slides/slide8.xml><?xml version="1.0" encoding="utf-8"?>
 <p:sld xmlns:a="http://schemas.openxmlformats.org/drawingml/2006/main" xmlns:r="http://schemas.openxmlformats.org/officeDocument/2006/relationships" xmlns:p="http://schemas.openxmlformats.org/presentationml/2006/main">
   <p:cSld>
     <p:bg>
@@ -15693,6 +18748,23 @@
               <a:t>Build on with our site and create an even more interactive UI for the user</a:t>
             </a:r>
           </a:p>
+          <a:p>
+            <a:r>
+              <a:rPr lang="en-US" dirty="0"/>
+              <a:t>Have RoCry be voice activated and be able to handle a full transaction</a:t>
+            </a:r>
+          </a:p>
+          <a:p>
+            <a:r>
+              <a:rPr lang="en-US" dirty="0"/>
+              <a:t>Be able to implement machine learning/natural language processing for RoCry to be constantly </a:t>
+            </a:r>
+            <a:r>
+              <a:rPr lang="en-US" dirty="0" err="1"/>
+              <a:t>evovling</a:t>
+            </a:r>
+            <a:endParaRPr lang="en-US" dirty="0"/>
+          </a:p>
         </p:txBody>
       </p:sp>
       <p:pic>
@@ -15738,1056 +18810,7 @@
 </p:sld>
 </file>
 
-<file path=ppt/slides/slide6.xml><?xml version="1.0" encoding="utf-8"?>
-<p:sld xmlns:a="http://schemas.openxmlformats.org/drawingml/2006/main" xmlns:r="http://schemas.openxmlformats.org/officeDocument/2006/relationships" xmlns:p="http://schemas.openxmlformats.org/presentationml/2006/main">
-  <p:cSld>
-    <p:bg>
-      <p:bgPr>
-        <a:solidFill>
-          <a:schemeClr val="bg2"/>
-        </a:solidFill>
-        <a:effectLst/>
-      </p:bgPr>
-    </p:bg>
-    <p:spTree>
-      <p:nvGrpSpPr>
-        <p:cNvPr id="1" name=""/>
-        <p:cNvGrpSpPr/>
-        <p:nvPr/>
-      </p:nvGrpSpPr>
-      <p:grpSpPr>
-        <a:xfrm>
-          <a:off x="0" y="0"/>
-          <a:ext cx="0" cy="0"/>
-          <a:chOff x="0" y="0"/>
-          <a:chExt cx="0" cy="0"/>
-        </a:xfrm>
-      </p:grpSpPr>
-      <p:sp useBgFill="1">
-        <p:nvSpPr>
-          <p:cNvPr id="11" name="Background Fill">
-            <a:extLst>
-              <a:ext uri="{FF2B5EF4-FFF2-40B4-BE49-F238E27FC236}">
-                <a16:creationId xmlns:a16="http://schemas.microsoft.com/office/drawing/2014/main" id="{FAFB3478-4AEC-431E-93B2-1593839C16DA}"/>
-              </a:ext>
-              <a:ext uri="{C183D7F6-B498-43B3-948B-1728B52AA6E4}">
-                <adec:decorative xmlns:adec="http://schemas.microsoft.com/office/drawing/2017/decorative" val="1"/>
-              </a:ext>
-            </a:extLst>
-          </p:cNvPr>
-          <p:cNvSpPr>
-            <a:spLocks noGrp="1" noRot="1" noChangeAspect="1" noMove="1" noResize="1" noEditPoints="1" noAdjustHandles="1" noChangeArrowheads="1" noChangeShapeType="1" noTextEdit="1"/>
-          </p:cNvSpPr>
-          <p:nvPr>
-            <p:extLst>
-              <p:ext uri="{386F3935-93C4-4BCD-93E2-E3B085C9AB24}">
-                <p16:designElem xmlns:p16="http://schemas.microsoft.com/office/powerpoint/2015/main" val="1"/>
-              </p:ext>
-            </p:extLst>
-          </p:nvPr>
-        </p:nvSpPr>
-        <p:spPr>
-          <a:xfrm>
-            <a:off x="0" y="0"/>
-            <a:ext cx="12192000" cy="6858000"/>
-          </a:xfrm>
-          <a:prstGeom prst="rect">
-            <a:avLst/>
-          </a:prstGeom>
-          <a:ln w="9525" cap="flat">
-            <a:noFill/>
-            <a:prstDash val="solid"/>
-            <a:miter/>
-          </a:ln>
-        </p:spPr>
-        <p:txBody>
-          <a:bodyPr rtlCol="0" anchor="ctr"/>
-          <a:lstStyle/>
-          <a:p>
-            <a:endParaRPr lang="en-US">
-              <a:solidFill>
-                <a:schemeClr val="tx1"/>
-              </a:solidFill>
-            </a:endParaRPr>
-          </a:p>
-        </p:txBody>
-      </p:sp>
-      <p:sp>
-        <p:nvSpPr>
-          <p:cNvPr id="13" name="Color Fill">
-            <a:extLst>
-              <a:ext uri="{FF2B5EF4-FFF2-40B4-BE49-F238E27FC236}">
-                <a16:creationId xmlns:a16="http://schemas.microsoft.com/office/drawing/2014/main" id="{5AABFA05-E806-48B0-BA38-42F01BD6324C}"/>
-              </a:ext>
-              <a:ext uri="{C183D7F6-B498-43B3-948B-1728B52AA6E4}">
-                <adec:decorative xmlns:adec="http://schemas.microsoft.com/office/drawing/2017/decorative" val="1"/>
-              </a:ext>
-            </a:extLst>
-          </p:cNvPr>
-          <p:cNvSpPr>
-            <a:spLocks noGrp="1" noRot="1" noChangeAspect="1" noMove="1" noResize="1" noEditPoints="1" noAdjustHandles="1" noChangeArrowheads="1" noChangeShapeType="1" noTextEdit="1"/>
-          </p:cNvSpPr>
-          <p:nvPr>
-            <p:extLst>
-              <p:ext uri="{386F3935-93C4-4BCD-93E2-E3B085C9AB24}">
-                <p16:designElem xmlns:p16="http://schemas.microsoft.com/office/powerpoint/2015/main" val="1"/>
-              </p:ext>
-            </p:extLst>
-          </p:nvPr>
-        </p:nvSpPr>
-        <p:spPr>
-          <a:xfrm>
-            <a:off x="0" y="0"/>
-            <a:ext cx="12188952" cy="6858000"/>
-          </a:xfrm>
-          <a:prstGeom prst="rect">
-            <a:avLst/>
-          </a:prstGeom>
-          <a:solidFill>
-            <a:schemeClr val="bg2">
-              <a:lumMod val="75000"/>
-              <a:lumOff val="25000"/>
-              <a:alpha val="40000"/>
-            </a:schemeClr>
-          </a:solidFill>
-          <a:ln w="9525" cap="flat">
-            <a:noFill/>
-            <a:prstDash val="solid"/>
-            <a:miter/>
-          </a:ln>
-        </p:spPr>
-        <p:txBody>
-          <a:bodyPr rtlCol="0" anchor="ctr"/>
-          <a:lstStyle/>
-          <a:p>
-            <a:endParaRPr lang="en-US" dirty="0">
-              <a:solidFill>
-                <a:schemeClr val="bg2">
-                  <a:lumMod val="75000"/>
-                  <a:lumOff val="25000"/>
-                </a:schemeClr>
-              </a:solidFill>
-            </a:endParaRPr>
-          </a:p>
-        </p:txBody>
-      </p:sp>
-      <p:grpSp>
-        <p:nvGrpSpPr>
-          <p:cNvPr id="15" name="Group 14">
-            <a:extLst>
-              <a:ext uri="{FF2B5EF4-FFF2-40B4-BE49-F238E27FC236}">
-                <a16:creationId xmlns:a16="http://schemas.microsoft.com/office/drawing/2014/main" id="{42DDC377-BE64-4F1B-80B7-057C9566551E}"/>
-              </a:ext>
-              <a:ext uri="{C183D7F6-B498-43B3-948B-1728B52AA6E4}">
-                <adec:decorative xmlns:adec="http://schemas.microsoft.com/office/drawing/2017/decorative" val="1"/>
-              </a:ext>
-            </a:extLst>
-          </p:cNvPr>
-          <p:cNvGrpSpPr>
-            <a:grpSpLocks noGrp="1" noUngrp="1" noRot="1" noChangeAspect="1" noMove="1" noResize="1"/>
-          </p:cNvGrpSpPr>
-          <p:nvPr>
-            <p:extLst>
-              <p:ext uri="{386F3935-93C4-4BCD-93E2-E3B085C9AB24}">
-                <p16:designElem xmlns:p16="http://schemas.microsoft.com/office/powerpoint/2015/main" val="1"/>
-              </p:ext>
-            </p:extLst>
-          </p:nvPr>
-        </p:nvGrpSpPr>
-        <p:grpSpPr>
-          <a:xfrm>
-            <a:off x="7935972" y="-1"/>
-            <a:ext cx="4112311" cy="6858001"/>
-            <a:chOff x="7935972" y="-1"/>
-            <a:chExt cx="4112311" cy="6858001"/>
-          </a:xfrm>
-        </p:grpSpPr>
-        <p:sp>
-          <p:nvSpPr>
-            <p:cNvPr id="16" name="Oval 15">
-              <a:extLst>
-                <a:ext uri="{FF2B5EF4-FFF2-40B4-BE49-F238E27FC236}">
-                  <a16:creationId xmlns:a16="http://schemas.microsoft.com/office/drawing/2014/main" id="{704EC963-D536-4453-AA53-8431AB5EFFD1}"/>
-                </a:ext>
-                <a:ext uri="{C183D7F6-B498-43B3-948B-1728B52AA6E4}">
-                  <adec:decorative xmlns:adec="http://schemas.microsoft.com/office/drawing/2017/decorative" val="1"/>
-                </a:ext>
-              </a:extLst>
-            </p:cNvPr>
-            <p:cNvSpPr/>
-            <p:nvPr>
-              <p:extLst>
-                <p:ext uri="{386F3935-93C4-4BCD-93E2-E3B085C9AB24}">
-                  <p16:designElem xmlns:p16="http://schemas.microsoft.com/office/powerpoint/2015/main" val="1"/>
-                </p:ext>
-              </p:extLst>
-            </p:nvPr>
-          </p:nvSpPr>
-          <p:spPr>
-            <a:xfrm>
-              <a:off x="11450769" y="756967"/>
-              <a:ext cx="438100" cy="438100"/>
-            </a:xfrm>
-            <a:prstGeom prst="ellipse">
-              <a:avLst/>
-            </a:prstGeom>
-            <a:solidFill>
-              <a:schemeClr val="accent2"/>
-            </a:solidFill>
-            <a:ln>
-              <a:noFill/>
-            </a:ln>
-          </p:spPr>
-          <p:style>
-            <a:lnRef idx="2">
-              <a:schemeClr val="accent1">
-                <a:shade val="50000"/>
-              </a:schemeClr>
-            </a:lnRef>
-            <a:fillRef idx="1">
-              <a:schemeClr val="accent1"/>
-            </a:fillRef>
-            <a:effectRef idx="0">
-              <a:schemeClr val="accent1"/>
-            </a:effectRef>
-            <a:fontRef idx="minor">
-              <a:schemeClr val="lt1"/>
-            </a:fontRef>
-          </p:style>
-          <p:txBody>
-            <a:bodyPr rtlCol="0" anchor="ctr"/>
-            <a:lstStyle/>
-            <a:p>
-              <a:pPr algn="ctr"/>
-              <a:endParaRPr lang="en-US"/>
-            </a:p>
-          </p:txBody>
-        </p:sp>
-        <p:sp>
-          <p:nvSpPr>
-            <p:cNvPr id="17" name="Graphic 18">
-              <a:extLst>
-                <a:ext uri="{FF2B5EF4-FFF2-40B4-BE49-F238E27FC236}">
-                  <a16:creationId xmlns:a16="http://schemas.microsoft.com/office/drawing/2014/main" id="{9830F5A7-3C8A-4FDD-A9D3-679558CA64F9}"/>
-                </a:ext>
-                <a:ext uri="{C183D7F6-B498-43B3-948B-1728B52AA6E4}">
-                  <adec:decorative xmlns:adec="http://schemas.microsoft.com/office/drawing/2017/decorative" val="1"/>
-                </a:ext>
-              </a:extLst>
-            </p:cNvPr>
-            <p:cNvSpPr/>
-            <p:nvPr>
-              <p:extLst>
-                <p:ext uri="{386F3935-93C4-4BCD-93E2-E3B085C9AB24}">
-                  <p16:designElem xmlns:p16="http://schemas.microsoft.com/office/powerpoint/2015/main" val="1"/>
-                </p:ext>
-              </p:extLst>
-            </p:nvPr>
-          </p:nvSpPr>
-          <p:spPr>
-            <a:xfrm>
-              <a:off x="7935972" y="4013148"/>
-              <a:ext cx="813897" cy="1240422"/>
-            </a:xfrm>
-            <a:custGeom>
-              <a:avLst/>
-              <a:gdLst>
-                <a:gd name="connsiteX0" fmla="*/ 3413379 w 3413378"/>
-                <a:gd name="connsiteY0" fmla="*/ 3266028 h 6532054"/>
-                <a:gd name="connsiteX1" fmla="*/ 1706689 w 3413378"/>
-                <a:gd name="connsiteY1" fmla="*/ 6532055 h 6532054"/>
-                <a:gd name="connsiteX2" fmla="*/ 0 w 3413378"/>
-                <a:gd name="connsiteY2" fmla="*/ 3266028 h 6532054"/>
-                <a:gd name="connsiteX3" fmla="*/ 1706689 w 3413378"/>
-                <a:gd name="connsiteY3" fmla="*/ 0 h 6532054"/>
-                <a:gd name="connsiteX4" fmla="*/ 3413379 w 3413378"/>
-                <a:gd name="connsiteY4" fmla="*/ 3266028 h 6532054"/>
-              </a:gdLst>
-              <a:ahLst/>
-              <a:cxnLst>
-                <a:cxn ang="0">
-                  <a:pos x="connsiteX0" y="connsiteY0"/>
-                </a:cxn>
-                <a:cxn ang="0">
-                  <a:pos x="connsiteX1" y="connsiteY1"/>
-                </a:cxn>
-                <a:cxn ang="0">
-                  <a:pos x="connsiteX2" y="connsiteY2"/>
-                </a:cxn>
-                <a:cxn ang="0">
-                  <a:pos x="connsiteX3" y="connsiteY3"/>
-                </a:cxn>
-                <a:cxn ang="0">
-                  <a:pos x="connsiteX4" y="connsiteY4"/>
-                </a:cxn>
-              </a:cxnLst>
-              <a:rect l="l" t="t" r="r" b="b"/>
-              <a:pathLst>
-                <a:path w="3413378" h="6532054">
-                  <a:moveTo>
-                    <a:pt x="3413379" y="3266028"/>
-                  </a:moveTo>
-                  <a:cubicBezTo>
-                    <a:pt x="3413379" y="5069777"/>
-                    <a:pt x="1706689" y="6532055"/>
-                    <a:pt x="1706689" y="6532055"/>
-                  </a:cubicBezTo>
-                  <a:cubicBezTo>
-                    <a:pt x="1706689" y="6532055"/>
-                    <a:pt x="0" y="5069777"/>
-                    <a:pt x="0" y="3266028"/>
-                  </a:cubicBezTo>
-                  <a:cubicBezTo>
-                    <a:pt x="0" y="1462278"/>
-                    <a:pt x="1706689" y="0"/>
-                    <a:pt x="1706689" y="0"/>
-                  </a:cubicBezTo>
-                  <a:cubicBezTo>
-                    <a:pt x="1706689" y="0"/>
-                    <a:pt x="3413379" y="1462278"/>
-                    <a:pt x="3413379" y="3266028"/>
-                  </a:cubicBezTo>
-                  <a:close/>
-                </a:path>
-              </a:pathLst>
-            </a:custGeom>
-            <a:pattFill prst="pct5">
-              <a:fgClr>
-                <a:schemeClr val="accent4">
-                  <a:lumMod val="60000"/>
-                  <a:lumOff val="40000"/>
-                </a:schemeClr>
-              </a:fgClr>
-              <a:bgClr>
-                <a:schemeClr val="accent1">
-                  <a:lumMod val="75000"/>
-                </a:schemeClr>
-              </a:bgClr>
-            </a:pattFill>
-            <a:ln w="9525" cap="flat">
-              <a:noFill/>
-              <a:prstDash val="solid"/>
-              <a:miter/>
-            </a:ln>
-          </p:spPr>
-          <p:txBody>
-            <a:bodyPr rtlCol="0" anchor="ctr"/>
-            <a:lstStyle/>
-            <a:p>
-              <a:endParaRPr lang="en-US" dirty="0"/>
-            </a:p>
-          </p:txBody>
-        </p:sp>
-        <p:sp>
-          <p:nvSpPr>
-            <p:cNvPr id="18" name="Graphic 9">
-              <a:extLst>
-                <a:ext uri="{FF2B5EF4-FFF2-40B4-BE49-F238E27FC236}">
-                  <a16:creationId xmlns:a16="http://schemas.microsoft.com/office/drawing/2014/main" id="{279D6A93-291B-4380-BF71-74648EA48FA5}"/>
-                </a:ext>
-                <a:ext uri="{C183D7F6-B498-43B3-948B-1728B52AA6E4}">
-                  <adec:decorative xmlns:adec="http://schemas.microsoft.com/office/drawing/2017/decorative" val="1"/>
-                </a:ext>
-              </a:extLst>
-            </p:cNvPr>
-            <p:cNvSpPr/>
-            <p:nvPr>
-              <p:extLst>
-                <p:ext uri="{386F3935-93C4-4BCD-93E2-E3B085C9AB24}">
-                  <p16:designElem xmlns:p16="http://schemas.microsoft.com/office/powerpoint/2015/main" val="1"/>
-                </p:ext>
-              </p:extLst>
-            </p:nvPr>
-          </p:nvSpPr>
-          <p:spPr>
-            <a:xfrm>
-              <a:off x="8508034" y="1063796"/>
-              <a:ext cx="3518852" cy="3518851"/>
-            </a:xfrm>
-            <a:custGeom>
-              <a:avLst/>
-              <a:gdLst>
-                <a:gd name="connsiteX0" fmla="*/ 6861546 w 6861545"/>
-                <a:gd name="connsiteY0" fmla="*/ 6861546 h 6861545"/>
-                <a:gd name="connsiteX1" fmla="*/ 3435812 w 6861545"/>
-                <a:gd name="connsiteY1" fmla="*/ 6861546 h 6861545"/>
-                <a:gd name="connsiteX2" fmla="*/ 0 w 6861545"/>
-                <a:gd name="connsiteY2" fmla="*/ 3425734 h 6861545"/>
-                <a:gd name="connsiteX3" fmla="*/ 0 w 6861545"/>
-                <a:gd name="connsiteY3" fmla="*/ 0 h 6861545"/>
-                <a:gd name="connsiteX4" fmla="*/ 3425734 w 6861545"/>
-                <a:gd name="connsiteY4" fmla="*/ 0 h 6861545"/>
-                <a:gd name="connsiteX5" fmla="*/ 6861546 w 6861545"/>
-                <a:gd name="connsiteY5" fmla="*/ 3435812 h 6861545"/>
-                <a:gd name="connsiteX6" fmla="*/ 6861546 w 6861545"/>
-                <a:gd name="connsiteY6" fmla="*/ 6861546 h 6861545"/>
-              </a:gdLst>
-              <a:ahLst/>
-              <a:cxnLst>
-                <a:cxn ang="0">
-                  <a:pos x="connsiteX0" y="connsiteY0"/>
-                </a:cxn>
-                <a:cxn ang="0">
-                  <a:pos x="connsiteX1" y="connsiteY1"/>
-                </a:cxn>
-                <a:cxn ang="0">
-                  <a:pos x="connsiteX2" y="connsiteY2"/>
-                </a:cxn>
-                <a:cxn ang="0">
-                  <a:pos x="connsiteX3" y="connsiteY3"/>
-                </a:cxn>
-                <a:cxn ang="0">
-                  <a:pos x="connsiteX4" y="connsiteY4"/>
-                </a:cxn>
-                <a:cxn ang="0">
-                  <a:pos x="connsiteX5" y="connsiteY5"/>
-                </a:cxn>
-                <a:cxn ang="0">
-                  <a:pos x="connsiteX6" y="connsiteY6"/>
-                </a:cxn>
-              </a:cxnLst>
-              <a:rect l="l" t="t" r="r" b="b"/>
-              <a:pathLst>
-                <a:path w="6861545" h="6861545">
-                  <a:moveTo>
-                    <a:pt x="6861546" y="6861546"/>
-                  </a:moveTo>
-                  <a:lnTo>
-                    <a:pt x="3435812" y="6861546"/>
-                  </a:lnTo>
-                  <a:cubicBezTo>
-                    <a:pt x="1538245" y="6861546"/>
-                    <a:pt x="0" y="5323301"/>
-                    <a:pt x="0" y="3425734"/>
-                  </a:cubicBezTo>
-                  <a:lnTo>
-                    <a:pt x="0" y="0"/>
-                  </a:lnTo>
-                  <a:lnTo>
-                    <a:pt x="3425734" y="0"/>
-                  </a:lnTo>
-                  <a:cubicBezTo>
-                    <a:pt x="5323301" y="0"/>
-                    <a:pt x="6861546" y="1538245"/>
-                    <a:pt x="6861546" y="3435812"/>
-                  </a:cubicBezTo>
-                  <a:lnTo>
-                    <a:pt x="6861546" y="6861546"/>
-                  </a:lnTo>
-                  <a:close/>
-                </a:path>
-              </a:pathLst>
-            </a:custGeom>
-            <a:pattFill prst="pct5">
-              <a:fgClr>
-                <a:schemeClr val="accent4">
-                  <a:lumMod val="75000"/>
-                </a:schemeClr>
-              </a:fgClr>
-              <a:bgClr>
-                <a:schemeClr val="accent4">
-                  <a:lumMod val="60000"/>
-                  <a:lumOff val="40000"/>
-                </a:schemeClr>
-              </a:bgClr>
-            </a:pattFill>
-            <a:ln w="9525" cap="flat">
-              <a:noFill/>
-              <a:prstDash val="solid"/>
-              <a:miter/>
-            </a:ln>
-          </p:spPr>
-          <p:txBody>
-            <a:bodyPr rtlCol="0" anchor="ctr"/>
-            <a:lstStyle/>
-            <a:p>
-              <a:endParaRPr lang="en-US" dirty="0"/>
-            </a:p>
-          </p:txBody>
-        </p:sp>
-        <p:sp>
-          <p:nvSpPr>
-            <p:cNvPr id="19" name="Oval 18">
-              <a:extLst>
-                <a:ext uri="{FF2B5EF4-FFF2-40B4-BE49-F238E27FC236}">
-                  <a16:creationId xmlns:a16="http://schemas.microsoft.com/office/drawing/2014/main" id="{67F4B6ED-6E4B-4600-BF49-D0B0A2F6EBAF}"/>
-                </a:ext>
-                <a:ext uri="{C183D7F6-B498-43B3-948B-1728B52AA6E4}">
-                  <adec:decorative xmlns:adec="http://schemas.microsoft.com/office/drawing/2017/decorative" val="1"/>
-                </a:ext>
-              </a:extLst>
-            </p:cNvPr>
-            <p:cNvSpPr/>
-            <p:nvPr>
-              <p:extLst>
-                <p:ext uri="{386F3935-93C4-4BCD-93E2-E3B085C9AB24}">
-                  <p16:designElem xmlns:p16="http://schemas.microsoft.com/office/powerpoint/2015/main" val="1"/>
-                </p:ext>
-              </p:extLst>
-            </p:nvPr>
-          </p:nvSpPr>
-          <p:spPr>
-            <a:xfrm>
-              <a:off x="9012156" y="4526823"/>
-              <a:ext cx="260714" cy="260714"/>
-            </a:xfrm>
-            <a:prstGeom prst="ellipse">
-              <a:avLst/>
-            </a:prstGeom>
-            <a:solidFill>
-              <a:schemeClr val="accent1">
-                <a:lumMod val="60000"/>
-                <a:lumOff val="40000"/>
-              </a:schemeClr>
-            </a:solidFill>
-            <a:ln w="9331" cap="flat">
-              <a:noFill/>
-              <a:prstDash val="solid"/>
-              <a:miter/>
-            </a:ln>
-          </p:spPr>
-          <p:txBody>
-            <a:bodyPr rtlCol="0" anchor="ctr"/>
-            <a:lstStyle/>
-            <a:p>
-              <a:endParaRPr lang="en-US">
-                <a:solidFill>
-                  <a:schemeClr val="tx1"/>
-                </a:solidFill>
-              </a:endParaRPr>
-            </a:p>
-          </p:txBody>
-        </p:sp>
-        <p:sp>
-          <p:nvSpPr>
-            <p:cNvPr id="20" name="Graphic 9">
-              <a:extLst>
-                <a:ext uri="{FF2B5EF4-FFF2-40B4-BE49-F238E27FC236}">
-                  <a16:creationId xmlns:a16="http://schemas.microsoft.com/office/drawing/2014/main" id="{C7015312-5A36-4C0D-8547-E8CCA22DCA3C}"/>
-                </a:ext>
-                <a:ext uri="{C183D7F6-B498-43B3-948B-1728B52AA6E4}">
-                  <adec:decorative xmlns:adec="http://schemas.microsoft.com/office/drawing/2017/decorative" val="1"/>
-                </a:ext>
-              </a:extLst>
-            </p:cNvPr>
-            <p:cNvSpPr/>
-            <p:nvPr>
-              <p:extLst>
-                <p:ext uri="{386F3935-93C4-4BCD-93E2-E3B085C9AB24}">
-                  <p16:designElem xmlns:p16="http://schemas.microsoft.com/office/powerpoint/2015/main" val="1"/>
-                </p:ext>
-              </p:extLst>
-            </p:nvPr>
-          </p:nvSpPr>
-          <p:spPr>
-            <a:xfrm>
-              <a:off x="8508034" y="1063157"/>
-              <a:ext cx="3540249" cy="3540247"/>
-            </a:xfrm>
-            <a:custGeom>
-              <a:avLst/>
-              <a:gdLst>
-                <a:gd name="connsiteX0" fmla="*/ 6861546 w 6861545"/>
-                <a:gd name="connsiteY0" fmla="*/ 6861546 h 6861545"/>
-                <a:gd name="connsiteX1" fmla="*/ 3435812 w 6861545"/>
-                <a:gd name="connsiteY1" fmla="*/ 6861546 h 6861545"/>
-                <a:gd name="connsiteX2" fmla="*/ 0 w 6861545"/>
-                <a:gd name="connsiteY2" fmla="*/ 3425734 h 6861545"/>
-                <a:gd name="connsiteX3" fmla="*/ 0 w 6861545"/>
-                <a:gd name="connsiteY3" fmla="*/ 0 h 6861545"/>
-                <a:gd name="connsiteX4" fmla="*/ 3425734 w 6861545"/>
-                <a:gd name="connsiteY4" fmla="*/ 0 h 6861545"/>
-                <a:gd name="connsiteX5" fmla="*/ 6861546 w 6861545"/>
-                <a:gd name="connsiteY5" fmla="*/ 3435812 h 6861545"/>
-                <a:gd name="connsiteX6" fmla="*/ 6861546 w 6861545"/>
-                <a:gd name="connsiteY6" fmla="*/ 6861546 h 6861545"/>
-              </a:gdLst>
-              <a:ahLst/>
-              <a:cxnLst>
-                <a:cxn ang="0">
-                  <a:pos x="connsiteX0" y="connsiteY0"/>
-                </a:cxn>
-                <a:cxn ang="0">
-                  <a:pos x="connsiteX1" y="connsiteY1"/>
-                </a:cxn>
-                <a:cxn ang="0">
-                  <a:pos x="connsiteX2" y="connsiteY2"/>
-                </a:cxn>
-                <a:cxn ang="0">
-                  <a:pos x="connsiteX3" y="connsiteY3"/>
-                </a:cxn>
-                <a:cxn ang="0">
-                  <a:pos x="connsiteX4" y="connsiteY4"/>
-                </a:cxn>
-                <a:cxn ang="0">
-                  <a:pos x="connsiteX5" y="connsiteY5"/>
-                </a:cxn>
-                <a:cxn ang="0">
-                  <a:pos x="connsiteX6" y="connsiteY6"/>
-                </a:cxn>
-              </a:cxnLst>
-              <a:rect l="l" t="t" r="r" b="b"/>
-              <a:pathLst>
-                <a:path w="6861545" h="6861545">
-                  <a:moveTo>
-                    <a:pt x="6861546" y="6861546"/>
-                  </a:moveTo>
-                  <a:lnTo>
-                    <a:pt x="3435812" y="6861546"/>
-                  </a:lnTo>
-                  <a:cubicBezTo>
-                    <a:pt x="1538245" y="6861546"/>
-                    <a:pt x="0" y="5323301"/>
-                    <a:pt x="0" y="3425734"/>
-                  </a:cubicBezTo>
-                  <a:lnTo>
-                    <a:pt x="0" y="0"/>
-                  </a:lnTo>
-                  <a:lnTo>
-                    <a:pt x="3425734" y="0"/>
-                  </a:lnTo>
-                  <a:cubicBezTo>
-                    <a:pt x="5323301" y="0"/>
-                    <a:pt x="6861546" y="1538245"/>
-                    <a:pt x="6861546" y="3435812"/>
-                  </a:cubicBezTo>
-                  <a:lnTo>
-                    <a:pt x="6861546" y="6861546"/>
-                  </a:lnTo>
-                  <a:close/>
-                </a:path>
-              </a:pathLst>
-            </a:custGeom>
-            <a:solidFill>
-              <a:srgbClr val="FFFFFF"/>
-            </a:solidFill>
-            <a:ln w="38100" cap="flat">
-              <a:solidFill>
-                <a:srgbClr val="F7F7F7"/>
-              </a:solidFill>
-              <a:prstDash val="solid"/>
-              <a:miter/>
-            </a:ln>
-          </p:spPr>
-          <p:txBody>
-            <a:bodyPr rtlCol="0" anchor="ctr"/>
-            <a:lstStyle/>
-            <a:p>
-              <a:endParaRPr lang="en-US" dirty="0"/>
-            </a:p>
-          </p:txBody>
-        </p:sp>
-        <p:sp>
-          <p:nvSpPr>
-            <p:cNvPr id="21" name="Freeform: Shape 20">
-              <a:extLst>
-                <a:ext uri="{FF2B5EF4-FFF2-40B4-BE49-F238E27FC236}">
-                  <a16:creationId xmlns:a16="http://schemas.microsoft.com/office/drawing/2014/main" id="{DE6E37D0-F1F6-4779-A0DD-BE7107CC5ABD}"/>
-                </a:ext>
-                <a:ext uri="{C183D7F6-B498-43B3-948B-1728B52AA6E4}">
-                  <adec:decorative xmlns:adec="http://schemas.microsoft.com/office/drawing/2017/decorative" val="1"/>
-                </a:ext>
-              </a:extLst>
-            </p:cNvPr>
-            <p:cNvSpPr/>
-            <p:nvPr>
-              <p:extLst>
-                <p:ext uri="{386F3935-93C4-4BCD-93E2-E3B085C9AB24}">
-                  <p16:designElem xmlns:p16="http://schemas.microsoft.com/office/powerpoint/2015/main" val="1"/>
-                </p:ext>
-              </p:extLst>
-            </p:nvPr>
-          </p:nvSpPr>
-          <p:spPr>
-            <a:xfrm>
-              <a:off x="8508034" y="4793253"/>
-              <a:ext cx="3518852" cy="2064747"/>
-            </a:xfrm>
-            <a:custGeom>
-              <a:avLst/>
-              <a:gdLst>
-                <a:gd name="connsiteX0" fmla="*/ 1762010 w 3518852"/>
-                <a:gd name="connsiteY0" fmla="*/ 0 h 2212102"/>
-                <a:gd name="connsiteX1" fmla="*/ 3518852 w 3518852"/>
-                <a:gd name="connsiteY1" fmla="*/ 0 h 2212102"/>
-                <a:gd name="connsiteX2" fmla="*/ 3518852 w 3518852"/>
-                <a:gd name="connsiteY2" fmla="*/ 1747195 h 2212102"/>
-                <a:gd name="connsiteX3" fmla="*/ 3483055 w 3518852"/>
-                <a:gd name="connsiteY3" fmla="*/ 2100355 h 2212102"/>
-                <a:gd name="connsiteX4" fmla="*/ 3454163 w 3518852"/>
-                <a:gd name="connsiteY4" fmla="*/ 2212102 h 2212102"/>
-                <a:gd name="connsiteX5" fmla="*/ 0 w 3518852"/>
-                <a:gd name="connsiteY5" fmla="*/ 2212102 h 2212102"/>
-                <a:gd name="connsiteX6" fmla="*/ 0 w 3518852"/>
-                <a:gd name="connsiteY6" fmla="*/ 1752335 h 2212102"/>
-                <a:gd name="connsiteX7" fmla="*/ 1762010 w 3518852"/>
-                <a:gd name="connsiteY7" fmla="*/ 0 h 2212102"/>
-              </a:gdLst>
-              <a:ahLst/>
-              <a:cxnLst>
-                <a:cxn ang="0">
-                  <a:pos x="connsiteX0" y="connsiteY0"/>
-                </a:cxn>
-                <a:cxn ang="0">
-                  <a:pos x="connsiteX1" y="connsiteY1"/>
-                </a:cxn>
-                <a:cxn ang="0">
-                  <a:pos x="connsiteX2" y="connsiteY2"/>
-                </a:cxn>
-                <a:cxn ang="0">
-                  <a:pos x="connsiteX3" y="connsiteY3"/>
-                </a:cxn>
-                <a:cxn ang="0">
-                  <a:pos x="connsiteX4" y="connsiteY4"/>
-                </a:cxn>
-                <a:cxn ang="0">
-                  <a:pos x="connsiteX5" y="connsiteY5"/>
-                </a:cxn>
-                <a:cxn ang="0">
-                  <a:pos x="connsiteX6" y="connsiteY6"/>
-                </a:cxn>
-                <a:cxn ang="0">
-                  <a:pos x="connsiteX7" y="connsiteY7"/>
-                </a:cxn>
-              </a:cxnLst>
-              <a:rect l="l" t="t" r="r" b="b"/>
-              <a:pathLst>
-                <a:path w="3518852" h="2212102">
-                  <a:moveTo>
-                    <a:pt x="1762010" y="0"/>
-                  </a:moveTo>
-                  <a:lnTo>
-                    <a:pt x="3518852" y="0"/>
-                  </a:lnTo>
-                  <a:lnTo>
-                    <a:pt x="3518852" y="1747195"/>
-                  </a:lnTo>
-                  <a:cubicBezTo>
-                    <a:pt x="3518852" y="1868170"/>
-                    <a:pt x="3506526" y="1986282"/>
-                    <a:pt x="3483055" y="2100355"/>
-                  </a:cubicBezTo>
-                  <a:lnTo>
-                    <a:pt x="3454163" y="2212102"/>
-                  </a:lnTo>
-                  <a:lnTo>
-                    <a:pt x="0" y="2212102"/>
-                  </a:lnTo>
-                  <a:lnTo>
-                    <a:pt x="0" y="1752335"/>
-                  </a:lnTo>
-                  <a:cubicBezTo>
-                    <a:pt x="0" y="784537"/>
-                    <a:pt x="788868" y="0"/>
-                    <a:pt x="1762010" y="0"/>
-                  </a:cubicBezTo>
-                  <a:close/>
-                </a:path>
-              </a:pathLst>
-            </a:custGeom>
-            <a:solidFill>
-              <a:schemeClr val="accent4">
-                <a:lumMod val="40000"/>
-                <a:lumOff val="60000"/>
-                <a:alpha val="30000"/>
-              </a:schemeClr>
-            </a:solidFill>
-            <a:ln w="9525" cap="flat">
-              <a:noFill/>
-              <a:prstDash val="solid"/>
-              <a:miter/>
-            </a:ln>
-          </p:spPr>
-          <p:txBody>
-            <a:bodyPr wrap="square" rtlCol="0" anchor="ctr">
-              <a:noAutofit/>
-            </a:bodyPr>
-            <a:lstStyle/>
-            <a:p>
-              <a:endParaRPr lang="en-US" dirty="0"/>
-            </a:p>
-          </p:txBody>
-        </p:sp>
-        <p:sp>
-          <p:nvSpPr>
-            <p:cNvPr id="22" name="Freeform: Shape 21">
-              <a:extLst>
-                <a:ext uri="{FF2B5EF4-FFF2-40B4-BE49-F238E27FC236}">
-                  <a16:creationId xmlns:a16="http://schemas.microsoft.com/office/drawing/2014/main" id="{FDB3FC3E-AEEC-4250-B91C-26CA109ED2AB}"/>
-                </a:ext>
-                <a:ext uri="{C183D7F6-B498-43B3-948B-1728B52AA6E4}">
-                  <adec:decorative xmlns:adec="http://schemas.microsoft.com/office/drawing/2017/decorative" val="1"/>
-                </a:ext>
-              </a:extLst>
-            </p:cNvPr>
-            <p:cNvSpPr/>
-            <p:nvPr>
-              <p:extLst>
-                <p:ext uri="{386F3935-93C4-4BCD-93E2-E3B085C9AB24}">
-                  <p16:designElem xmlns:p16="http://schemas.microsoft.com/office/powerpoint/2015/main" val="1"/>
-                </p:ext>
-              </p:extLst>
-            </p:nvPr>
-          </p:nvSpPr>
-          <p:spPr>
-            <a:xfrm>
-              <a:off x="8508785" y="-1"/>
-              <a:ext cx="3316434" cy="976017"/>
-            </a:xfrm>
-            <a:custGeom>
-              <a:avLst/>
-              <a:gdLst>
-                <a:gd name="connsiteX0" fmla="*/ 0 w 2779229"/>
-                <a:gd name="connsiteY0" fmla="*/ 0 h 817919"/>
-                <a:gd name="connsiteX1" fmla="*/ 2779229 w 2779229"/>
-                <a:gd name="connsiteY1" fmla="*/ 0 h 817919"/>
-                <a:gd name="connsiteX2" fmla="*/ 2755430 w 2779229"/>
-                <a:gd name="connsiteY2" fmla="*/ 49404 h 817919"/>
-                <a:gd name="connsiteX3" fmla="*/ 1464180 w 2779229"/>
-                <a:gd name="connsiteY3" fmla="*/ 817919 h 817919"/>
-                <a:gd name="connsiteX4" fmla="*/ 0 w 2779229"/>
-                <a:gd name="connsiteY4" fmla="*/ 817919 h 817919"/>
-              </a:gdLst>
-              <a:ahLst/>
-              <a:cxnLst>
-                <a:cxn ang="0">
-                  <a:pos x="connsiteX0" y="connsiteY0"/>
-                </a:cxn>
-                <a:cxn ang="0">
-                  <a:pos x="connsiteX1" y="connsiteY1"/>
-                </a:cxn>
-                <a:cxn ang="0">
-                  <a:pos x="connsiteX2" y="connsiteY2"/>
-                </a:cxn>
-                <a:cxn ang="0">
-                  <a:pos x="connsiteX3" y="connsiteY3"/>
-                </a:cxn>
-                <a:cxn ang="0">
-                  <a:pos x="connsiteX4" y="connsiteY4"/>
-                </a:cxn>
-              </a:cxnLst>
-              <a:rect l="l" t="t" r="r" b="b"/>
-              <a:pathLst>
-                <a:path w="2779229" h="817919">
-                  <a:moveTo>
-                    <a:pt x="0" y="0"/>
-                  </a:moveTo>
-                  <a:lnTo>
-                    <a:pt x="2779229" y="0"/>
-                  </a:lnTo>
-                  <a:lnTo>
-                    <a:pt x="2755430" y="49404"/>
-                  </a:lnTo>
-                  <a:cubicBezTo>
-                    <a:pt x="2506760" y="507168"/>
-                    <a:pt x="2021765" y="817919"/>
-                    <a:pt x="1464180" y="817919"/>
-                  </a:cubicBezTo>
-                  <a:lnTo>
-                    <a:pt x="0" y="817919"/>
-                  </a:lnTo>
-                  <a:close/>
-                </a:path>
-              </a:pathLst>
-            </a:custGeom>
-            <a:solidFill>
-              <a:schemeClr val="accent1">
-                <a:lumMod val="75000"/>
-              </a:schemeClr>
-            </a:solidFill>
-            <a:ln w="9331" cap="flat">
-              <a:noFill/>
-              <a:prstDash val="solid"/>
-              <a:miter/>
-            </a:ln>
-          </p:spPr>
-          <p:txBody>
-            <a:bodyPr rtlCol="0" anchor="ctr"/>
-            <a:lstStyle/>
-            <a:p>
-              <a:endParaRPr lang="en-US"/>
-            </a:p>
-          </p:txBody>
-        </p:sp>
-      </p:grpSp>
-      <p:sp>
-        <p:nvSpPr>
-          <p:cNvPr id="24" name="Texture">
-            <a:extLst>
-              <a:ext uri="{FF2B5EF4-FFF2-40B4-BE49-F238E27FC236}">
-                <a16:creationId xmlns:a16="http://schemas.microsoft.com/office/drawing/2014/main" id="{2E922E9E-A29B-4164-A634-B718A43369CA}"/>
-              </a:ext>
-              <a:ext uri="{C183D7F6-B498-43B3-948B-1728B52AA6E4}">
-                <adec:decorative xmlns:adec="http://schemas.microsoft.com/office/drawing/2017/decorative" val="1"/>
-              </a:ext>
-            </a:extLst>
-          </p:cNvPr>
-          <p:cNvSpPr>
-            <a:spLocks noGrp="1" noRot="1" noChangeAspect="1" noMove="1" noResize="1" noEditPoints="1" noAdjustHandles="1" noChangeArrowheads="1" noChangeShapeType="1" noTextEdit="1"/>
-          </p:cNvSpPr>
-          <p:nvPr>
-            <p:extLst>
-              <p:ext uri="{386F3935-93C4-4BCD-93E2-E3B085C9AB24}">
-                <p16:designElem xmlns:p16="http://schemas.microsoft.com/office/powerpoint/2015/main" val="1"/>
-              </p:ext>
-            </p:extLst>
-          </p:nvPr>
-        </p:nvSpPr>
-        <p:spPr>
-          <a:xfrm>
-            <a:off x="3048" y="0"/>
-            <a:ext cx="12188952" cy="6858000"/>
-          </a:xfrm>
-          <a:prstGeom prst="rect">
-            <a:avLst/>
-          </a:prstGeom>
-          <a:blipFill dpi="0" rotWithShape="1">
-            <a:blip r:embed="rId2">
-              <a:alphaModFix amt="6000"/>
-            </a:blip>
-            <a:srcRect/>
-            <a:tile tx="0" ty="0" sx="100000" sy="100000" flip="none" algn="tl"/>
-          </a:blipFill>
-          <a:ln w="9525" cap="flat">
-            <a:noFill/>
-            <a:prstDash val="solid"/>
-            <a:miter/>
-          </a:ln>
-        </p:spPr>
-        <p:txBody>
-          <a:bodyPr rtlCol="0" anchor="ctr"/>
-          <a:lstStyle/>
-          <a:p>
-            <a:endParaRPr lang="en-US" dirty="0"/>
-          </a:p>
-        </p:txBody>
-      </p:sp>
-      <p:sp>
-        <p:nvSpPr>
-          <p:cNvPr id="2" name="Title 1">
-            <a:extLst>
-              <a:ext uri="{FF2B5EF4-FFF2-40B4-BE49-F238E27FC236}">
-                <a16:creationId xmlns:a16="http://schemas.microsoft.com/office/drawing/2014/main" id="{6E9A8FF1-89C5-4816-A5AA-A92FD91695B9}"/>
-              </a:ext>
-            </a:extLst>
-          </p:cNvPr>
-          <p:cNvSpPr>
-            <a:spLocks noGrp="1"/>
-          </p:cNvSpPr>
-          <p:nvPr>
-            <p:ph type="title"/>
-          </p:nvPr>
-        </p:nvSpPr>
-        <p:spPr>
-          <a:xfrm>
-            <a:off x="457200" y="758952"/>
-            <a:ext cx="6943725" cy="1325563"/>
-          </a:xfrm>
-        </p:spPr>
-        <p:txBody>
-          <a:bodyPr anchor="b">
-            <a:normAutofit/>
-          </a:bodyPr>
-          <a:lstStyle/>
-          <a:p>
-            <a:r>
-              <a:rPr lang="en-US" dirty="0"/>
-              <a:t>Struggles</a:t>
-            </a:r>
-          </a:p>
-        </p:txBody>
-      </p:sp>
-      <p:sp>
-        <p:nvSpPr>
-          <p:cNvPr id="3" name="Content Placeholder 2">
-            <a:extLst>
-              <a:ext uri="{FF2B5EF4-FFF2-40B4-BE49-F238E27FC236}">
-                <a16:creationId xmlns:a16="http://schemas.microsoft.com/office/drawing/2014/main" id="{B5B5FE5A-58DD-46FE-B641-060792E939AD}"/>
-              </a:ext>
-            </a:extLst>
-          </p:cNvPr>
-          <p:cNvSpPr>
-            <a:spLocks noGrp="1"/>
-          </p:cNvSpPr>
-          <p:nvPr>
-            <p:ph idx="1"/>
-          </p:nvPr>
-        </p:nvSpPr>
-        <p:spPr>
-          <a:xfrm>
-            <a:off x="457200" y="2286000"/>
-            <a:ext cx="6943725" cy="3872995"/>
-          </a:xfrm>
-        </p:spPr>
-        <p:txBody>
-          <a:bodyPr>
-            <a:normAutofit/>
-          </a:bodyPr>
-          <a:lstStyle/>
-          <a:p>
-            <a:r>
-              <a:rPr lang="en-US" dirty="0"/>
-              <a:t>Being able to integrate the bot with Lambda and using voice chat rather than text chat</a:t>
-            </a:r>
-          </a:p>
-          <a:p>
-            <a:r>
-              <a:rPr lang="en-US" dirty="0"/>
-              <a:t>Getting a large amount of data and then cleaning it for the user</a:t>
-            </a:r>
-          </a:p>
-          <a:p>
-            <a:r>
-              <a:rPr lang="en-US" dirty="0"/>
-              <a:t>Finding the machine learning that correctly fit with our goal at RoCry</a:t>
-            </a:r>
-          </a:p>
-        </p:txBody>
-      </p:sp>
-      <p:pic>
-        <p:nvPicPr>
-          <p:cNvPr id="6" name="Picture 5">
-            <a:extLst>
-              <a:ext uri="{FF2B5EF4-FFF2-40B4-BE49-F238E27FC236}">
-                <a16:creationId xmlns:a16="http://schemas.microsoft.com/office/drawing/2014/main" id="{97F5ED44-6668-401E-AD94-8D97CB6C559A}"/>
-              </a:ext>
-            </a:extLst>
-          </p:cNvPr>
-          <p:cNvPicPr>
-            <a:picLocks noChangeAspect="1"/>
-          </p:cNvPicPr>
-          <p:nvPr/>
-        </p:nvPicPr>
-        <p:blipFill>
-          <a:blip r:embed="rId3"/>
-          <a:stretch>
-            <a:fillRect/>
-          </a:stretch>
-        </p:blipFill>
-        <p:spPr>
-          <a:xfrm>
-            <a:off x="9538577" y="1614529"/>
-            <a:ext cx="1521486" cy="2442050"/>
-          </a:xfrm>
-          <a:prstGeom prst="rect">
-            <a:avLst/>
-          </a:prstGeom>
-        </p:spPr>
-      </p:pic>
-    </p:spTree>
-    <p:extLst>
-      <p:ext uri="{BB962C8B-B14F-4D97-AF65-F5344CB8AC3E}">
-        <p14:creationId xmlns:p14="http://schemas.microsoft.com/office/powerpoint/2010/main" val="701105779"/>
-      </p:ext>
-    </p:extLst>
-  </p:cSld>
-  <p:clrMapOvr>
-    <a:masterClrMapping/>
-  </p:clrMapOvr>
-</p:sld>
-</file>
-
-<file path=ppt/slides/slide7.xml><?xml version="1.0" encoding="utf-8"?>
+<file path=ppt/slides/slide9.xml><?xml version="1.0" encoding="utf-8"?>
 <p:sld xmlns:a="http://schemas.openxmlformats.org/drawingml/2006/main" xmlns:r="http://schemas.openxmlformats.org/officeDocument/2006/relationships" xmlns:p="http://schemas.openxmlformats.org/presentationml/2006/main">
   <p:cSld>
     <p:bg>

</xml_diff>